<commit_message>
Computer System: algorithms add recursive/backtrace section
</commit_message>
<xml_diff>
--- a/xxx.pptx
+++ b/xxx.pptx
@@ -6,6 +6,7 @@
   </p:sldMasterIdLst>
   <p:sldIdLst>
     <p:sldId id="256" r:id="rId2"/>
+    <p:sldId id="257" r:id="rId3"/>
   </p:sldIdLst>
   <p:sldSz cx="9144000" cy="6858000" type="screen4x3"/>
   <p:notesSz cx="6858000" cy="9144000"/>
@@ -7664,6 +7665,1590 @@
 </p:sld>
 </file>
 
+<file path=ppt/slides/slide2.xml><?xml version="1.0" encoding="utf-8"?>
+<p:sld xmlns:a="http://schemas.openxmlformats.org/drawingml/2006/main" xmlns:r="http://schemas.openxmlformats.org/officeDocument/2006/relationships" xmlns:p="http://schemas.openxmlformats.org/presentationml/2006/main">
+  <p:cSld>
+    <p:spTree>
+      <p:nvGrpSpPr>
+        <p:cNvPr id="1" name=""/>
+        <p:cNvGrpSpPr/>
+        <p:nvPr/>
+      </p:nvGrpSpPr>
+      <p:grpSpPr>
+        <a:xfrm>
+          <a:off x="0" y="0"/>
+          <a:ext cx="0" cy="0"/>
+          <a:chOff x="0" y="0"/>
+          <a:chExt cx="0" cy="0"/>
+        </a:xfrm>
+      </p:grpSpPr>
+      <p:grpSp>
+        <p:nvGrpSpPr>
+          <p:cNvPr id="77" name="组 76"/>
+          <p:cNvGrpSpPr/>
+          <p:nvPr/>
+        </p:nvGrpSpPr>
+        <p:grpSpPr>
+          <a:xfrm>
+            <a:off x="362463" y="645222"/>
+            <a:ext cx="6106908" cy="2055381"/>
+            <a:chOff x="-36121" y="668669"/>
+            <a:chExt cx="6106908" cy="2055381"/>
+          </a:xfrm>
+        </p:grpSpPr>
+        <p:sp>
+          <p:nvSpPr>
+            <p:cNvPr id="7" name="圆角矩形 6"/>
+            <p:cNvSpPr/>
+            <p:nvPr/>
+          </p:nvSpPr>
+          <p:spPr>
+            <a:xfrm>
+              <a:off x="1836145" y="673335"/>
+              <a:ext cx="432000" cy="360000"/>
+            </a:xfrm>
+            <a:prstGeom prst="roundRect">
+              <a:avLst/>
+            </a:prstGeom>
+            <a:noFill/>
+            <a:ln>
+              <a:solidFill>
+                <a:schemeClr val="tx1"/>
+              </a:solidFill>
+            </a:ln>
+          </p:spPr>
+          <p:style>
+            <a:lnRef idx="2">
+              <a:schemeClr val="accent1">
+                <a:shade val="50000"/>
+              </a:schemeClr>
+            </a:lnRef>
+            <a:fillRef idx="1">
+              <a:schemeClr val="accent1"/>
+            </a:fillRef>
+            <a:effectRef idx="0">
+              <a:schemeClr val="accent1"/>
+            </a:effectRef>
+            <a:fontRef idx="minor">
+              <a:schemeClr val="lt1"/>
+            </a:fontRef>
+          </p:style>
+          <p:txBody>
+            <a:bodyPr rtlCol="0" anchor="ctr"/>
+            <a:lstStyle/>
+            <a:p>
+              <a:pPr algn="ctr"/>
+              <a:r>
+                <a:rPr kumimoji="1" lang="en-US" altLang="zh-CN">
+                  <a:solidFill>
+                    <a:schemeClr val="tx1"/>
+                  </a:solidFill>
+                  <a:latin typeface="Arial" charset="0"/>
+                  <a:ea typeface="Arial" charset="0"/>
+                  <a:cs typeface="Arial" charset="0"/>
+                </a:rPr>
+                <a:t>1</a:t>
+              </a:r>
+              <a:endParaRPr kumimoji="1" lang="zh-CN" altLang="en-US">
+                <a:solidFill>
+                  <a:schemeClr val="tx1"/>
+                </a:solidFill>
+                <a:latin typeface="Arial" charset="0"/>
+                <a:ea typeface="Arial" charset="0"/>
+                <a:cs typeface="Arial" charset="0"/>
+              </a:endParaRPr>
+            </a:p>
+          </p:txBody>
+        </p:sp>
+        <p:sp>
+          <p:nvSpPr>
+            <p:cNvPr id="9" name="圆角矩形 8"/>
+            <p:cNvSpPr/>
+            <p:nvPr/>
+          </p:nvSpPr>
+          <p:spPr>
+            <a:xfrm>
+              <a:off x="3495032" y="673335"/>
+              <a:ext cx="432000" cy="360000"/>
+            </a:xfrm>
+            <a:prstGeom prst="roundRect">
+              <a:avLst/>
+            </a:prstGeom>
+            <a:noFill/>
+            <a:ln>
+              <a:solidFill>
+                <a:schemeClr val="tx1"/>
+              </a:solidFill>
+            </a:ln>
+          </p:spPr>
+          <p:style>
+            <a:lnRef idx="2">
+              <a:schemeClr val="accent1">
+                <a:shade val="50000"/>
+              </a:schemeClr>
+            </a:lnRef>
+            <a:fillRef idx="1">
+              <a:schemeClr val="accent1"/>
+            </a:fillRef>
+            <a:effectRef idx="0">
+              <a:schemeClr val="accent1"/>
+            </a:effectRef>
+            <a:fontRef idx="minor">
+              <a:schemeClr val="lt1"/>
+            </a:fontRef>
+          </p:style>
+          <p:txBody>
+            <a:bodyPr rtlCol="0" anchor="ctr"/>
+            <a:lstStyle/>
+            <a:p>
+              <a:pPr algn="ctr"/>
+              <a:r>
+                <a:rPr kumimoji="1" lang="en-US" altLang="zh-CN">
+                  <a:solidFill>
+                    <a:schemeClr val="tx1"/>
+                  </a:solidFill>
+                  <a:latin typeface="Arial" charset="0"/>
+                  <a:ea typeface="Arial" charset="0"/>
+                  <a:cs typeface="Arial" charset="0"/>
+                </a:rPr>
+                <a:t>2</a:t>
+              </a:r>
+              <a:endParaRPr kumimoji="1" lang="zh-CN" altLang="en-US">
+                <a:solidFill>
+                  <a:schemeClr val="tx1"/>
+                </a:solidFill>
+                <a:latin typeface="Arial" charset="0"/>
+                <a:ea typeface="Arial" charset="0"/>
+                <a:cs typeface="Arial" charset="0"/>
+              </a:endParaRPr>
+            </a:p>
+          </p:txBody>
+        </p:sp>
+        <p:sp>
+          <p:nvSpPr>
+            <p:cNvPr id="10" name="圆角矩形 9"/>
+            <p:cNvSpPr/>
+            <p:nvPr/>
+          </p:nvSpPr>
+          <p:spPr>
+            <a:xfrm>
+              <a:off x="5206787" y="673335"/>
+              <a:ext cx="432000" cy="360000"/>
+            </a:xfrm>
+            <a:prstGeom prst="roundRect">
+              <a:avLst/>
+            </a:prstGeom>
+            <a:noFill/>
+            <a:ln>
+              <a:solidFill>
+                <a:schemeClr val="tx1"/>
+              </a:solidFill>
+            </a:ln>
+          </p:spPr>
+          <p:style>
+            <a:lnRef idx="2">
+              <a:schemeClr val="accent1">
+                <a:shade val="50000"/>
+              </a:schemeClr>
+            </a:lnRef>
+            <a:fillRef idx="1">
+              <a:schemeClr val="accent1"/>
+            </a:fillRef>
+            <a:effectRef idx="0">
+              <a:schemeClr val="accent1"/>
+            </a:effectRef>
+            <a:fontRef idx="minor">
+              <a:schemeClr val="lt1"/>
+            </a:fontRef>
+          </p:style>
+          <p:txBody>
+            <a:bodyPr rtlCol="0" anchor="ctr"/>
+            <a:lstStyle/>
+            <a:p>
+              <a:pPr algn="ctr"/>
+              <a:r>
+                <a:rPr kumimoji="1" lang="en-US" altLang="zh-CN">
+                  <a:solidFill>
+                    <a:schemeClr val="tx1"/>
+                  </a:solidFill>
+                  <a:latin typeface="Arial" charset="0"/>
+                  <a:ea typeface="Arial" charset="0"/>
+                  <a:cs typeface="Arial" charset="0"/>
+                </a:rPr>
+                <a:t>3</a:t>
+              </a:r>
+              <a:endParaRPr kumimoji="1" lang="zh-CN" altLang="en-US">
+                <a:solidFill>
+                  <a:schemeClr val="tx1"/>
+                </a:solidFill>
+                <a:latin typeface="Arial" charset="0"/>
+                <a:ea typeface="Arial" charset="0"/>
+                <a:cs typeface="Arial" charset="0"/>
+              </a:endParaRPr>
+            </a:p>
+          </p:txBody>
+        </p:sp>
+        <p:cxnSp>
+          <p:nvCxnSpPr>
+            <p:cNvPr id="13" name="直线箭头连接符 12"/>
+            <p:cNvCxnSpPr>
+              <a:stCxn id="7" idx="2"/>
+              <a:endCxn id="26" idx="0"/>
+            </p:cNvCxnSpPr>
+            <p:nvPr/>
+          </p:nvCxnSpPr>
+          <p:spPr>
+            <a:xfrm flipH="1">
+              <a:off x="1622584" y="1033335"/>
+              <a:ext cx="429561" cy="460616"/>
+            </a:xfrm>
+            <a:prstGeom prst="straightConnector1">
+              <a:avLst/>
+            </a:prstGeom>
+            <a:ln>
+              <a:solidFill>
+                <a:schemeClr val="tx1"/>
+              </a:solidFill>
+              <a:headEnd type="none" w="med" len="med"/>
+              <a:tailEnd type="arrow" w="med" len="med"/>
+            </a:ln>
+          </p:spPr>
+          <p:style>
+            <a:lnRef idx="1">
+              <a:schemeClr val="accent1"/>
+            </a:lnRef>
+            <a:fillRef idx="0">
+              <a:schemeClr val="accent1"/>
+            </a:fillRef>
+            <a:effectRef idx="0">
+              <a:schemeClr val="accent1"/>
+            </a:effectRef>
+            <a:fontRef idx="minor">
+              <a:schemeClr val="tx1"/>
+            </a:fontRef>
+          </p:style>
+        </p:cxnSp>
+        <p:cxnSp>
+          <p:nvCxnSpPr>
+            <p:cNvPr id="17" name="直线箭头连接符 16"/>
+            <p:cNvCxnSpPr>
+              <a:stCxn id="7" idx="2"/>
+              <a:endCxn id="27" idx="0"/>
+            </p:cNvCxnSpPr>
+            <p:nvPr/>
+          </p:nvCxnSpPr>
+          <p:spPr>
+            <a:xfrm>
+              <a:off x="2052145" y="1033335"/>
+              <a:ext cx="432000" cy="460616"/>
+            </a:xfrm>
+            <a:prstGeom prst="straightConnector1">
+              <a:avLst/>
+            </a:prstGeom>
+            <a:ln>
+              <a:solidFill>
+                <a:schemeClr val="tx1"/>
+              </a:solidFill>
+              <a:headEnd type="none" w="med" len="med"/>
+              <a:tailEnd type="arrow" w="med" len="med"/>
+            </a:ln>
+          </p:spPr>
+          <p:style>
+            <a:lnRef idx="1">
+              <a:schemeClr val="accent1"/>
+            </a:lnRef>
+            <a:fillRef idx="0">
+              <a:schemeClr val="accent1"/>
+            </a:fillRef>
+            <a:effectRef idx="0">
+              <a:schemeClr val="accent1"/>
+            </a:effectRef>
+            <a:fontRef idx="minor">
+              <a:schemeClr val="tx1"/>
+            </a:fontRef>
+          </p:style>
+        </p:cxnSp>
+        <p:sp>
+          <p:nvSpPr>
+            <p:cNvPr id="25" name="文本框 24"/>
+            <p:cNvSpPr txBox="1"/>
+            <p:nvPr/>
+          </p:nvSpPr>
+          <p:spPr>
+            <a:xfrm>
+              <a:off x="-36121" y="668669"/>
+              <a:ext cx="1107996" cy="369332"/>
+            </a:xfrm>
+            <a:prstGeom prst="rect">
+              <a:avLst/>
+            </a:prstGeom>
+            <a:noFill/>
+          </p:spPr>
+          <p:txBody>
+            <a:bodyPr wrap="none" rtlCol="0">
+              <a:spAutoFit/>
+            </a:bodyPr>
+            <a:lstStyle/>
+            <a:p>
+              <a:r>
+                <a:rPr kumimoji="1" lang="zh-CN" altLang="en-US">
+                  <a:latin typeface="Arial" charset="0"/>
+                  <a:ea typeface="Arial" charset="0"/>
+                  <a:cs typeface="Arial" charset="0"/>
+                </a:rPr>
+                <a:t>第一个数</a:t>
+              </a:r>
+            </a:p>
+          </p:txBody>
+        </p:sp>
+        <p:sp>
+          <p:nvSpPr>
+            <p:cNvPr id="26" name="圆角矩形 25"/>
+            <p:cNvSpPr/>
+            <p:nvPr/>
+          </p:nvSpPr>
+          <p:spPr>
+            <a:xfrm>
+              <a:off x="1406584" y="1493951"/>
+              <a:ext cx="432000" cy="360000"/>
+            </a:xfrm>
+            <a:prstGeom prst="roundRect">
+              <a:avLst/>
+            </a:prstGeom>
+            <a:noFill/>
+            <a:ln>
+              <a:solidFill>
+                <a:schemeClr val="tx1"/>
+              </a:solidFill>
+            </a:ln>
+          </p:spPr>
+          <p:style>
+            <a:lnRef idx="2">
+              <a:schemeClr val="accent1">
+                <a:shade val="50000"/>
+              </a:schemeClr>
+            </a:lnRef>
+            <a:fillRef idx="1">
+              <a:schemeClr val="accent1"/>
+            </a:fillRef>
+            <a:effectRef idx="0">
+              <a:schemeClr val="accent1"/>
+            </a:effectRef>
+            <a:fontRef idx="minor">
+              <a:schemeClr val="lt1"/>
+            </a:fontRef>
+          </p:style>
+          <p:txBody>
+            <a:bodyPr rtlCol="0" anchor="ctr"/>
+            <a:lstStyle/>
+            <a:p>
+              <a:pPr algn="ctr"/>
+              <a:r>
+                <a:rPr kumimoji="1" lang="en-US" altLang="zh-CN">
+                  <a:solidFill>
+                    <a:schemeClr val="tx1"/>
+                  </a:solidFill>
+                  <a:latin typeface="Arial" charset="0"/>
+                  <a:ea typeface="Arial" charset="0"/>
+                  <a:cs typeface="Arial" charset="0"/>
+                </a:rPr>
+                <a:t>2</a:t>
+              </a:r>
+              <a:endParaRPr kumimoji="1" lang="zh-CN" altLang="en-US">
+                <a:solidFill>
+                  <a:schemeClr val="tx1"/>
+                </a:solidFill>
+                <a:latin typeface="Arial" charset="0"/>
+                <a:ea typeface="Arial" charset="0"/>
+                <a:cs typeface="Arial" charset="0"/>
+              </a:endParaRPr>
+            </a:p>
+          </p:txBody>
+        </p:sp>
+        <p:sp>
+          <p:nvSpPr>
+            <p:cNvPr id="27" name="圆角矩形 26"/>
+            <p:cNvSpPr/>
+            <p:nvPr/>
+          </p:nvSpPr>
+          <p:spPr>
+            <a:xfrm>
+              <a:off x="2268145" y="1493951"/>
+              <a:ext cx="432000" cy="360000"/>
+            </a:xfrm>
+            <a:prstGeom prst="roundRect">
+              <a:avLst/>
+            </a:prstGeom>
+            <a:noFill/>
+            <a:ln>
+              <a:solidFill>
+                <a:schemeClr val="tx1"/>
+              </a:solidFill>
+            </a:ln>
+          </p:spPr>
+          <p:style>
+            <a:lnRef idx="2">
+              <a:schemeClr val="accent1">
+                <a:shade val="50000"/>
+              </a:schemeClr>
+            </a:lnRef>
+            <a:fillRef idx="1">
+              <a:schemeClr val="accent1"/>
+            </a:fillRef>
+            <a:effectRef idx="0">
+              <a:schemeClr val="accent1"/>
+            </a:effectRef>
+            <a:fontRef idx="minor">
+              <a:schemeClr val="lt1"/>
+            </a:fontRef>
+          </p:style>
+          <p:txBody>
+            <a:bodyPr rtlCol="0" anchor="ctr"/>
+            <a:lstStyle/>
+            <a:p>
+              <a:pPr algn="ctr"/>
+              <a:r>
+                <a:rPr kumimoji="1" lang="en-US" altLang="zh-CN">
+                  <a:solidFill>
+                    <a:schemeClr val="tx1"/>
+                  </a:solidFill>
+                  <a:latin typeface="Arial" charset="0"/>
+                  <a:ea typeface="Arial" charset="0"/>
+                  <a:cs typeface="Arial" charset="0"/>
+                </a:rPr>
+                <a:t>3</a:t>
+              </a:r>
+              <a:endParaRPr kumimoji="1" lang="zh-CN" altLang="en-US">
+                <a:solidFill>
+                  <a:schemeClr val="tx1"/>
+                </a:solidFill>
+                <a:latin typeface="Arial" charset="0"/>
+                <a:ea typeface="Arial" charset="0"/>
+                <a:cs typeface="Arial" charset="0"/>
+              </a:endParaRPr>
+            </a:p>
+          </p:txBody>
+        </p:sp>
+        <p:sp>
+          <p:nvSpPr>
+            <p:cNvPr id="28" name="圆角矩形 27"/>
+            <p:cNvSpPr/>
+            <p:nvPr/>
+          </p:nvSpPr>
+          <p:spPr>
+            <a:xfrm>
+              <a:off x="3063032" y="1493951"/>
+              <a:ext cx="432000" cy="360000"/>
+            </a:xfrm>
+            <a:prstGeom prst="roundRect">
+              <a:avLst/>
+            </a:prstGeom>
+            <a:noFill/>
+            <a:ln>
+              <a:solidFill>
+                <a:schemeClr val="tx1"/>
+              </a:solidFill>
+            </a:ln>
+          </p:spPr>
+          <p:style>
+            <a:lnRef idx="2">
+              <a:schemeClr val="accent1">
+                <a:shade val="50000"/>
+              </a:schemeClr>
+            </a:lnRef>
+            <a:fillRef idx="1">
+              <a:schemeClr val="accent1"/>
+            </a:fillRef>
+            <a:effectRef idx="0">
+              <a:schemeClr val="accent1"/>
+            </a:effectRef>
+            <a:fontRef idx="minor">
+              <a:schemeClr val="lt1"/>
+            </a:fontRef>
+          </p:style>
+          <p:txBody>
+            <a:bodyPr rtlCol="0" anchor="ctr"/>
+            <a:lstStyle/>
+            <a:p>
+              <a:pPr algn="ctr"/>
+              <a:r>
+                <a:rPr kumimoji="1" lang="en-US" altLang="zh-CN">
+                  <a:solidFill>
+                    <a:schemeClr val="tx1"/>
+                  </a:solidFill>
+                  <a:latin typeface="Arial" charset="0"/>
+                  <a:ea typeface="Arial" charset="0"/>
+                  <a:cs typeface="Arial" charset="0"/>
+                </a:rPr>
+                <a:t>1</a:t>
+              </a:r>
+              <a:endParaRPr kumimoji="1" lang="zh-CN" altLang="en-US">
+                <a:solidFill>
+                  <a:schemeClr val="tx1"/>
+                </a:solidFill>
+                <a:latin typeface="Arial" charset="0"/>
+                <a:ea typeface="Arial" charset="0"/>
+                <a:cs typeface="Arial" charset="0"/>
+              </a:endParaRPr>
+            </a:p>
+          </p:txBody>
+        </p:sp>
+        <p:sp>
+          <p:nvSpPr>
+            <p:cNvPr id="29" name="圆角矩形 28"/>
+            <p:cNvSpPr/>
+            <p:nvPr/>
+          </p:nvSpPr>
+          <p:spPr>
+            <a:xfrm>
+              <a:off x="3927032" y="1493951"/>
+              <a:ext cx="432000" cy="360000"/>
+            </a:xfrm>
+            <a:prstGeom prst="roundRect">
+              <a:avLst/>
+            </a:prstGeom>
+            <a:noFill/>
+            <a:ln>
+              <a:solidFill>
+                <a:schemeClr val="tx1"/>
+              </a:solidFill>
+            </a:ln>
+          </p:spPr>
+          <p:style>
+            <a:lnRef idx="2">
+              <a:schemeClr val="accent1">
+                <a:shade val="50000"/>
+              </a:schemeClr>
+            </a:lnRef>
+            <a:fillRef idx="1">
+              <a:schemeClr val="accent1"/>
+            </a:fillRef>
+            <a:effectRef idx="0">
+              <a:schemeClr val="accent1"/>
+            </a:effectRef>
+            <a:fontRef idx="minor">
+              <a:schemeClr val="lt1"/>
+            </a:fontRef>
+          </p:style>
+          <p:txBody>
+            <a:bodyPr rtlCol="0" anchor="ctr"/>
+            <a:lstStyle/>
+            <a:p>
+              <a:pPr algn="ctr"/>
+              <a:r>
+                <a:rPr kumimoji="1" lang="en-US" altLang="zh-CN">
+                  <a:solidFill>
+                    <a:schemeClr val="tx1"/>
+                  </a:solidFill>
+                  <a:latin typeface="Arial" charset="0"/>
+                  <a:ea typeface="Arial" charset="0"/>
+                  <a:cs typeface="Arial" charset="0"/>
+                </a:rPr>
+                <a:t>3</a:t>
+              </a:r>
+              <a:endParaRPr kumimoji="1" lang="zh-CN" altLang="en-US">
+                <a:solidFill>
+                  <a:schemeClr val="tx1"/>
+                </a:solidFill>
+                <a:latin typeface="Arial" charset="0"/>
+                <a:ea typeface="Arial" charset="0"/>
+                <a:cs typeface="Arial" charset="0"/>
+              </a:endParaRPr>
+            </a:p>
+          </p:txBody>
+        </p:sp>
+        <p:sp>
+          <p:nvSpPr>
+            <p:cNvPr id="30" name="圆角矩形 29"/>
+            <p:cNvSpPr/>
+            <p:nvPr/>
+          </p:nvSpPr>
+          <p:spPr>
+            <a:xfrm>
+              <a:off x="4774787" y="1493951"/>
+              <a:ext cx="432000" cy="360000"/>
+            </a:xfrm>
+            <a:prstGeom prst="roundRect">
+              <a:avLst/>
+            </a:prstGeom>
+            <a:noFill/>
+            <a:ln>
+              <a:solidFill>
+                <a:schemeClr val="tx1"/>
+              </a:solidFill>
+            </a:ln>
+          </p:spPr>
+          <p:style>
+            <a:lnRef idx="2">
+              <a:schemeClr val="accent1">
+                <a:shade val="50000"/>
+              </a:schemeClr>
+            </a:lnRef>
+            <a:fillRef idx="1">
+              <a:schemeClr val="accent1"/>
+            </a:fillRef>
+            <a:effectRef idx="0">
+              <a:schemeClr val="accent1"/>
+            </a:effectRef>
+            <a:fontRef idx="minor">
+              <a:schemeClr val="lt1"/>
+            </a:fontRef>
+          </p:style>
+          <p:txBody>
+            <a:bodyPr rtlCol="0" anchor="ctr"/>
+            <a:lstStyle/>
+            <a:p>
+              <a:pPr algn="ctr"/>
+              <a:r>
+                <a:rPr kumimoji="1" lang="en-US" altLang="zh-CN">
+                  <a:solidFill>
+                    <a:schemeClr val="tx1"/>
+                  </a:solidFill>
+                  <a:latin typeface="Arial" charset="0"/>
+                  <a:ea typeface="Arial" charset="0"/>
+                  <a:cs typeface="Arial" charset="0"/>
+                </a:rPr>
+                <a:t>2</a:t>
+              </a:r>
+              <a:endParaRPr kumimoji="1" lang="zh-CN" altLang="en-US">
+                <a:solidFill>
+                  <a:schemeClr val="tx1"/>
+                </a:solidFill>
+                <a:latin typeface="Arial" charset="0"/>
+                <a:ea typeface="Arial" charset="0"/>
+                <a:cs typeface="Arial" charset="0"/>
+              </a:endParaRPr>
+            </a:p>
+          </p:txBody>
+        </p:sp>
+        <p:sp>
+          <p:nvSpPr>
+            <p:cNvPr id="31" name="圆角矩形 30"/>
+            <p:cNvSpPr/>
+            <p:nvPr/>
+          </p:nvSpPr>
+          <p:spPr>
+            <a:xfrm>
+              <a:off x="5638787" y="1493951"/>
+              <a:ext cx="432000" cy="360000"/>
+            </a:xfrm>
+            <a:prstGeom prst="roundRect">
+              <a:avLst/>
+            </a:prstGeom>
+            <a:noFill/>
+            <a:ln>
+              <a:solidFill>
+                <a:schemeClr val="tx1"/>
+              </a:solidFill>
+            </a:ln>
+          </p:spPr>
+          <p:style>
+            <a:lnRef idx="2">
+              <a:schemeClr val="accent1">
+                <a:shade val="50000"/>
+              </a:schemeClr>
+            </a:lnRef>
+            <a:fillRef idx="1">
+              <a:schemeClr val="accent1"/>
+            </a:fillRef>
+            <a:effectRef idx="0">
+              <a:schemeClr val="accent1"/>
+            </a:effectRef>
+            <a:fontRef idx="minor">
+              <a:schemeClr val="lt1"/>
+            </a:fontRef>
+          </p:style>
+          <p:txBody>
+            <a:bodyPr rtlCol="0" anchor="ctr"/>
+            <a:lstStyle/>
+            <a:p>
+              <a:pPr algn="ctr"/>
+              <a:r>
+                <a:rPr kumimoji="1" lang="en-US" altLang="zh-CN">
+                  <a:solidFill>
+                    <a:schemeClr val="tx1"/>
+                  </a:solidFill>
+                  <a:latin typeface="Arial" charset="0"/>
+                  <a:ea typeface="Arial" charset="0"/>
+                  <a:cs typeface="Arial" charset="0"/>
+                </a:rPr>
+                <a:t>1</a:t>
+              </a:r>
+              <a:endParaRPr kumimoji="1" lang="zh-CN" altLang="en-US">
+                <a:solidFill>
+                  <a:schemeClr val="tx1"/>
+                </a:solidFill>
+                <a:latin typeface="Arial" charset="0"/>
+                <a:ea typeface="Arial" charset="0"/>
+                <a:cs typeface="Arial" charset="0"/>
+              </a:endParaRPr>
+            </a:p>
+          </p:txBody>
+        </p:sp>
+        <p:sp>
+          <p:nvSpPr>
+            <p:cNvPr id="32" name="文本框 31"/>
+            <p:cNvSpPr txBox="1"/>
+            <p:nvPr/>
+          </p:nvSpPr>
+          <p:spPr>
+            <a:xfrm>
+              <a:off x="-36121" y="1493951"/>
+              <a:ext cx="1107996" cy="369332"/>
+            </a:xfrm>
+            <a:prstGeom prst="rect">
+              <a:avLst/>
+            </a:prstGeom>
+            <a:noFill/>
+          </p:spPr>
+          <p:txBody>
+            <a:bodyPr wrap="none" rtlCol="0">
+              <a:spAutoFit/>
+            </a:bodyPr>
+            <a:lstStyle/>
+            <a:p>
+              <a:r>
+                <a:rPr kumimoji="1" lang="zh-CN" altLang="en-US">
+                  <a:latin typeface="Arial" charset="0"/>
+                  <a:ea typeface="Arial" charset="0"/>
+                  <a:cs typeface="Arial" charset="0"/>
+                </a:rPr>
+                <a:t>第二个数</a:t>
+              </a:r>
+            </a:p>
+          </p:txBody>
+        </p:sp>
+        <p:sp>
+          <p:nvSpPr>
+            <p:cNvPr id="33" name="文本框 32"/>
+            <p:cNvSpPr txBox="1"/>
+            <p:nvPr/>
+          </p:nvSpPr>
+          <p:spPr>
+            <a:xfrm>
+              <a:off x="-36121" y="2354718"/>
+              <a:ext cx="1107996" cy="369332"/>
+            </a:xfrm>
+            <a:prstGeom prst="rect">
+              <a:avLst/>
+            </a:prstGeom>
+            <a:noFill/>
+          </p:spPr>
+          <p:txBody>
+            <a:bodyPr wrap="none" rtlCol="0">
+              <a:spAutoFit/>
+            </a:bodyPr>
+            <a:lstStyle/>
+            <a:p>
+              <a:r>
+                <a:rPr kumimoji="1" lang="zh-CN" altLang="en-US">
+                  <a:latin typeface="Arial" charset="0"/>
+                  <a:ea typeface="Arial" charset="0"/>
+                  <a:cs typeface="Arial" charset="0"/>
+                </a:rPr>
+                <a:t>第三个数</a:t>
+              </a:r>
+            </a:p>
+          </p:txBody>
+        </p:sp>
+        <p:sp>
+          <p:nvSpPr>
+            <p:cNvPr id="38" name="圆角矩形 37"/>
+            <p:cNvSpPr/>
+            <p:nvPr/>
+          </p:nvSpPr>
+          <p:spPr>
+            <a:xfrm>
+              <a:off x="1406584" y="2364050"/>
+              <a:ext cx="432000" cy="360000"/>
+            </a:xfrm>
+            <a:prstGeom prst="roundRect">
+              <a:avLst/>
+            </a:prstGeom>
+            <a:noFill/>
+            <a:ln>
+              <a:solidFill>
+                <a:schemeClr val="tx1"/>
+              </a:solidFill>
+            </a:ln>
+          </p:spPr>
+          <p:style>
+            <a:lnRef idx="2">
+              <a:schemeClr val="accent1">
+                <a:shade val="50000"/>
+              </a:schemeClr>
+            </a:lnRef>
+            <a:fillRef idx="1">
+              <a:schemeClr val="accent1"/>
+            </a:fillRef>
+            <a:effectRef idx="0">
+              <a:schemeClr val="accent1"/>
+            </a:effectRef>
+            <a:fontRef idx="minor">
+              <a:schemeClr val="lt1"/>
+            </a:fontRef>
+          </p:style>
+          <p:txBody>
+            <a:bodyPr rtlCol="0" anchor="ctr"/>
+            <a:lstStyle/>
+            <a:p>
+              <a:pPr algn="ctr"/>
+              <a:r>
+                <a:rPr kumimoji="1" lang="en-US" altLang="zh-CN">
+                  <a:solidFill>
+                    <a:schemeClr val="tx1"/>
+                  </a:solidFill>
+                  <a:latin typeface="Arial" charset="0"/>
+                  <a:ea typeface="Arial" charset="0"/>
+                  <a:cs typeface="Arial" charset="0"/>
+                </a:rPr>
+                <a:t>3</a:t>
+              </a:r>
+              <a:endParaRPr kumimoji="1" lang="zh-CN" altLang="en-US">
+                <a:solidFill>
+                  <a:schemeClr val="tx1"/>
+                </a:solidFill>
+                <a:latin typeface="Arial" charset="0"/>
+                <a:ea typeface="Arial" charset="0"/>
+                <a:cs typeface="Arial" charset="0"/>
+              </a:endParaRPr>
+            </a:p>
+          </p:txBody>
+        </p:sp>
+        <p:sp>
+          <p:nvSpPr>
+            <p:cNvPr id="39" name="圆角矩形 38"/>
+            <p:cNvSpPr/>
+            <p:nvPr/>
+          </p:nvSpPr>
+          <p:spPr>
+            <a:xfrm>
+              <a:off x="2268145" y="2364050"/>
+              <a:ext cx="432000" cy="360000"/>
+            </a:xfrm>
+            <a:prstGeom prst="roundRect">
+              <a:avLst/>
+            </a:prstGeom>
+            <a:noFill/>
+            <a:ln>
+              <a:solidFill>
+                <a:schemeClr val="tx1"/>
+              </a:solidFill>
+            </a:ln>
+          </p:spPr>
+          <p:style>
+            <a:lnRef idx="2">
+              <a:schemeClr val="accent1">
+                <a:shade val="50000"/>
+              </a:schemeClr>
+            </a:lnRef>
+            <a:fillRef idx="1">
+              <a:schemeClr val="accent1"/>
+            </a:fillRef>
+            <a:effectRef idx="0">
+              <a:schemeClr val="accent1"/>
+            </a:effectRef>
+            <a:fontRef idx="minor">
+              <a:schemeClr val="lt1"/>
+            </a:fontRef>
+          </p:style>
+          <p:txBody>
+            <a:bodyPr rtlCol="0" anchor="ctr"/>
+            <a:lstStyle/>
+            <a:p>
+              <a:pPr algn="ctr"/>
+              <a:r>
+                <a:rPr kumimoji="1" lang="en-US" altLang="zh-CN">
+                  <a:solidFill>
+                    <a:schemeClr val="tx1"/>
+                  </a:solidFill>
+                  <a:latin typeface="Arial" charset="0"/>
+                  <a:ea typeface="Arial" charset="0"/>
+                  <a:cs typeface="Arial" charset="0"/>
+                </a:rPr>
+                <a:t>2</a:t>
+              </a:r>
+              <a:endParaRPr kumimoji="1" lang="zh-CN" altLang="en-US">
+                <a:solidFill>
+                  <a:schemeClr val="tx1"/>
+                </a:solidFill>
+                <a:latin typeface="Arial" charset="0"/>
+                <a:ea typeface="Arial" charset="0"/>
+                <a:cs typeface="Arial" charset="0"/>
+              </a:endParaRPr>
+            </a:p>
+          </p:txBody>
+        </p:sp>
+        <p:sp>
+          <p:nvSpPr>
+            <p:cNvPr id="40" name="圆角矩形 39"/>
+            <p:cNvSpPr/>
+            <p:nvPr/>
+          </p:nvSpPr>
+          <p:spPr>
+            <a:xfrm>
+              <a:off x="3058495" y="2364050"/>
+              <a:ext cx="432000" cy="360000"/>
+            </a:xfrm>
+            <a:prstGeom prst="roundRect">
+              <a:avLst/>
+            </a:prstGeom>
+            <a:noFill/>
+            <a:ln>
+              <a:solidFill>
+                <a:schemeClr val="tx1"/>
+              </a:solidFill>
+            </a:ln>
+          </p:spPr>
+          <p:style>
+            <a:lnRef idx="2">
+              <a:schemeClr val="accent1">
+                <a:shade val="50000"/>
+              </a:schemeClr>
+            </a:lnRef>
+            <a:fillRef idx="1">
+              <a:schemeClr val="accent1"/>
+            </a:fillRef>
+            <a:effectRef idx="0">
+              <a:schemeClr val="accent1"/>
+            </a:effectRef>
+            <a:fontRef idx="minor">
+              <a:schemeClr val="lt1"/>
+            </a:fontRef>
+          </p:style>
+          <p:txBody>
+            <a:bodyPr rtlCol="0" anchor="ctr"/>
+            <a:lstStyle/>
+            <a:p>
+              <a:pPr algn="ctr"/>
+              <a:r>
+                <a:rPr kumimoji="1" lang="en-US" altLang="zh-CN">
+                  <a:solidFill>
+                    <a:schemeClr val="tx1"/>
+                  </a:solidFill>
+                  <a:latin typeface="Arial" charset="0"/>
+                  <a:ea typeface="Arial" charset="0"/>
+                  <a:cs typeface="Arial" charset="0"/>
+                </a:rPr>
+                <a:t>3</a:t>
+              </a:r>
+              <a:endParaRPr kumimoji="1" lang="zh-CN" altLang="en-US">
+                <a:solidFill>
+                  <a:schemeClr val="tx1"/>
+                </a:solidFill>
+                <a:latin typeface="Arial" charset="0"/>
+                <a:ea typeface="Arial" charset="0"/>
+                <a:cs typeface="Arial" charset="0"/>
+              </a:endParaRPr>
+            </a:p>
+          </p:txBody>
+        </p:sp>
+        <p:sp>
+          <p:nvSpPr>
+            <p:cNvPr id="41" name="圆角矩形 40"/>
+            <p:cNvSpPr/>
+            <p:nvPr/>
+          </p:nvSpPr>
+          <p:spPr>
+            <a:xfrm>
+              <a:off x="3927032" y="2359384"/>
+              <a:ext cx="432000" cy="360000"/>
+            </a:xfrm>
+            <a:prstGeom prst="roundRect">
+              <a:avLst/>
+            </a:prstGeom>
+            <a:noFill/>
+            <a:ln>
+              <a:solidFill>
+                <a:schemeClr val="tx1"/>
+              </a:solidFill>
+            </a:ln>
+          </p:spPr>
+          <p:style>
+            <a:lnRef idx="2">
+              <a:schemeClr val="accent1">
+                <a:shade val="50000"/>
+              </a:schemeClr>
+            </a:lnRef>
+            <a:fillRef idx="1">
+              <a:schemeClr val="accent1"/>
+            </a:fillRef>
+            <a:effectRef idx="0">
+              <a:schemeClr val="accent1"/>
+            </a:effectRef>
+            <a:fontRef idx="minor">
+              <a:schemeClr val="lt1"/>
+            </a:fontRef>
+          </p:style>
+          <p:txBody>
+            <a:bodyPr rtlCol="0" anchor="ctr"/>
+            <a:lstStyle/>
+            <a:p>
+              <a:pPr algn="ctr"/>
+              <a:r>
+                <a:rPr kumimoji="1" lang="en-US" altLang="zh-CN">
+                  <a:solidFill>
+                    <a:schemeClr val="tx1"/>
+                  </a:solidFill>
+                  <a:latin typeface="Arial" charset="0"/>
+                  <a:ea typeface="Arial" charset="0"/>
+                  <a:cs typeface="Arial" charset="0"/>
+                </a:rPr>
+                <a:t>1</a:t>
+              </a:r>
+              <a:endParaRPr kumimoji="1" lang="zh-CN" altLang="en-US">
+                <a:solidFill>
+                  <a:schemeClr val="tx1"/>
+                </a:solidFill>
+                <a:latin typeface="Arial" charset="0"/>
+                <a:ea typeface="Arial" charset="0"/>
+                <a:cs typeface="Arial" charset="0"/>
+              </a:endParaRPr>
+            </a:p>
+          </p:txBody>
+        </p:sp>
+        <p:sp>
+          <p:nvSpPr>
+            <p:cNvPr id="42" name="圆角矩形 41"/>
+            <p:cNvSpPr/>
+            <p:nvPr/>
+          </p:nvSpPr>
+          <p:spPr>
+            <a:xfrm>
+              <a:off x="4774787" y="2364050"/>
+              <a:ext cx="432000" cy="360000"/>
+            </a:xfrm>
+            <a:prstGeom prst="roundRect">
+              <a:avLst/>
+            </a:prstGeom>
+            <a:noFill/>
+            <a:ln>
+              <a:solidFill>
+                <a:schemeClr val="tx1"/>
+              </a:solidFill>
+            </a:ln>
+          </p:spPr>
+          <p:style>
+            <a:lnRef idx="2">
+              <a:schemeClr val="accent1">
+                <a:shade val="50000"/>
+              </a:schemeClr>
+            </a:lnRef>
+            <a:fillRef idx="1">
+              <a:schemeClr val="accent1"/>
+            </a:fillRef>
+            <a:effectRef idx="0">
+              <a:schemeClr val="accent1"/>
+            </a:effectRef>
+            <a:fontRef idx="minor">
+              <a:schemeClr val="lt1"/>
+            </a:fontRef>
+          </p:style>
+          <p:txBody>
+            <a:bodyPr rtlCol="0" anchor="ctr"/>
+            <a:lstStyle/>
+            <a:p>
+              <a:pPr algn="ctr"/>
+              <a:r>
+                <a:rPr kumimoji="1" lang="en-US" altLang="zh-CN">
+                  <a:solidFill>
+                    <a:schemeClr val="tx1"/>
+                  </a:solidFill>
+                  <a:latin typeface="Arial" charset="0"/>
+                  <a:ea typeface="Arial" charset="0"/>
+                  <a:cs typeface="Arial" charset="0"/>
+                </a:rPr>
+                <a:t>1</a:t>
+              </a:r>
+              <a:endParaRPr kumimoji="1" lang="zh-CN" altLang="en-US">
+                <a:solidFill>
+                  <a:schemeClr val="tx1"/>
+                </a:solidFill>
+                <a:latin typeface="Arial" charset="0"/>
+                <a:ea typeface="Arial" charset="0"/>
+                <a:cs typeface="Arial" charset="0"/>
+              </a:endParaRPr>
+            </a:p>
+          </p:txBody>
+        </p:sp>
+        <p:sp>
+          <p:nvSpPr>
+            <p:cNvPr id="43" name="圆角矩形 42"/>
+            <p:cNvSpPr/>
+            <p:nvPr/>
+          </p:nvSpPr>
+          <p:spPr>
+            <a:xfrm>
+              <a:off x="5638787" y="2359384"/>
+              <a:ext cx="432000" cy="360000"/>
+            </a:xfrm>
+            <a:prstGeom prst="roundRect">
+              <a:avLst/>
+            </a:prstGeom>
+            <a:noFill/>
+            <a:ln>
+              <a:solidFill>
+                <a:schemeClr val="tx1"/>
+              </a:solidFill>
+            </a:ln>
+          </p:spPr>
+          <p:style>
+            <a:lnRef idx="2">
+              <a:schemeClr val="accent1">
+                <a:shade val="50000"/>
+              </a:schemeClr>
+            </a:lnRef>
+            <a:fillRef idx="1">
+              <a:schemeClr val="accent1"/>
+            </a:fillRef>
+            <a:effectRef idx="0">
+              <a:schemeClr val="accent1"/>
+            </a:effectRef>
+            <a:fontRef idx="minor">
+              <a:schemeClr val="lt1"/>
+            </a:fontRef>
+          </p:style>
+          <p:txBody>
+            <a:bodyPr rtlCol="0" anchor="ctr"/>
+            <a:lstStyle/>
+            <a:p>
+              <a:pPr algn="ctr"/>
+              <a:r>
+                <a:rPr kumimoji="1" lang="en-US" altLang="zh-CN">
+                  <a:solidFill>
+                    <a:schemeClr val="tx1"/>
+                  </a:solidFill>
+                  <a:latin typeface="Arial" charset="0"/>
+                  <a:ea typeface="Arial" charset="0"/>
+                  <a:cs typeface="Arial" charset="0"/>
+                </a:rPr>
+                <a:t>2</a:t>
+              </a:r>
+              <a:endParaRPr kumimoji="1" lang="zh-CN" altLang="en-US">
+                <a:solidFill>
+                  <a:schemeClr val="tx1"/>
+                </a:solidFill>
+                <a:latin typeface="Arial" charset="0"/>
+                <a:ea typeface="Arial" charset="0"/>
+                <a:cs typeface="Arial" charset="0"/>
+              </a:endParaRPr>
+            </a:p>
+          </p:txBody>
+        </p:sp>
+        <p:cxnSp>
+          <p:nvCxnSpPr>
+            <p:cNvPr id="44" name="直线箭头连接符 43"/>
+            <p:cNvCxnSpPr>
+              <a:stCxn id="26" idx="2"/>
+              <a:endCxn id="38" idx="0"/>
+            </p:cNvCxnSpPr>
+            <p:nvPr/>
+          </p:nvCxnSpPr>
+          <p:spPr>
+            <a:xfrm>
+              <a:off x="1622584" y="1853951"/>
+              <a:ext cx="0" cy="510099"/>
+            </a:xfrm>
+            <a:prstGeom prst="straightConnector1">
+              <a:avLst/>
+            </a:prstGeom>
+            <a:ln>
+              <a:solidFill>
+                <a:schemeClr val="tx1"/>
+              </a:solidFill>
+              <a:headEnd type="none" w="med" len="med"/>
+              <a:tailEnd type="arrow" w="med" len="med"/>
+            </a:ln>
+          </p:spPr>
+          <p:style>
+            <a:lnRef idx="1">
+              <a:schemeClr val="accent1"/>
+            </a:lnRef>
+            <a:fillRef idx="0">
+              <a:schemeClr val="accent1"/>
+            </a:fillRef>
+            <a:effectRef idx="0">
+              <a:schemeClr val="accent1"/>
+            </a:effectRef>
+            <a:fontRef idx="minor">
+              <a:schemeClr val="tx1"/>
+            </a:fontRef>
+          </p:style>
+        </p:cxnSp>
+        <p:cxnSp>
+          <p:nvCxnSpPr>
+            <p:cNvPr id="47" name="直线箭头连接符 46"/>
+            <p:cNvCxnSpPr>
+              <a:stCxn id="27" idx="2"/>
+              <a:endCxn id="39" idx="0"/>
+            </p:cNvCxnSpPr>
+            <p:nvPr/>
+          </p:nvCxnSpPr>
+          <p:spPr>
+            <a:xfrm>
+              <a:off x="2484145" y="1853951"/>
+              <a:ext cx="0" cy="510099"/>
+            </a:xfrm>
+            <a:prstGeom prst="straightConnector1">
+              <a:avLst/>
+            </a:prstGeom>
+            <a:ln>
+              <a:solidFill>
+                <a:schemeClr val="tx1"/>
+              </a:solidFill>
+              <a:headEnd type="none" w="med" len="med"/>
+              <a:tailEnd type="arrow" w="med" len="med"/>
+            </a:ln>
+          </p:spPr>
+          <p:style>
+            <a:lnRef idx="1">
+              <a:schemeClr val="accent1"/>
+            </a:lnRef>
+            <a:fillRef idx="0">
+              <a:schemeClr val="accent1"/>
+            </a:fillRef>
+            <a:effectRef idx="0">
+              <a:schemeClr val="accent1"/>
+            </a:effectRef>
+            <a:fontRef idx="minor">
+              <a:schemeClr val="tx1"/>
+            </a:fontRef>
+          </p:style>
+        </p:cxnSp>
+        <p:cxnSp>
+          <p:nvCxnSpPr>
+            <p:cNvPr id="50" name="直线箭头连接符 49"/>
+            <p:cNvCxnSpPr>
+              <a:stCxn id="9" idx="2"/>
+              <a:endCxn id="28" idx="0"/>
+            </p:cNvCxnSpPr>
+            <p:nvPr/>
+          </p:nvCxnSpPr>
+          <p:spPr>
+            <a:xfrm flipH="1">
+              <a:off x="3279032" y="1033335"/>
+              <a:ext cx="432000" cy="460616"/>
+            </a:xfrm>
+            <a:prstGeom prst="straightConnector1">
+              <a:avLst/>
+            </a:prstGeom>
+            <a:ln>
+              <a:solidFill>
+                <a:schemeClr val="tx1"/>
+              </a:solidFill>
+              <a:headEnd type="none" w="med" len="med"/>
+              <a:tailEnd type="arrow" w="med" len="med"/>
+            </a:ln>
+          </p:spPr>
+          <p:style>
+            <a:lnRef idx="1">
+              <a:schemeClr val="accent1"/>
+            </a:lnRef>
+            <a:fillRef idx="0">
+              <a:schemeClr val="accent1"/>
+            </a:fillRef>
+            <a:effectRef idx="0">
+              <a:schemeClr val="accent1"/>
+            </a:effectRef>
+            <a:fontRef idx="minor">
+              <a:schemeClr val="tx1"/>
+            </a:fontRef>
+          </p:style>
+        </p:cxnSp>
+        <p:cxnSp>
+          <p:nvCxnSpPr>
+            <p:cNvPr id="53" name="直线箭头连接符 52"/>
+            <p:cNvCxnSpPr>
+              <a:stCxn id="28" idx="2"/>
+              <a:endCxn id="40" idx="0"/>
+            </p:cNvCxnSpPr>
+            <p:nvPr/>
+          </p:nvCxnSpPr>
+          <p:spPr>
+            <a:xfrm flipH="1">
+              <a:off x="3274495" y="1853951"/>
+              <a:ext cx="4537" cy="510099"/>
+            </a:xfrm>
+            <a:prstGeom prst="straightConnector1">
+              <a:avLst/>
+            </a:prstGeom>
+            <a:ln>
+              <a:solidFill>
+                <a:schemeClr val="tx1"/>
+              </a:solidFill>
+              <a:headEnd type="none" w="med" len="med"/>
+              <a:tailEnd type="arrow" w="med" len="med"/>
+            </a:ln>
+          </p:spPr>
+          <p:style>
+            <a:lnRef idx="1">
+              <a:schemeClr val="accent1"/>
+            </a:lnRef>
+            <a:fillRef idx="0">
+              <a:schemeClr val="accent1"/>
+            </a:fillRef>
+            <a:effectRef idx="0">
+              <a:schemeClr val="accent1"/>
+            </a:effectRef>
+            <a:fontRef idx="minor">
+              <a:schemeClr val="tx1"/>
+            </a:fontRef>
+          </p:style>
+        </p:cxnSp>
+        <p:cxnSp>
+          <p:nvCxnSpPr>
+            <p:cNvPr id="56" name="直线箭头连接符 55"/>
+            <p:cNvCxnSpPr>
+              <a:stCxn id="9" idx="2"/>
+              <a:endCxn id="29" idx="0"/>
+            </p:cNvCxnSpPr>
+            <p:nvPr/>
+          </p:nvCxnSpPr>
+          <p:spPr>
+            <a:xfrm>
+              <a:off x="3711032" y="1033335"/>
+              <a:ext cx="432000" cy="460616"/>
+            </a:xfrm>
+            <a:prstGeom prst="straightConnector1">
+              <a:avLst/>
+            </a:prstGeom>
+            <a:ln>
+              <a:solidFill>
+                <a:schemeClr val="tx1"/>
+              </a:solidFill>
+              <a:headEnd type="none" w="med" len="med"/>
+              <a:tailEnd type="arrow" w="med" len="med"/>
+            </a:ln>
+          </p:spPr>
+          <p:style>
+            <a:lnRef idx="1">
+              <a:schemeClr val="accent1"/>
+            </a:lnRef>
+            <a:fillRef idx="0">
+              <a:schemeClr val="accent1"/>
+            </a:fillRef>
+            <a:effectRef idx="0">
+              <a:schemeClr val="accent1"/>
+            </a:effectRef>
+            <a:fontRef idx="minor">
+              <a:schemeClr val="tx1"/>
+            </a:fontRef>
+          </p:style>
+        </p:cxnSp>
+        <p:cxnSp>
+          <p:nvCxnSpPr>
+            <p:cNvPr id="59" name="直线箭头连接符 58"/>
+            <p:cNvCxnSpPr>
+              <a:stCxn id="29" idx="2"/>
+              <a:endCxn id="41" idx="0"/>
+            </p:cNvCxnSpPr>
+            <p:nvPr/>
+          </p:nvCxnSpPr>
+          <p:spPr>
+            <a:xfrm>
+              <a:off x="4143032" y="1853951"/>
+              <a:ext cx="0" cy="505433"/>
+            </a:xfrm>
+            <a:prstGeom prst="straightConnector1">
+              <a:avLst/>
+            </a:prstGeom>
+            <a:ln>
+              <a:solidFill>
+                <a:schemeClr val="tx1"/>
+              </a:solidFill>
+              <a:headEnd type="none" w="med" len="med"/>
+              <a:tailEnd type="arrow" w="med" len="med"/>
+            </a:ln>
+          </p:spPr>
+          <p:style>
+            <a:lnRef idx="1">
+              <a:schemeClr val="accent1"/>
+            </a:lnRef>
+            <a:fillRef idx="0">
+              <a:schemeClr val="accent1"/>
+            </a:fillRef>
+            <a:effectRef idx="0">
+              <a:schemeClr val="accent1"/>
+            </a:effectRef>
+            <a:fontRef idx="minor">
+              <a:schemeClr val="tx1"/>
+            </a:fontRef>
+          </p:style>
+        </p:cxnSp>
+        <p:cxnSp>
+          <p:nvCxnSpPr>
+            <p:cNvPr id="64" name="直线箭头连接符 63"/>
+            <p:cNvCxnSpPr>
+              <a:stCxn id="10" idx="2"/>
+              <a:endCxn id="30" idx="0"/>
+            </p:cNvCxnSpPr>
+            <p:nvPr/>
+          </p:nvCxnSpPr>
+          <p:spPr>
+            <a:xfrm flipH="1">
+              <a:off x="4990787" y="1033335"/>
+              <a:ext cx="432000" cy="460616"/>
+            </a:xfrm>
+            <a:prstGeom prst="straightConnector1">
+              <a:avLst/>
+            </a:prstGeom>
+            <a:ln>
+              <a:solidFill>
+                <a:schemeClr val="tx1"/>
+              </a:solidFill>
+              <a:headEnd type="none" w="med" len="med"/>
+              <a:tailEnd type="arrow" w="med" len="med"/>
+            </a:ln>
+          </p:spPr>
+          <p:style>
+            <a:lnRef idx="1">
+              <a:schemeClr val="accent1"/>
+            </a:lnRef>
+            <a:fillRef idx="0">
+              <a:schemeClr val="accent1"/>
+            </a:fillRef>
+            <a:effectRef idx="0">
+              <a:schemeClr val="accent1"/>
+            </a:effectRef>
+            <a:fontRef idx="minor">
+              <a:schemeClr val="tx1"/>
+            </a:fontRef>
+          </p:style>
+        </p:cxnSp>
+        <p:cxnSp>
+          <p:nvCxnSpPr>
+            <p:cNvPr id="67" name="直线箭头连接符 66"/>
+            <p:cNvCxnSpPr>
+              <a:stCxn id="10" idx="2"/>
+              <a:endCxn id="31" idx="0"/>
+            </p:cNvCxnSpPr>
+            <p:nvPr/>
+          </p:nvCxnSpPr>
+          <p:spPr>
+            <a:xfrm>
+              <a:off x="5422787" y="1033335"/>
+              <a:ext cx="432000" cy="460616"/>
+            </a:xfrm>
+            <a:prstGeom prst="straightConnector1">
+              <a:avLst/>
+            </a:prstGeom>
+            <a:ln>
+              <a:solidFill>
+                <a:schemeClr val="tx1"/>
+              </a:solidFill>
+              <a:headEnd type="none" w="med" len="med"/>
+              <a:tailEnd type="arrow" w="med" len="med"/>
+            </a:ln>
+          </p:spPr>
+          <p:style>
+            <a:lnRef idx="1">
+              <a:schemeClr val="accent1"/>
+            </a:lnRef>
+            <a:fillRef idx="0">
+              <a:schemeClr val="accent1"/>
+            </a:fillRef>
+            <a:effectRef idx="0">
+              <a:schemeClr val="accent1"/>
+            </a:effectRef>
+            <a:fontRef idx="minor">
+              <a:schemeClr val="tx1"/>
+            </a:fontRef>
+          </p:style>
+        </p:cxnSp>
+        <p:cxnSp>
+          <p:nvCxnSpPr>
+            <p:cNvPr id="70" name="直线箭头连接符 69"/>
+            <p:cNvCxnSpPr>
+              <a:stCxn id="30" idx="2"/>
+              <a:endCxn id="42" idx="0"/>
+            </p:cNvCxnSpPr>
+            <p:nvPr/>
+          </p:nvCxnSpPr>
+          <p:spPr>
+            <a:xfrm>
+              <a:off x="4990787" y="1853951"/>
+              <a:ext cx="0" cy="510099"/>
+            </a:xfrm>
+            <a:prstGeom prst="straightConnector1">
+              <a:avLst/>
+            </a:prstGeom>
+            <a:ln>
+              <a:solidFill>
+                <a:schemeClr val="tx1"/>
+              </a:solidFill>
+              <a:headEnd type="none" w="med" len="med"/>
+              <a:tailEnd type="arrow" w="med" len="med"/>
+            </a:ln>
+          </p:spPr>
+          <p:style>
+            <a:lnRef idx="1">
+              <a:schemeClr val="accent1"/>
+            </a:lnRef>
+            <a:fillRef idx="0">
+              <a:schemeClr val="accent1"/>
+            </a:fillRef>
+            <a:effectRef idx="0">
+              <a:schemeClr val="accent1"/>
+            </a:effectRef>
+            <a:fontRef idx="minor">
+              <a:schemeClr val="tx1"/>
+            </a:fontRef>
+          </p:style>
+        </p:cxnSp>
+        <p:cxnSp>
+          <p:nvCxnSpPr>
+            <p:cNvPr id="74" name="直线箭头连接符 73"/>
+            <p:cNvCxnSpPr>
+              <a:stCxn id="31" idx="2"/>
+              <a:endCxn id="43" idx="0"/>
+            </p:cNvCxnSpPr>
+            <p:nvPr/>
+          </p:nvCxnSpPr>
+          <p:spPr>
+            <a:xfrm>
+              <a:off x="5854787" y="1853951"/>
+              <a:ext cx="0" cy="505433"/>
+            </a:xfrm>
+            <a:prstGeom prst="straightConnector1">
+              <a:avLst/>
+            </a:prstGeom>
+            <a:ln>
+              <a:solidFill>
+                <a:schemeClr val="tx1"/>
+              </a:solidFill>
+              <a:headEnd type="none" w="med" len="med"/>
+              <a:tailEnd type="arrow" w="med" len="med"/>
+            </a:ln>
+          </p:spPr>
+          <p:style>
+            <a:lnRef idx="1">
+              <a:schemeClr val="accent1"/>
+            </a:lnRef>
+            <a:fillRef idx="0">
+              <a:schemeClr val="accent1"/>
+            </a:fillRef>
+            <a:effectRef idx="0">
+              <a:schemeClr val="accent1"/>
+            </a:effectRef>
+            <a:fontRef idx="minor">
+              <a:schemeClr val="tx1"/>
+            </a:fontRef>
+          </p:style>
+        </p:cxnSp>
+      </p:grpSp>
+    </p:spTree>
+    <p:extLst>
+      <p:ext uri="{BB962C8B-B14F-4D97-AF65-F5344CB8AC3E}">
+        <p14:creationId xmlns:p14="http://schemas.microsoft.com/office/powerpoint/2010/main" val="673473754"/>
+      </p:ext>
+    </p:extLst>
+  </p:cSld>
+  <p:clrMapOvr>
+    <a:masterClrMapping/>
+  </p:clrMapOvr>
+</p:sld>
+</file>
+
 <file path=ppt/theme/theme1.xml><?xml version="1.0" encoding="utf-8"?>
 <a:theme xmlns:a="http://schemas.openxmlformats.org/drawingml/2006/main" name="Office 主题">
   <a:themeElements>

</xml_diff>

<commit_message>
Computer System: algorithms add mono stack section
</commit_message>
<xml_diff>
--- a/xxx.pptx
+++ b/xxx.pptx
@@ -7,6 +7,8 @@
   <p:sldIdLst>
     <p:sldId id="256" r:id="rId2"/>
     <p:sldId id="257" r:id="rId3"/>
+    <p:sldId id="259" r:id="rId4"/>
+    <p:sldId id="258" r:id="rId5"/>
   </p:sldIdLst>
   <p:sldSz cx="9144000" cy="6858000" type="screen4x3"/>
   <p:notesSz cx="6858000" cy="9144000"/>
@@ -105,6 +107,11 @@
       </a:defRPr>
     </a:lvl9pPr>
   </p:defaultTextStyle>
+  <p:extLst>
+    <p:ext uri="{EFAFB233-063F-42B5-8137-9DF3F51BA10A}">
+      <p15:sldGuideLst xmlns:p15="http://schemas.microsoft.com/office/powerpoint/2012/main"/>
+    </p:ext>
+  </p:extLst>
 </p:presentation>
 </file>
 
@@ -238,7 +245,7 @@
           <a:lstStyle/>
           <a:p>
             <a:fld id="{47DFFB94-FCD9-2D44-AC04-01BAD370CC9F}" type="datetimeFigureOut">
-              <a:t>2019/12/11</a:t>
+              <a:t>1/5/20</a:t>
             </a:fld>
             <a:endParaRPr kumimoji="1" lang="zh-CN" altLang="en-US"/>
           </a:p>
@@ -401,7 +408,7 @@
           <a:lstStyle/>
           <a:p>
             <a:fld id="{47DFFB94-FCD9-2D44-AC04-01BAD370CC9F}" type="datetimeFigureOut">
-              <a:t>2019/12/11</a:t>
+              <a:t>1/5/20</a:t>
             </a:fld>
             <a:endParaRPr kumimoji="1" lang="zh-CN" altLang="en-US"/>
           </a:p>
@@ -574,7 +581,7 @@
           <a:lstStyle/>
           <a:p>
             <a:fld id="{47DFFB94-FCD9-2D44-AC04-01BAD370CC9F}" type="datetimeFigureOut">
-              <a:t>2019/12/11</a:t>
+              <a:t>1/5/20</a:t>
             </a:fld>
             <a:endParaRPr kumimoji="1" lang="zh-CN" altLang="en-US"/>
           </a:p>
@@ -737,7 +744,7 @@
           <a:lstStyle/>
           <a:p>
             <a:fld id="{47DFFB94-FCD9-2D44-AC04-01BAD370CC9F}" type="datetimeFigureOut">
-              <a:t>2019/12/11</a:t>
+              <a:t>1/5/20</a:t>
             </a:fld>
             <a:endParaRPr kumimoji="1" lang="zh-CN" altLang="en-US"/>
           </a:p>
@@ -974,7 +981,7 @@
           <a:lstStyle/>
           <a:p>
             <a:fld id="{47DFFB94-FCD9-2D44-AC04-01BAD370CC9F}" type="datetimeFigureOut">
-              <a:t>2019/12/11</a:t>
+              <a:t>1/5/20</a:t>
             </a:fld>
             <a:endParaRPr kumimoji="1" lang="zh-CN" altLang="en-US"/>
           </a:p>
@@ -1199,7 +1206,7 @@
           <a:lstStyle/>
           <a:p>
             <a:fld id="{47DFFB94-FCD9-2D44-AC04-01BAD370CC9F}" type="datetimeFigureOut">
-              <a:t>2019/12/11</a:t>
+              <a:t>1/5/20</a:t>
             </a:fld>
             <a:endParaRPr kumimoji="1" lang="zh-CN" altLang="en-US"/>
           </a:p>
@@ -1559,7 +1566,7 @@
           <a:lstStyle/>
           <a:p>
             <a:fld id="{47DFFB94-FCD9-2D44-AC04-01BAD370CC9F}" type="datetimeFigureOut">
-              <a:t>2019/12/11</a:t>
+              <a:t>1/5/20</a:t>
             </a:fld>
             <a:endParaRPr kumimoji="1" lang="zh-CN" altLang="en-US"/>
           </a:p>
@@ -1670,7 +1677,7 @@
           <a:lstStyle/>
           <a:p>
             <a:fld id="{47DFFB94-FCD9-2D44-AC04-01BAD370CC9F}" type="datetimeFigureOut">
-              <a:t>2019/12/11</a:t>
+              <a:t>1/5/20</a:t>
             </a:fld>
             <a:endParaRPr kumimoji="1" lang="zh-CN" altLang="en-US"/>
           </a:p>
@@ -1758,7 +1765,7 @@
           <a:lstStyle/>
           <a:p>
             <a:fld id="{47DFFB94-FCD9-2D44-AC04-01BAD370CC9F}" type="datetimeFigureOut">
-              <a:t>2019/12/11</a:t>
+              <a:t>1/5/20</a:t>
             </a:fld>
             <a:endParaRPr kumimoji="1" lang="zh-CN" altLang="en-US"/>
           </a:p>
@@ -2028,7 +2035,7 @@
           <a:lstStyle/>
           <a:p>
             <a:fld id="{47DFFB94-FCD9-2D44-AC04-01BAD370CC9F}" type="datetimeFigureOut">
-              <a:t>2019/12/11</a:t>
+              <a:t>1/5/20</a:t>
             </a:fld>
             <a:endParaRPr kumimoji="1" lang="zh-CN" altLang="en-US"/>
           </a:p>
@@ -2278,7 +2285,7 @@
           <a:lstStyle/>
           <a:p>
             <a:fld id="{47DFFB94-FCD9-2D44-AC04-01BAD370CC9F}" type="datetimeFigureOut">
-              <a:t>2019/12/11</a:t>
+              <a:t>1/5/20</a:t>
             </a:fld>
             <a:endParaRPr kumimoji="1" lang="zh-CN" altLang="en-US"/>
           </a:p>
@@ -2484,7 +2491,7 @@
           </a:lstStyle>
           <a:p>
             <a:fld id="{47DFFB94-FCD9-2D44-AC04-01BAD370CC9F}" type="datetimeFigureOut">
-              <a:t>2019/12/11</a:t>
+              <a:t>1/5/20</a:t>
             </a:fld>
             <a:endParaRPr kumimoji="1" lang="zh-CN" altLang="en-US"/>
           </a:p>
@@ -9249,6 +9256,4593 @@
 </p:sld>
 </file>
 
+<file path=ppt/slides/slide3.xml><?xml version="1.0" encoding="utf-8"?>
+<p:sld xmlns:a="http://schemas.openxmlformats.org/drawingml/2006/main" xmlns:r="http://schemas.openxmlformats.org/officeDocument/2006/relationships" xmlns:p="http://schemas.openxmlformats.org/presentationml/2006/main">
+  <p:cSld>
+    <p:spTree>
+      <p:nvGrpSpPr>
+        <p:cNvPr id="1" name=""/>
+        <p:cNvGrpSpPr/>
+        <p:nvPr/>
+      </p:nvGrpSpPr>
+      <p:grpSpPr>
+        <a:xfrm>
+          <a:off x="0" y="0"/>
+          <a:ext cx="0" cy="0"/>
+          <a:chOff x="0" y="0"/>
+          <a:chExt cx="0" cy="0"/>
+        </a:xfrm>
+      </p:grpSpPr>
+      <p:grpSp>
+        <p:nvGrpSpPr>
+          <p:cNvPr id="122" name="组 121"/>
+          <p:cNvGrpSpPr/>
+          <p:nvPr/>
+        </p:nvGrpSpPr>
+        <p:grpSpPr>
+          <a:xfrm>
+            <a:off x="879881" y="1540757"/>
+            <a:ext cx="7373245" cy="2123846"/>
+            <a:chOff x="879881" y="1540757"/>
+            <a:chExt cx="7373245" cy="2123846"/>
+          </a:xfrm>
+        </p:grpSpPr>
+        <p:sp>
+          <p:nvSpPr>
+            <p:cNvPr id="19" name="圆角矩形 18"/>
+            <p:cNvSpPr/>
+            <p:nvPr/>
+          </p:nvSpPr>
+          <p:spPr>
+            <a:xfrm>
+              <a:off x="879881" y="2335937"/>
+              <a:ext cx="504000" cy="360000"/>
+            </a:xfrm>
+            <a:prstGeom prst="roundRect">
+              <a:avLst/>
+            </a:prstGeom>
+            <a:noFill/>
+            <a:ln>
+              <a:solidFill>
+                <a:schemeClr val="tx1"/>
+              </a:solidFill>
+            </a:ln>
+          </p:spPr>
+          <p:style>
+            <a:lnRef idx="2">
+              <a:schemeClr val="accent1">
+                <a:shade val="50000"/>
+              </a:schemeClr>
+            </a:lnRef>
+            <a:fillRef idx="1">
+              <a:schemeClr val="accent1"/>
+            </a:fillRef>
+            <a:effectRef idx="0">
+              <a:schemeClr val="accent1"/>
+            </a:effectRef>
+            <a:fontRef idx="minor">
+              <a:schemeClr val="lt1"/>
+            </a:fontRef>
+          </p:style>
+          <p:txBody>
+            <a:bodyPr rtlCol="0" anchor="ctr"/>
+            <a:lstStyle/>
+            <a:p>
+              <a:pPr algn="ctr"/>
+              <a:r>
+                <a:rPr kumimoji="1" lang="en-US" altLang="zh-CN">
+                  <a:solidFill>
+                    <a:schemeClr val="tx1"/>
+                  </a:solidFill>
+                  <a:latin typeface="Arial" charset="0"/>
+                  <a:ea typeface="Arial" charset="0"/>
+                  <a:cs typeface="Arial" charset="0"/>
+                </a:rPr>
+                <a:t>0</a:t>
+              </a:r>
+              <a:endParaRPr kumimoji="1" lang="zh-CN" altLang="en-US">
+                <a:solidFill>
+                  <a:schemeClr val="tx1"/>
+                </a:solidFill>
+                <a:latin typeface="Arial" charset="0"/>
+                <a:ea typeface="Arial" charset="0"/>
+                <a:cs typeface="Arial" charset="0"/>
+              </a:endParaRPr>
+            </a:p>
+          </p:txBody>
+        </p:sp>
+        <p:sp>
+          <p:nvSpPr>
+            <p:cNvPr id="20" name="圆角矩形 19"/>
+            <p:cNvSpPr/>
+            <p:nvPr/>
+          </p:nvSpPr>
+          <p:spPr>
+            <a:xfrm>
+              <a:off x="1861202" y="2335937"/>
+              <a:ext cx="504000" cy="360000"/>
+            </a:xfrm>
+            <a:prstGeom prst="roundRect">
+              <a:avLst/>
+            </a:prstGeom>
+            <a:pattFill prst="wdUpDiag">
+              <a:fgClr>
+                <a:schemeClr val="accent1"/>
+              </a:fgClr>
+              <a:bgClr>
+                <a:schemeClr val="bg1"/>
+              </a:bgClr>
+            </a:pattFill>
+            <a:ln>
+              <a:solidFill>
+                <a:schemeClr val="tx1"/>
+              </a:solidFill>
+            </a:ln>
+          </p:spPr>
+          <p:style>
+            <a:lnRef idx="2">
+              <a:schemeClr val="accent1">
+                <a:shade val="50000"/>
+              </a:schemeClr>
+            </a:lnRef>
+            <a:fillRef idx="1">
+              <a:schemeClr val="accent1"/>
+            </a:fillRef>
+            <a:effectRef idx="0">
+              <a:schemeClr val="accent1"/>
+            </a:effectRef>
+            <a:fontRef idx="minor">
+              <a:schemeClr val="lt1"/>
+            </a:fontRef>
+          </p:style>
+          <p:txBody>
+            <a:bodyPr rtlCol="0" anchor="ctr"/>
+            <a:lstStyle/>
+            <a:p>
+              <a:pPr algn="ctr"/>
+              <a:r>
+                <a:rPr kumimoji="1" lang="en-US" altLang="zh-CN">
+                  <a:solidFill>
+                    <a:schemeClr val="tx1"/>
+                  </a:solidFill>
+                  <a:latin typeface="Arial" charset="0"/>
+                  <a:ea typeface="Arial" charset="0"/>
+                  <a:cs typeface="Arial" charset="0"/>
+                </a:rPr>
+                <a:t>1</a:t>
+              </a:r>
+              <a:endParaRPr kumimoji="1" lang="zh-CN" altLang="en-US">
+                <a:solidFill>
+                  <a:schemeClr val="tx1"/>
+                </a:solidFill>
+                <a:latin typeface="Arial" charset="0"/>
+                <a:ea typeface="Arial" charset="0"/>
+                <a:cs typeface="Arial" charset="0"/>
+              </a:endParaRPr>
+            </a:p>
+          </p:txBody>
+        </p:sp>
+        <p:sp>
+          <p:nvSpPr>
+            <p:cNvPr id="21" name="圆角矩形 20"/>
+            <p:cNvSpPr/>
+            <p:nvPr/>
+          </p:nvSpPr>
+          <p:spPr>
+            <a:xfrm>
+              <a:off x="2842523" y="2335937"/>
+              <a:ext cx="504000" cy="360000"/>
+            </a:xfrm>
+            <a:prstGeom prst="roundRect">
+              <a:avLst/>
+            </a:prstGeom>
+            <a:pattFill prst="wdUpDiag">
+              <a:fgClr>
+                <a:schemeClr val="accent2"/>
+              </a:fgClr>
+              <a:bgClr>
+                <a:schemeClr val="bg1"/>
+              </a:bgClr>
+            </a:pattFill>
+            <a:ln>
+              <a:solidFill>
+                <a:schemeClr val="tx1"/>
+              </a:solidFill>
+            </a:ln>
+          </p:spPr>
+          <p:style>
+            <a:lnRef idx="2">
+              <a:schemeClr val="accent1">
+                <a:shade val="50000"/>
+              </a:schemeClr>
+            </a:lnRef>
+            <a:fillRef idx="1">
+              <a:schemeClr val="accent1"/>
+            </a:fillRef>
+            <a:effectRef idx="0">
+              <a:schemeClr val="accent1"/>
+            </a:effectRef>
+            <a:fontRef idx="minor">
+              <a:schemeClr val="lt1"/>
+            </a:fontRef>
+          </p:style>
+          <p:txBody>
+            <a:bodyPr rtlCol="0" anchor="ctr"/>
+            <a:lstStyle/>
+            <a:p>
+              <a:pPr algn="ctr"/>
+              <a:r>
+                <a:rPr kumimoji="1" lang="en-US" altLang="zh-CN">
+                  <a:solidFill>
+                    <a:schemeClr val="tx1"/>
+                  </a:solidFill>
+                  <a:latin typeface="Arial" charset="0"/>
+                  <a:ea typeface="Arial" charset="0"/>
+                  <a:cs typeface="Arial" charset="0"/>
+                </a:rPr>
+                <a:t>3</a:t>
+              </a:r>
+              <a:endParaRPr kumimoji="1" lang="zh-CN" altLang="en-US">
+                <a:solidFill>
+                  <a:schemeClr val="tx1"/>
+                </a:solidFill>
+                <a:latin typeface="Arial" charset="0"/>
+                <a:ea typeface="Arial" charset="0"/>
+                <a:cs typeface="Arial" charset="0"/>
+              </a:endParaRPr>
+            </a:p>
+          </p:txBody>
+        </p:sp>
+        <p:sp>
+          <p:nvSpPr>
+            <p:cNvPr id="22" name="圆角矩形 21"/>
+            <p:cNvSpPr/>
+            <p:nvPr/>
+          </p:nvSpPr>
+          <p:spPr>
+            <a:xfrm>
+              <a:off x="3823844" y="2335937"/>
+              <a:ext cx="504000" cy="360000"/>
+            </a:xfrm>
+            <a:prstGeom prst="roundRect">
+              <a:avLst/>
+            </a:prstGeom>
+            <a:noFill/>
+            <a:ln>
+              <a:solidFill>
+                <a:schemeClr val="tx1"/>
+              </a:solidFill>
+            </a:ln>
+          </p:spPr>
+          <p:style>
+            <a:lnRef idx="2">
+              <a:schemeClr val="accent1">
+                <a:shade val="50000"/>
+              </a:schemeClr>
+            </a:lnRef>
+            <a:fillRef idx="1">
+              <a:schemeClr val="accent1"/>
+            </a:fillRef>
+            <a:effectRef idx="0">
+              <a:schemeClr val="accent1"/>
+            </a:effectRef>
+            <a:fontRef idx="minor">
+              <a:schemeClr val="lt1"/>
+            </a:fontRef>
+          </p:style>
+          <p:txBody>
+            <a:bodyPr rtlCol="0" anchor="ctr"/>
+            <a:lstStyle/>
+            <a:p>
+              <a:pPr algn="ctr"/>
+              <a:r>
+                <a:rPr kumimoji="1" lang="en-US" altLang="zh-CN">
+                  <a:solidFill>
+                    <a:schemeClr val="tx1"/>
+                  </a:solidFill>
+                  <a:latin typeface="Arial" charset="0"/>
+                  <a:ea typeface="Arial" charset="0"/>
+                  <a:cs typeface="Arial" charset="0"/>
+                </a:rPr>
+                <a:t>5</a:t>
+              </a:r>
+              <a:endParaRPr kumimoji="1" lang="zh-CN" altLang="en-US">
+                <a:solidFill>
+                  <a:schemeClr val="tx1"/>
+                </a:solidFill>
+                <a:latin typeface="Arial" charset="0"/>
+                <a:ea typeface="Arial" charset="0"/>
+                <a:cs typeface="Arial" charset="0"/>
+              </a:endParaRPr>
+            </a:p>
+          </p:txBody>
+        </p:sp>
+        <p:sp>
+          <p:nvSpPr>
+            <p:cNvPr id="23" name="圆角矩形 22"/>
+            <p:cNvSpPr/>
+            <p:nvPr/>
+          </p:nvSpPr>
+          <p:spPr>
+            <a:xfrm>
+              <a:off x="4805165" y="2335937"/>
+              <a:ext cx="504000" cy="360000"/>
+            </a:xfrm>
+            <a:prstGeom prst="roundRect">
+              <a:avLst/>
+            </a:prstGeom>
+            <a:noFill/>
+            <a:ln>
+              <a:solidFill>
+                <a:schemeClr val="tx1"/>
+              </a:solidFill>
+            </a:ln>
+          </p:spPr>
+          <p:style>
+            <a:lnRef idx="2">
+              <a:schemeClr val="accent1">
+                <a:shade val="50000"/>
+              </a:schemeClr>
+            </a:lnRef>
+            <a:fillRef idx="1">
+              <a:schemeClr val="accent1"/>
+            </a:fillRef>
+            <a:effectRef idx="0">
+              <a:schemeClr val="accent1"/>
+            </a:effectRef>
+            <a:fontRef idx="minor">
+              <a:schemeClr val="lt1"/>
+            </a:fontRef>
+          </p:style>
+          <p:txBody>
+            <a:bodyPr rtlCol="0" anchor="ctr"/>
+            <a:lstStyle/>
+            <a:p>
+              <a:pPr algn="ctr"/>
+              <a:r>
+                <a:rPr kumimoji="1" lang="en-US" altLang="zh-CN">
+                  <a:solidFill>
+                    <a:schemeClr val="tx1"/>
+                  </a:solidFill>
+                  <a:latin typeface="Arial" charset="0"/>
+                  <a:ea typeface="Arial" charset="0"/>
+                  <a:cs typeface="Arial" charset="0"/>
+                </a:rPr>
+                <a:t>6</a:t>
+              </a:r>
+              <a:endParaRPr kumimoji="1" lang="zh-CN" altLang="en-US">
+                <a:solidFill>
+                  <a:schemeClr val="tx1"/>
+                </a:solidFill>
+                <a:latin typeface="Arial" charset="0"/>
+                <a:ea typeface="Arial" charset="0"/>
+                <a:cs typeface="Arial" charset="0"/>
+              </a:endParaRPr>
+            </a:p>
+          </p:txBody>
+        </p:sp>
+        <p:sp>
+          <p:nvSpPr>
+            <p:cNvPr id="24" name="圆角矩形 23"/>
+            <p:cNvSpPr/>
+            <p:nvPr/>
+          </p:nvSpPr>
+          <p:spPr>
+            <a:xfrm>
+              <a:off x="5786486" y="2335937"/>
+              <a:ext cx="504000" cy="360000"/>
+            </a:xfrm>
+            <a:prstGeom prst="roundRect">
+              <a:avLst/>
+            </a:prstGeom>
+            <a:noFill/>
+            <a:ln>
+              <a:solidFill>
+                <a:schemeClr val="tx1"/>
+              </a:solidFill>
+            </a:ln>
+          </p:spPr>
+          <p:style>
+            <a:lnRef idx="2">
+              <a:schemeClr val="accent1">
+                <a:shade val="50000"/>
+              </a:schemeClr>
+            </a:lnRef>
+            <a:fillRef idx="1">
+              <a:schemeClr val="accent1"/>
+            </a:fillRef>
+            <a:effectRef idx="0">
+              <a:schemeClr val="accent1"/>
+            </a:effectRef>
+            <a:fontRef idx="minor">
+              <a:schemeClr val="lt1"/>
+            </a:fontRef>
+          </p:style>
+          <p:txBody>
+            <a:bodyPr rtlCol="0" anchor="ctr"/>
+            <a:lstStyle/>
+            <a:p>
+              <a:pPr algn="ctr"/>
+              <a:r>
+                <a:rPr kumimoji="1" lang="en-US" altLang="zh-CN">
+                  <a:solidFill>
+                    <a:schemeClr val="tx1"/>
+                  </a:solidFill>
+                  <a:latin typeface="Arial" charset="0"/>
+                  <a:ea typeface="Arial" charset="0"/>
+                  <a:cs typeface="Arial" charset="0"/>
+                </a:rPr>
+                <a:t>8</a:t>
+              </a:r>
+              <a:endParaRPr kumimoji="1" lang="zh-CN" altLang="en-US">
+                <a:solidFill>
+                  <a:schemeClr val="tx1"/>
+                </a:solidFill>
+                <a:latin typeface="Arial" charset="0"/>
+                <a:ea typeface="Arial" charset="0"/>
+                <a:cs typeface="Arial" charset="0"/>
+              </a:endParaRPr>
+            </a:p>
+          </p:txBody>
+        </p:sp>
+        <p:sp>
+          <p:nvSpPr>
+            <p:cNvPr id="36" name="圆角矩形 35"/>
+            <p:cNvSpPr/>
+            <p:nvPr/>
+          </p:nvSpPr>
+          <p:spPr>
+            <a:xfrm>
+              <a:off x="6767807" y="2335937"/>
+              <a:ext cx="504000" cy="360000"/>
+            </a:xfrm>
+            <a:prstGeom prst="roundRect">
+              <a:avLst/>
+            </a:prstGeom>
+            <a:noFill/>
+            <a:ln>
+              <a:solidFill>
+                <a:schemeClr val="tx1"/>
+              </a:solidFill>
+            </a:ln>
+          </p:spPr>
+          <p:style>
+            <a:lnRef idx="2">
+              <a:schemeClr val="accent1">
+                <a:shade val="50000"/>
+              </a:schemeClr>
+            </a:lnRef>
+            <a:fillRef idx="1">
+              <a:schemeClr val="accent1"/>
+            </a:fillRef>
+            <a:effectRef idx="0">
+              <a:schemeClr val="accent1"/>
+            </a:effectRef>
+            <a:fontRef idx="minor">
+              <a:schemeClr val="lt1"/>
+            </a:fontRef>
+          </p:style>
+          <p:txBody>
+            <a:bodyPr rtlCol="0" anchor="ctr"/>
+            <a:lstStyle/>
+            <a:p>
+              <a:pPr algn="ctr"/>
+              <a:r>
+                <a:rPr kumimoji="1" lang="en-US" altLang="zh-CN">
+                  <a:solidFill>
+                    <a:schemeClr val="tx1"/>
+                  </a:solidFill>
+                  <a:latin typeface="Arial" charset="0"/>
+                  <a:ea typeface="Arial" charset="0"/>
+                  <a:cs typeface="Arial" charset="0"/>
+                </a:rPr>
+                <a:t>12</a:t>
+              </a:r>
+              <a:endParaRPr kumimoji="1" lang="zh-CN" altLang="en-US">
+                <a:solidFill>
+                  <a:schemeClr val="tx1"/>
+                </a:solidFill>
+                <a:latin typeface="Arial" charset="0"/>
+                <a:ea typeface="Arial" charset="0"/>
+                <a:cs typeface="Arial" charset="0"/>
+              </a:endParaRPr>
+            </a:p>
+          </p:txBody>
+        </p:sp>
+        <p:sp>
+          <p:nvSpPr>
+            <p:cNvPr id="37" name="圆角矩形 36"/>
+            <p:cNvSpPr/>
+            <p:nvPr/>
+          </p:nvSpPr>
+          <p:spPr>
+            <a:xfrm>
+              <a:off x="7749126" y="2335937"/>
+              <a:ext cx="504000" cy="360000"/>
+            </a:xfrm>
+            <a:prstGeom prst="roundRect">
+              <a:avLst/>
+            </a:prstGeom>
+            <a:noFill/>
+            <a:ln>
+              <a:solidFill>
+                <a:schemeClr val="tx1"/>
+              </a:solidFill>
+            </a:ln>
+          </p:spPr>
+          <p:style>
+            <a:lnRef idx="2">
+              <a:schemeClr val="accent1">
+                <a:shade val="50000"/>
+              </a:schemeClr>
+            </a:lnRef>
+            <a:fillRef idx="1">
+              <a:schemeClr val="accent1"/>
+            </a:fillRef>
+            <a:effectRef idx="0">
+              <a:schemeClr val="accent1"/>
+            </a:effectRef>
+            <a:fontRef idx="minor">
+              <a:schemeClr val="lt1"/>
+            </a:fontRef>
+          </p:style>
+          <p:txBody>
+            <a:bodyPr rtlCol="0" anchor="ctr"/>
+            <a:lstStyle/>
+            <a:p>
+              <a:pPr algn="ctr"/>
+              <a:r>
+                <a:rPr kumimoji="1" lang="en-US" altLang="zh-CN">
+                  <a:solidFill>
+                    <a:schemeClr val="tx1"/>
+                  </a:solidFill>
+                  <a:latin typeface="Arial" charset="0"/>
+                  <a:ea typeface="Arial" charset="0"/>
+                  <a:cs typeface="Arial" charset="0"/>
+                </a:rPr>
+                <a:t>17</a:t>
+              </a:r>
+              <a:endParaRPr kumimoji="1" lang="zh-CN" altLang="en-US">
+                <a:solidFill>
+                  <a:schemeClr val="tx1"/>
+                </a:solidFill>
+                <a:latin typeface="Arial" charset="0"/>
+                <a:ea typeface="Arial" charset="0"/>
+                <a:cs typeface="Arial" charset="0"/>
+              </a:endParaRPr>
+            </a:p>
+          </p:txBody>
+        </p:sp>
+        <p:cxnSp>
+          <p:nvCxnSpPr>
+            <p:cNvPr id="39" name="直线箭头连接符 38"/>
+            <p:cNvCxnSpPr>
+              <a:stCxn id="19" idx="3"/>
+              <a:endCxn id="20" idx="1"/>
+            </p:cNvCxnSpPr>
+            <p:nvPr/>
+          </p:nvCxnSpPr>
+          <p:spPr>
+            <a:xfrm>
+              <a:off x="1383881" y="2515937"/>
+              <a:ext cx="477321" cy="0"/>
+            </a:xfrm>
+            <a:prstGeom prst="straightConnector1">
+              <a:avLst/>
+            </a:prstGeom>
+            <a:ln w="19050">
+              <a:headEnd type="none" w="med" len="med"/>
+              <a:tailEnd type="arrow" w="med" len="med"/>
+            </a:ln>
+          </p:spPr>
+          <p:style>
+            <a:lnRef idx="1">
+              <a:schemeClr val="accent1"/>
+            </a:lnRef>
+            <a:fillRef idx="0">
+              <a:schemeClr val="accent1"/>
+            </a:fillRef>
+            <a:effectRef idx="0">
+              <a:schemeClr val="accent1"/>
+            </a:effectRef>
+            <a:fontRef idx="minor">
+              <a:schemeClr val="tx1"/>
+            </a:fontRef>
+          </p:style>
+        </p:cxnSp>
+        <p:sp>
+          <p:nvSpPr>
+            <p:cNvPr id="47" name="文本框 46"/>
+            <p:cNvSpPr txBox="1"/>
+            <p:nvPr/>
+          </p:nvSpPr>
+          <p:spPr>
+            <a:xfrm>
+              <a:off x="2376192" y="2135426"/>
+              <a:ext cx="513282" cy="369332"/>
+            </a:xfrm>
+            <a:prstGeom prst="rect">
+              <a:avLst/>
+            </a:prstGeom>
+            <a:noFill/>
+          </p:spPr>
+          <p:txBody>
+            <a:bodyPr wrap="none" rtlCol="0">
+              <a:spAutoFit/>
+            </a:bodyPr>
+            <a:lstStyle/>
+            <a:p>
+              <a:r>
+                <a:rPr kumimoji="1" lang="en-US" altLang="zh-CN">
+                  <a:latin typeface="Arial Hebrew Scholar" charset="-79"/>
+                  <a:ea typeface="Arial Hebrew Scholar" charset="-79"/>
+                  <a:cs typeface="Arial Hebrew Scholar" charset="-79"/>
+                </a:rPr>
+                <a:t>k=2</a:t>
+              </a:r>
+              <a:endParaRPr kumimoji="1" lang="zh-CN" altLang="en-US">
+                <a:latin typeface="Arial Hebrew Scholar" charset="-79"/>
+                <a:ea typeface="Arial Hebrew Scholar" charset="-79"/>
+                <a:cs typeface="Arial Hebrew Scholar" charset="-79"/>
+              </a:endParaRPr>
+            </a:p>
+          </p:txBody>
+        </p:sp>
+        <p:sp>
+          <p:nvSpPr>
+            <p:cNvPr id="48" name="文本框 47"/>
+            <p:cNvSpPr txBox="1"/>
+            <p:nvPr/>
+          </p:nvSpPr>
+          <p:spPr>
+            <a:xfrm>
+              <a:off x="1361892" y="2130815"/>
+              <a:ext cx="521297" cy="369332"/>
+            </a:xfrm>
+            <a:prstGeom prst="rect">
+              <a:avLst/>
+            </a:prstGeom>
+            <a:noFill/>
+          </p:spPr>
+          <p:txBody>
+            <a:bodyPr wrap="none" rtlCol="0">
+              <a:spAutoFit/>
+            </a:bodyPr>
+            <a:lstStyle/>
+            <a:p>
+              <a:r>
+                <a:rPr kumimoji="1" lang="en-US" altLang="zh-CN">
+                  <a:latin typeface="Arial Hebrew Scholar" charset="-79"/>
+                  <a:ea typeface="Arial Hebrew Scholar" charset="-79"/>
+                  <a:cs typeface="Arial Hebrew Scholar" charset="-79"/>
+                </a:rPr>
+                <a:t>k=1</a:t>
+              </a:r>
+              <a:endParaRPr kumimoji="1" lang="zh-CN" altLang="en-US">
+                <a:latin typeface="Arial Hebrew Scholar" charset="-79"/>
+                <a:ea typeface="Arial Hebrew Scholar" charset="-79"/>
+                <a:cs typeface="Arial Hebrew Scholar" charset="-79"/>
+              </a:endParaRPr>
+            </a:p>
+          </p:txBody>
+        </p:sp>
+        <p:cxnSp>
+          <p:nvCxnSpPr>
+            <p:cNvPr id="49" name="曲线连接符 48"/>
+            <p:cNvCxnSpPr>
+              <a:stCxn id="21" idx="0"/>
+              <a:endCxn id="22" idx="0"/>
+            </p:cNvCxnSpPr>
+            <p:nvPr/>
+          </p:nvCxnSpPr>
+          <p:spPr>
+            <a:xfrm rot="5400000" flipH="1" flipV="1">
+              <a:off x="3585183" y="1845277"/>
+              <a:ext cx="12700" cy="981321"/>
+            </a:xfrm>
+            <a:prstGeom prst="curvedConnector3">
+              <a:avLst>
+                <a:gd name="adj1" fmla="val 2353850"/>
+              </a:avLst>
+            </a:prstGeom>
+            <a:ln w="19050">
+              <a:headEnd type="none" w="med" len="med"/>
+              <a:tailEnd type="arrow" w="med" len="med"/>
+            </a:ln>
+          </p:spPr>
+          <p:style>
+            <a:lnRef idx="1">
+              <a:schemeClr val="accent1"/>
+            </a:lnRef>
+            <a:fillRef idx="0">
+              <a:schemeClr val="accent1"/>
+            </a:fillRef>
+            <a:effectRef idx="0">
+              <a:schemeClr val="accent1"/>
+            </a:effectRef>
+            <a:fontRef idx="minor">
+              <a:schemeClr val="tx1"/>
+            </a:fontRef>
+          </p:style>
+        </p:cxnSp>
+        <p:cxnSp>
+          <p:nvCxnSpPr>
+            <p:cNvPr id="52" name="曲线连接符 51"/>
+            <p:cNvCxnSpPr>
+              <a:stCxn id="22" idx="2"/>
+              <a:endCxn id="23" idx="2"/>
+            </p:cNvCxnSpPr>
+            <p:nvPr/>
+          </p:nvCxnSpPr>
+          <p:spPr>
+            <a:xfrm rot="16200000" flipH="1">
+              <a:off x="4566504" y="2205276"/>
+              <a:ext cx="12700" cy="981321"/>
+            </a:xfrm>
+            <a:prstGeom prst="curvedConnector3">
+              <a:avLst>
+                <a:gd name="adj1" fmla="val 2538449"/>
+              </a:avLst>
+            </a:prstGeom>
+            <a:ln w="19050">
+              <a:solidFill>
+                <a:schemeClr val="accent2"/>
+              </a:solidFill>
+              <a:headEnd type="none" w="med" len="med"/>
+              <a:tailEnd type="arrow" w="med" len="med"/>
+            </a:ln>
+          </p:spPr>
+          <p:style>
+            <a:lnRef idx="1">
+              <a:schemeClr val="accent1"/>
+            </a:lnRef>
+            <a:fillRef idx="0">
+              <a:schemeClr val="accent1"/>
+            </a:fillRef>
+            <a:effectRef idx="0">
+              <a:schemeClr val="accent1"/>
+            </a:effectRef>
+            <a:fontRef idx="minor">
+              <a:schemeClr val="tx1"/>
+            </a:fontRef>
+          </p:style>
+        </p:cxnSp>
+        <p:sp>
+          <p:nvSpPr>
+            <p:cNvPr id="58" name="文本框 57"/>
+            <p:cNvSpPr txBox="1"/>
+            <p:nvPr/>
+          </p:nvSpPr>
+          <p:spPr>
+            <a:xfrm>
+              <a:off x="3334892" y="1675878"/>
+              <a:ext cx="513282" cy="369332"/>
+            </a:xfrm>
+            <a:prstGeom prst="rect">
+              <a:avLst/>
+            </a:prstGeom>
+            <a:noFill/>
+          </p:spPr>
+          <p:txBody>
+            <a:bodyPr wrap="none" rtlCol="0">
+              <a:spAutoFit/>
+            </a:bodyPr>
+            <a:lstStyle/>
+            <a:p>
+              <a:r>
+                <a:rPr kumimoji="1" lang="en-US" altLang="zh-CN">
+                  <a:latin typeface="Arial Hebrew Scholar" charset="-79"/>
+                  <a:ea typeface="Arial Hebrew Scholar" charset="-79"/>
+                  <a:cs typeface="Arial Hebrew Scholar" charset="-79"/>
+                </a:rPr>
+                <a:t>k=2</a:t>
+              </a:r>
+              <a:endParaRPr kumimoji="1" lang="zh-CN" altLang="en-US">
+                <a:latin typeface="Arial Hebrew Scholar" charset="-79"/>
+                <a:ea typeface="Arial Hebrew Scholar" charset="-79"/>
+                <a:cs typeface="Arial Hebrew Scholar" charset="-79"/>
+              </a:endParaRPr>
+            </a:p>
+          </p:txBody>
+        </p:sp>
+        <p:sp>
+          <p:nvSpPr>
+            <p:cNvPr id="59" name="文本框 58"/>
+            <p:cNvSpPr txBox="1"/>
+            <p:nvPr/>
+          </p:nvSpPr>
+          <p:spPr>
+            <a:xfrm>
+              <a:off x="4370142" y="2635037"/>
+              <a:ext cx="513282" cy="369332"/>
+            </a:xfrm>
+            <a:prstGeom prst="rect">
+              <a:avLst/>
+            </a:prstGeom>
+            <a:noFill/>
+          </p:spPr>
+          <p:txBody>
+            <a:bodyPr wrap="none" rtlCol="0">
+              <a:spAutoFit/>
+            </a:bodyPr>
+            <a:lstStyle/>
+            <a:p>
+              <a:r>
+                <a:rPr kumimoji="1" lang="en-US" altLang="zh-CN">
+                  <a:latin typeface="Arial Hebrew Scholar" charset="-79"/>
+                  <a:ea typeface="Arial Hebrew Scholar" charset="-79"/>
+                  <a:cs typeface="Arial Hebrew Scholar" charset="-79"/>
+                </a:rPr>
+                <a:t>k=1</a:t>
+              </a:r>
+              <a:endParaRPr kumimoji="1" lang="zh-CN" altLang="en-US">
+                <a:latin typeface="Arial Hebrew Scholar" charset="-79"/>
+                <a:ea typeface="Arial Hebrew Scholar" charset="-79"/>
+                <a:cs typeface="Arial Hebrew Scholar" charset="-79"/>
+              </a:endParaRPr>
+            </a:p>
+          </p:txBody>
+        </p:sp>
+        <p:cxnSp>
+          <p:nvCxnSpPr>
+            <p:cNvPr id="61" name="曲线连接符 60"/>
+            <p:cNvCxnSpPr>
+              <a:stCxn id="22" idx="0"/>
+              <a:endCxn id="24" idx="0"/>
+            </p:cNvCxnSpPr>
+            <p:nvPr/>
+          </p:nvCxnSpPr>
+          <p:spPr>
+            <a:xfrm rot="5400000" flipH="1" flipV="1">
+              <a:off x="5057165" y="1354616"/>
+              <a:ext cx="12700" cy="1962642"/>
+            </a:xfrm>
+            <a:prstGeom prst="curvedConnector3">
+              <a:avLst>
+                <a:gd name="adj1" fmla="val 3830772"/>
+              </a:avLst>
+            </a:prstGeom>
+            <a:ln w="19050">
+              <a:solidFill>
+                <a:schemeClr val="accent1"/>
+              </a:solidFill>
+              <a:headEnd type="none" w="med" len="med"/>
+              <a:tailEnd type="arrow" w="med" len="med"/>
+            </a:ln>
+          </p:spPr>
+          <p:style>
+            <a:lnRef idx="1">
+              <a:schemeClr val="accent1"/>
+            </a:lnRef>
+            <a:fillRef idx="0">
+              <a:schemeClr val="accent1"/>
+            </a:fillRef>
+            <a:effectRef idx="0">
+              <a:schemeClr val="accent1"/>
+            </a:effectRef>
+            <a:fontRef idx="minor">
+              <a:schemeClr val="tx1"/>
+            </a:fontRef>
+          </p:style>
+        </p:cxnSp>
+        <p:sp>
+          <p:nvSpPr>
+            <p:cNvPr id="65" name="文本框 64"/>
+            <p:cNvSpPr txBox="1"/>
+            <p:nvPr/>
+          </p:nvSpPr>
+          <p:spPr>
+            <a:xfrm>
+              <a:off x="4853825" y="1540757"/>
+              <a:ext cx="513282" cy="369332"/>
+            </a:xfrm>
+            <a:prstGeom prst="rect">
+              <a:avLst/>
+            </a:prstGeom>
+            <a:noFill/>
+          </p:spPr>
+          <p:txBody>
+            <a:bodyPr wrap="none" rtlCol="0">
+              <a:spAutoFit/>
+            </a:bodyPr>
+            <a:lstStyle/>
+            <a:p>
+              <a:r>
+                <a:rPr kumimoji="1" lang="en-US" altLang="zh-CN">
+                  <a:latin typeface="Arial Hebrew Scholar" charset="-79"/>
+                  <a:ea typeface="Arial Hebrew Scholar" charset="-79"/>
+                  <a:cs typeface="Arial Hebrew Scholar" charset="-79"/>
+                </a:rPr>
+                <a:t>k=3</a:t>
+              </a:r>
+              <a:endParaRPr kumimoji="1" lang="zh-CN" altLang="en-US">
+                <a:latin typeface="Arial Hebrew Scholar" charset="-79"/>
+                <a:ea typeface="Arial Hebrew Scholar" charset="-79"/>
+                <a:cs typeface="Arial Hebrew Scholar" charset="-79"/>
+              </a:endParaRPr>
+            </a:p>
+          </p:txBody>
+        </p:sp>
+        <p:cxnSp>
+          <p:nvCxnSpPr>
+            <p:cNvPr id="66" name="曲线连接符 65"/>
+            <p:cNvCxnSpPr>
+              <a:stCxn id="24" idx="0"/>
+              <a:endCxn id="36" idx="0"/>
+            </p:cNvCxnSpPr>
+            <p:nvPr/>
+          </p:nvCxnSpPr>
+          <p:spPr>
+            <a:xfrm rot="5400000" flipH="1" flipV="1">
+              <a:off x="6529146" y="1845277"/>
+              <a:ext cx="12700" cy="981321"/>
+            </a:xfrm>
+            <a:prstGeom prst="curvedConnector3">
+              <a:avLst>
+                <a:gd name="adj1" fmla="val 3184591"/>
+              </a:avLst>
+            </a:prstGeom>
+            <a:ln w="19050">
+              <a:solidFill>
+                <a:schemeClr val="accent1"/>
+              </a:solidFill>
+              <a:headEnd type="none" w="med" len="med"/>
+              <a:tailEnd type="arrow" w="med" len="med"/>
+            </a:ln>
+          </p:spPr>
+          <p:style>
+            <a:lnRef idx="1">
+              <a:schemeClr val="accent1"/>
+            </a:lnRef>
+            <a:fillRef idx="0">
+              <a:schemeClr val="accent1"/>
+            </a:fillRef>
+            <a:effectRef idx="0">
+              <a:schemeClr val="accent1"/>
+            </a:effectRef>
+            <a:fontRef idx="minor">
+              <a:schemeClr val="tx1"/>
+            </a:fontRef>
+          </p:style>
+        </p:cxnSp>
+        <p:sp>
+          <p:nvSpPr>
+            <p:cNvPr id="67" name="文本框 66"/>
+            <p:cNvSpPr txBox="1"/>
+            <p:nvPr/>
+          </p:nvSpPr>
+          <p:spPr>
+            <a:xfrm>
+              <a:off x="6254525" y="1540757"/>
+              <a:ext cx="513282" cy="369332"/>
+            </a:xfrm>
+            <a:prstGeom prst="rect">
+              <a:avLst/>
+            </a:prstGeom>
+            <a:noFill/>
+          </p:spPr>
+          <p:txBody>
+            <a:bodyPr wrap="none" rtlCol="0">
+              <a:spAutoFit/>
+            </a:bodyPr>
+            <a:lstStyle/>
+            <a:p>
+              <a:r>
+                <a:rPr kumimoji="1" lang="en-US" altLang="zh-CN">
+                  <a:latin typeface="Arial Hebrew Scholar" charset="-79"/>
+                  <a:ea typeface="Arial Hebrew Scholar" charset="-79"/>
+                  <a:cs typeface="Arial Hebrew Scholar" charset="-79"/>
+                </a:rPr>
+                <a:t>k=4</a:t>
+              </a:r>
+              <a:endParaRPr kumimoji="1" lang="zh-CN" altLang="en-US">
+                <a:latin typeface="Arial Hebrew Scholar" charset="-79"/>
+                <a:ea typeface="Arial Hebrew Scholar" charset="-79"/>
+                <a:cs typeface="Arial Hebrew Scholar" charset="-79"/>
+              </a:endParaRPr>
+            </a:p>
+          </p:txBody>
+        </p:sp>
+        <p:cxnSp>
+          <p:nvCxnSpPr>
+            <p:cNvPr id="77" name="曲线连接符 76"/>
+            <p:cNvCxnSpPr>
+              <a:stCxn id="21" idx="2"/>
+              <a:endCxn id="23" idx="2"/>
+            </p:cNvCxnSpPr>
+            <p:nvPr/>
+          </p:nvCxnSpPr>
+          <p:spPr>
+            <a:xfrm rot="16200000" flipH="1">
+              <a:off x="4075844" y="1714616"/>
+              <a:ext cx="12700" cy="1962642"/>
+            </a:xfrm>
+            <a:prstGeom prst="curvedConnector3">
+              <a:avLst>
+                <a:gd name="adj1" fmla="val 4476921"/>
+              </a:avLst>
+            </a:prstGeom>
+            <a:ln w="19050">
+              <a:solidFill>
+                <a:schemeClr val="accent6"/>
+              </a:solidFill>
+              <a:headEnd type="none" w="med" len="med"/>
+              <a:tailEnd type="arrow" w="med" len="med"/>
+            </a:ln>
+          </p:spPr>
+          <p:style>
+            <a:lnRef idx="1">
+              <a:schemeClr val="accent1"/>
+            </a:lnRef>
+            <a:fillRef idx="0">
+              <a:schemeClr val="accent1"/>
+            </a:fillRef>
+            <a:effectRef idx="0">
+              <a:schemeClr val="accent1"/>
+            </a:effectRef>
+            <a:fontRef idx="minor">
+              <a:schemeClr val="tx1"/>
+            </a:fontRef>
+          </p:style>
+        </p:cxnSp>
+        <p:cxnSp>
+          <p:nvCxnSpPr>
+            <p:cNvPr id="84" name="曲线连接符 83"/>
+            <p:cNvCxnSpPr>
+              <a:stCxn id="23" idx="2"/>
+              <a:endCxn id="24" idx="2"/>
+            </p:cNvCxnSpPr>
+            <p:nvPr/>
+          </p:nvCxnSpPr>
+          <p:spPr>
+            <a:xfrm rot="16200000" flipH="1">
+              <a:off x="5547825" y="2205276"/>
+              <a:ext cx="12700" cy="981321"/>
+            </a:xfrm>
+            <a:prstGeom prst="curvedConnector3">
+              <a:avLst>
+                <a:gd name="adj1" fmla="val 2169228"/>
+              </a:avLst>
+            </a:prstGeom>
+            <a:ln w="19050">
+              <a:solidFill>
+                <a:srgbClr val="7030A0"/>
+              </a:solidFill>
+              <a:headEnd type="none" w="med" len="med"/>
+              <a:tailEnd type="arrow" w="med" len="med"/>
+            </a:ln>
+          </p:spPr>
+          <p:style>
+            <a:lnRef idx="1">
+              <a:schemeClr val="accent1"/>
+            </a:lnRef>
+            <a:fillRef idx="0">
+              <a:schemeClr val="accent1"/>
+            </a:fillRef>
+            <a:effectRef idx="0">
+              <a:schemeClr val="accent1"/>
+            </a:effectRef>
+            <a:fontRef idx="minor">
+              <a:schemeClr val="tx1"/>
+            </a:fontRef>
+          </p:style>
+        </p:cxnSp>
+        <p:sp>
+          <p:nvSpPr>
+            <p:cNvPr id="85" name="文本框 84"/>
+            <p:cNvSpPr txBox="1"/>
+            <p:nvPr/>
+          </p:nvSpPr>
+          <p:spPr>
+            <a:xfrm>
+              <a:off x="5333404" y="2937119"/>
+              <a:ext cx="513282" cy="369332"/>
+            </a:xfrm>
+            <a:prstGeom prst="rect">
+              <a:avLst/>
+            </a:prstGeom>
+            <a:noFill/>
+          </p:spPr>
+          <p:txBody>
+            <a:bodyPr wrap="none" rtlCol="0">
+              <a:spAutoFit/>
+            </a:bodyPr>
+            <a:lstStyle/>
+            <a:p>
+              <a:r>
+                <a:rPr kumimoji="1" lang="en-US" altLang="zh-CN">
+                  <a:latin typeface="Arial Hebrew Scholar" charset="-79"/>
+                  <a:ea typeface="Arial Hebrew Scholar" charset="-79"/>
+                  <a:cs typeface="Arial Hebrew Scholar" charset="-79"/>
+                </a:rPr>
+                <a:t>k=2</a:t>
+              </a:r>
+              <a:endParaRPr kumimoji="1" lang="zh-CN" altLang="en-US">
+                <a:latin typeface="Arial Hebrew Scholar" charset="-79"/>
+                <a:ea typeface="Arial Hebrew Scholar" charset="-79"/>
+                <a:cs typeface="Arial Hebrew Scholar" charset="-79"/>
+              </a:endParaRPr>
+            </a:p>
+          </p:txBody>
+        </p:sp>
+        <p:sp>
+          <p:nvSpPr>
+            <p:cNvPr id="100" name="文本框 99"/>
+            <p:cNvSpPr txBox="1"/>
+            <p:nvPr/>
+          </p:nvSpPr>
+          <p:spPr>
+            <a:xfrm>
+              <a:off x="3848174" y="3295271"/>
+              <a:ext cx="513282" cy="369332"/>
+            </a:xfrm>
+            <a:prstGeom prst="rect">
+              <a:avLst/>
+            </a:prstGeom>
+            <a:noFill/>
+          </p:spPr>
+          <p:txBody>
+            <a:bodyPr wrap="none" rtlCol="0">
+              <a:spAutoFit/>
+            </a:bodyPr>
+            <a:lstStyle/>
+            <a:p>
+              <a:r>
+                <a:rPr kumimoji="1" lang="en-US" altLang="zh-CN">
+                  <a:latin typeface="Arial Hebrew Scholar" charset="-79"/>
+                  <a:ea typeface="Arial Hebrew Scholar" charset="-79"/>
+                  <a:cs typeface="Arial Hebrew Scholar" charset="-79"/>
+                </a:rPr>
+                <a:t>k=3</a:t>
+              </a:r>
+              <a:endParaRPr kumimoji="1" lang="zh-CN" altLang="en-US">
+                <a:latin typeface="Arial Hebrew Scholar" charset="-79"/>
+                <a:ea typeface="Arial Hebrew Scholar" charset="-79"/>
+                <a:cs typeface="Arial Hebrew Scholar" charset="-79"/>
+              </a:endParaRPr>
+            </a:p>
+          </p:txBody>
+        </p:sp>
+        <p:cxnSp>
+          <p:nvCxnSpPr>
+            <p:cNvPr id="105" name="直线箭头连接符 104"/>
+            <p:cNvCxnSpPr>
+              <a:stCxn id="20" idx="3"/>
+              <a:endCxn id="21" idx="1"/>
+            </p:cNvCxnSpPr>
+            <p:nvPr/>
+          </p:nvCxnSpPr>
+          <p:spPr>
+            <a:xfrm>
+              <a:off x="2365202" y="2515937"/>
+              <a:ext cx="477321" cy="0"/>
+            </a:xfrm>
+            <a:prstGeom prst="straightConnector1">
+              <a:avLst/>
+            </a:prstGeom>
+            <a:ln w="19050">
+              <a:headEnd type="none" w="med" len="med"/>
+              <a:tailEnd type="arrow" w="med" len="med"/>
+            </a:ln>
+          </p:spPr>
+          <p:style>
+            <a:lnRef idx="1">
+              <a:schemeClr val="accent1"/>
+            </a:lnRef>
+            <a:fillRef idx="0">
+              <a:schemeClr val="accent1"/>
+            </a:fillRef>
+            <a:effectRef idx="0">
+              <a:schemeClr val="accent1"/>
+            </a:effectRef>
+            <a:fontRef idx="minor">
+              <a:schemeClr val="tx1"/>
+            </a:fontRef>
+          </p:style>
+        </p:cxnSp>
+        <p:cxnSp>
+          <p:nvCxnSpPr>
+            <p:cNvPr id="108" name="曲线连接符 107"/>
+            <p:cNvCxnSpPr>
+              <a:stCxn id="36" idx="0"/>
+              <a:endCxn id="37" idx="0"/>
+            </p:cNvCxnSpPr>
+            <p:nvPr/>
+          </p:nvCxnSpPr>
+          <p:spPr>
+            <a:xfrm rot="5400000" flipH="1" flipV="1">
+              <a:off x="7510466" y="1845278"/>
+              <a:ext cx="12700" cy="981319"/>
+            </a:xfrm>
+            <a:prstGeom prst="curvedConnector3">
+              <a:avLst>
+                <a:gd name="adj1" fmla="val 3092307"/>
+              </a:avLst>
+            </a:prstGeom>
+            <a:ln w="19050">
+              <a:solidFill>
+                <a:schemeClr val="accent1"/>
+              </a:solidFill>
+              <a:headEnd type="none" w="med" len="med"/>
+              <a:tailEnd type="arrow" w="med" len="med"/>
+            </a:ln>
+          </p:spPr>
+          <p:style>
+            <a:lnRef idx="1">
+              <a:schemeClr val="accent1"/>
+            </a:lnRef>
+            <a:fillRef idx="0">
+              <a:schemeClr val="accent1"/>
+            </a:fillRef>
+            <a:effectRef idx="0">
+              <a:schemeClr val="accent1"/>
+            </a:effectRef>
+            <a:fontRef idx="minor">
+              <a:schemeClr val="tx1"/>
+            </a:fontRef>
+          </p:style>
+        </p:cxnSp>
+        <p:sp>
+          <p:nvSpPr>
+            <p:cNvPr id="113" name="文本框 112"/>
+            <p:cNvSpPr txBox="1"/>
+            <p:nvPr/>
+          </p:nvSpPr>
+          <p:spPr>
+            <a:xfrm>
+              <a:off x="7271807" y="1540757"/>
+              <a:ext cx="513282" cy="369332"/>
+            </a:xfrm>
+            <a:prstGeom prst="rect">
+              <a:avLst/>
+            </a:prstGeom>
+            <a:noFill/>
+          </p:spPr>
+          <p:txBody>
+            <a:bodyPr wrap="none" rtlCol="0">
+              <a:spAutoFit/>
+            </a:bodyPr>
+            <a:lstStyle/>
+            <a:p>
+              <a:r>
+                <a:rPr kumimoji="1" lang="en-US" altLang="zh-CN">
+                  <a:latin typeface="Arial Hebrew Scholar" charset="-79"/>
+                  <a:ea typeface="Arial Hebrew Scholar" charset="-79"/>
+                  <a:cs typeface="Arial Hebrew Scholar" charset="-79"/>
+                </a:rPr>
+                <a:t>k=5</a:t>
+              </a:r>
+              <a:endParaRPr kumimoji="1" lang="zh-CN" altLang="en-US">
+                <a:latin typeface="Arial Hebrew Scholar" charset="-79"/>
+                <a:ea typeface="Arial Hebrew Scholar" charset="-79"/>
+                <a:cs typeface="Arial Hebrew Scholar" charset="-79"/>
+              </a:endParaRPr>
+            </a:p>
+          </p:txBody>
+        </p:sp>
+        <p:sp>
+          <p:nvSpPr>
+            <p:cNvPr id="120" name="文本框 119"/>
+            <p:cNvSpPr txBox="1"/>
+            <p:nvPr/>
+          </p:nvSpPr>
+          <p:spPr>
+            <a:xfrm>
+              <a:off x="1766921" y="2939675"/>
+              <a:ext cx="692562" cy="369332"/>
+            </a:xfrm>
+            <a:prstGeom prst="rect">
+              <a:avLst/>
+            </a:prstGeom>
+            <a:noFill/>
+          </p:spPr>
+          <p:txBody>
+            <a:bodyPr wrap="none" rtlCol="0">
+              <a:spAutoFit/>
+            </a:bodyPr>
+            <a:lstStyle/>
+            <a:p>
+              <a:r>
+                <a:rPr kumimoji="1" lang="en-US" altLang="zh-CN">
+                  <a:latin typeface="Arial Hebrew Scholar" charset="-79"/>
+                  <a:ea typeface="Arial Hebrew Scholar" charset="-79"/>
+                  <a:cs typeface="Arial Hebrew Scholar" charset="-79"/>
+                </a:rPr>
+                <a:t>index</a:t>
+              </a:r>
+              <a:endParaRPr kumimoji="1" lang="zh-CN" altLang="en-US">
+                <a:latin typeface="Arial Hebrew Scholar" charset="-79"/>
+                <a:ea typeface="Arial Hebrew Scholar" charset="-79"/>
+                <a:cs typeface="Arial Hebrew Scholar" charset="-79"/>
+              </a:endParaRPr>
+            </a:p>
+          </p:txBody>
+        </p:sp>
+        <p:sp>
+          <p:nvSpPr>
+            <p:cNvPr id="121" name="文本框 120"/>
+            <p:cNvSpPr txBox="1"/>
+            <p:nvPr/>
+          </p:nvSpPr>
+          <p:spPr>
+            <a:xfrm>
+              <a:off x="2538560" y="2937119"/>
+              <a:ext cx="1218539" cy="369332"/>
+            </a:xfrm>
+            <a:prstGeom prst="rect">
+              <a:avLst/>
+            </a:prstGeom>
+            <a:noFill/>
+          </p:spPr>
+          <p:txBody>
+            <a:bodyPr wrap="none" rtlCol="0">
+              <a:spAutoFit/>
+            </a:bodyPr>
+            <a:lstStyle/>
+            <a:p>
+              <a:r>
+                <a:rPr kumimoji="1" lang="en-US" altLang="zh-CN">
+                  <a:latin typeface="Arial Hebrew Scholar" charset="-79"/>
+                  <a:ea typeface="Arial Hebrew Scholar" charset="-79"/>
+                  <a:cs typeface="Arial Hebrew Scholar" charset="-79"/>
+                </a:rPr>
+                <a:t>next_index</a:t>
+              </a:r>
+              <a:endParaRPr kumimoji="1" lang="zh-CN" altLang="en-US">
+                <a:latin typeface="Arial Hebrew Scholar" charset="-79"/>
+                <a:ea typeface="Arial Hebrew Scholar" charset="-79"/>
+                <a:cs typeface="Arial Hebrew Scholar" charset="-79"/>
+              </a:endParaRPr>
+            </a:p>
+          </p:txBody>
+        </p:sp>
+      </p:grpSp>
+    </p:spTree>
+    <p:extLst>
+      <p:ext uri="{BB962C8B-B14F-4D97-AF65-F5344CB8AC3E}">
+        <p14:creationId xmlns:p14="http://schemas.microsoft.com/office/powerpoint/2010/main" val="2133186730"/>
+      </p:ext>
+    </p:extLst>
+  </p:cSld>
+  <p:clrMapOvr>
+    <a:masterClrMapping/>
+  </p:clrMapOvr>
+</p:sld>
+</file>
+
+<file path=ppt/slides/slide4.xml><?xml version="1.0" encoding="utf-8"?>
+<p:sld xmlns:a="http://schemas.openxmlformats.org/drawingml/2006/main" xmlns:r="http://schemas.openxmlformats.org/officeDocument/2006/relationships" xmlns:p="http://schemas.openxmlformats.org/presentationml/2006/main">
+  <p:cSld>
+    <p:spTree>
+      <p:nvGrpSpPr>
+        <p:cNvPr id="1" name=""/>
+        <p:cNvGrpSpPr/>
+        <p:nvPr/>
+      </p:nvGrpSpPr>
+      <p:grpSpPr>
+        <a:xfrm>
+          <a:off x="0" y="0"/>
+          <a:ext cx="0" cy="0"/>
+          <a:chOff x="0" y="0"/>
+          <a:chExt cx="0" cy="0"/>
+        </a:xfrm>
+      </p:grpSpPr>
+      <p:grpSp>
+        <p:nvGrpSpPr>
+          <p:cNvPr id="35" name="组 34"/>
+          <p:cNvGrpSpPr/>
+          <p:nvPr/>
+        </p:nvGrpSpPr>
+        <p:grpSpPr>
+          <a:xfrm>
+            <a:off x="1613294" y="130845"/>
+            <a:ext cx="4981814" cy="1382586"/>
+            <a:chOff x="1613294" y="3811476"/>
+            <a:chExt cx="4981814" cy="1382586"/>
+          </a:xfrm>
+        </p:grpSpPr>
+        <p:cxnSp>
+          <p:nvCxnSpPr>
+            <p:cNvPr id="5" name="直线箭头连接符 4"/>
+            <p:cNvCxnSpPr/>
+            <p:nvPr/>
+          </p:nvCxnSpPr>
+          <p:spPr>
+            <a:xfrm>
+              <a:off x="1879108" y="5184462"/>
+              <a:ext cx="4716000" cy="0"/>
+            </a:xfrm>
+            <a:prstGeom prst="straightConnector1">
+              <a:avLst/>
+            </a:prstGeom>
+            <a:ln w="19050">
+              <a:solidFill>
+                <a:schemeClr val="tx1"/>
+              </a:solidFill>
+              <a:headEnd type="none" w="med" len="med"/>
+              <a:tailEnd type="arrow" w="med" len="med"/>
+            </a:ln>
+          </p:spPr>
+          <p:style>
+            <a:lnRef idx="1">
+              <a:schemeClr val="accent1"/>
+            </a:lnRef>
+            <a:fillRef idx="0">
+              <a:schemeClr val="accent1"/>
+            </a:fillRef>
+            <a:effectRef idx="0">
+              <a:schemeClr val="accent1"/>
+            </a:effectRef>
+            <a:fontRef idx="minor">
+              <a:schemeClr val="tx1"/>
+            </a:fontRef>
+          </p:style>
+        </p:cxnSp>
+        <p:cxnSp>
+          <p:nvCxnSpPr>
+            <p:cNvPr id="7" name="直线箭头连接符 6"/>
+            <p:cNvCxnSpPr/>
+            <p:nvPr/>
+          </p:nvCxnSpPr>
+          <p:spPr>
+            <a:xfrm flipV="1">
+              <a:off x="1879108" y="3811476"/>
+              <a:ext cx="0" cy="1368000"/>
+            </a:xfrm>
+            <a:prstGeom prst="straightConnector1">
+              <a:avLst/>
+            </a:prstGeom>
+            <a:ln w="19050">
+              <a:solidFill>
+                <a:schemeClr val="tx1"/>
+              </a:solidFill>
+              <a:headEnd type="none" w="med" len="med"/>
+              <a:tailEnd type="arrow" w="med" len="med"/>
+            </a:ln>
+          </p:spPr>
+          <p:style>
+            <a:lnRef idx="1">
+              <a:schemeClr val="accent1"/>
+            </a:lnRef>
+            <a:fillRef idx="0">
+              <a:schemeClr val="accent1"/>
+            </a:fillRef>
+            <a:effectRef idx="0">
+              <a:schemeClr val="accent1"/>
+            </a:effectRef>
+            <a:fontRef idx="minor">
+              <a:schemeClr val="tx1"/>
+            </a:fontRef>
+          </p:style>
+        </p:cxnSp>
+        <p:sp>
+          <p:nvSpPr>
+            <p:cNvPr id="9" name="矩形 8"/>
+            <p:cNvSpPr/>
+            <p:nvPr/>
+          </p:nvSpPr>
+          <p:spPr>
+            <a:xfrm>
+              <a:off x="2959108" y="4464462"/>
+              <a:ext cx="360000" cy="720000"/>
+            </a:xfrm>
+            <a:prstGeom prst="rect">
+              <a:avLst/>
+            </a:prstGeom>
+            <a:solidFill>
+              <a:schemeClr val="tx1"/>
+            </a:solidFill>
+            <a:ln>
+              <a:noFill/>
+            </a:ln>
+          </p:spPr>
+          <p:style>
+            <a:lnRef idx="2">
+              <a:schemeClr val="accent1">
+                <a:shade val="50000"/>
+              </a:schemeClr>
+            </a:lnRef>
+            <a:fillRef idx="1">
+              <a:schemeClr val="accent1"/>
+            </a:fillRef>
+            <a:effectRef idx="0">
+              <a:schemeClr val="accent1"/>
+            </a:effectRef>
+            <a:fontRef idx="minor">
+              <a:schemeClr val="lt1"/>
+            </a:fontRef>
+          </p:style>
+          <p:txBody>
+            <a:bodyPr rtlCol="0" anchor="ctr"/>
+            <a:lstStyle/>
+            <a:p>
+              <a:pPr algn="ctr"/>
+              <a:endParaRPr kumimoji="1" lang="zh-CN" altLang="en-US"/>
+            </a:p>
+          </p:txBody>
+        </p:sp>
+        <p:sp>
+          <p:nvSpPr>
+            <p:cNvPr id="11" name="矩形 10"/>
+            <p:cNvSpPr/>
+            <p:nvPr/>
+          </p:nvSpPr>
+          <p:spPr>
+            <a:xfrm>
+              <a:off x="2239108" y="4824462"/>
+              <a:ext cx="360000" cy="360000"/>
+            </a:xfrm>
+            <a:prstGeom prst="rect">
+              <a:avLst/>
+            </a:prstGeom>
+            <a:solidFill>
+              <a:schemeClr val="tx1"/>
+            </a:solidFill>
+            <a:ln>
+              <a:noFill/>
+            </a:ln>
+          </p:spPr>
+          <p:style>
+            <a:lnRef idx="2">
+              <a:schemeClr val="accent1">
+                <a:shade val="50000"/>
+              </a:schemeClr>
+            </a:lnRef>
+            <a:fillRef idx="1">
+              <a:schemeClr val="accent1"/>
+            </a:fillRef>
+            <a:effectRef idx="0">
+              <a:schemeClr val="accent1"/>
+            </a:effectRef>
+            <a:fontRef idx="minor">
+              <a:schemeClr val="lt1"/>
+            </a:fontRef>
+          </p:style>
+          <p:txBody>
+            <a:bodyPr rtlCol="0" anchor="ctr"/>
+            <a:lstStyle/>
+            <a:p>
+              <a:pPr algn="ctr"/>
+              <a:endParaRPr kumimoji="1" lang="zh-CN" altLang="en-US"/>
+            </a:p>
+          </p:txBody>
+        </p:sp>
+        <p:sp>
+          <p:nvSpPr>
+            <p:cNvPr id="12" name="矩形 11"/>
+            <p:cNvSpPr/>
+            <p:nvPr/>
+          </p:nvSpPr>
+          <p:spPr>
+            <a:xfrm>
+              <a:off x="1879108" y="5148462"/>
+              <a:ext cx="360000" cy="36000"/>
+            </a:xfrm>
+            <a:prstGeom prst="rect">
+              <a:avLst/>
+            </a:prstGeom>
+            <a:solidFill>
+              <a:schemeClr val="tx1"/>
+            </a:solidFill>
+            <a:ln>
+              <a:noFill/>
+            </a:ln>
+          </p:spPr>
+          <p:style>
+            <a:lnRef idx="2">
+              <a:schemeClr val="accent1">
+                <a:shade val="50000"/>
+              </a:schemeClr>
+            </a:lnRef>
+            <a:fillRef idx="1">
+              <a:schemeClr val="accent1"/>
+            </a:fillRef>
+            <a:effectRef idx="0">
+              <a:schemeClr val="accent1"/>
+            </a:effectRef>
+            <a:fontRef idx="minor">
+              <a:schemeClr val="lt1"/>
+            </a:fontRef>
+          </p:style>
+          <p:txBody>
+            <a:bodyPr rtlCol="0" anchor="ctr"/>
+            <a:lstStyle/>
+            <a:p>
+              <a:pPr algn="ctr"/>
+              <a:endParaRPr kumimoji="1" lang="zh-CN" altLang="en-US"/>
+            </a:p>
+          </p:txBody>
+        </p:sp>
+        <p:sp>
+          <p:nvSpPr>
+            <p:cNvPr id="13" name="矩形 12"/>
+            <p:cNvSpPr/>
+            <p:nvPr/>
+          </p:nvSpPr>
+          <p:spPr>
+            <a:xfrm>
+              <a:off x="2599108" y="5148462"/>
+              <a:ext cx="360000" cy="36000"/>
+            </a:xfrm>
+            <a:prstGeom prst="rect">
+              <a:avLst/>
+            </a:prstGeom>
+            <a:solidFill>
+              <a:schemeClr val="tx1"/>
+            </a:solidFill>
+            <a:ln>
+              <a:noFill/>
+            </a:ln>
+          </p:spPr>
+          <p:style>
+            <a:lnRef idx="2">
+              <a:schemeClr val="accent1">
+                <a:shade val="50000"/>
+              </a:schemeClr>
+            </a:lnRef>
+            <a:fillRef idx="1">
+              <a:schemeClr val="accent1"/>
+            </a:fillRef>
+            <a:effectRef idx="0">
+              <a:schemeClr val="accent1"/>
+            </a:effectRef>
+            <a:fontRef idx="minor">
+              <a:schemeClr val="lt1"/>
+            </a:fontRef>
+          </p:style>
+          <p:txBody>
+            <a:bodyPr rtlCol="0" anchor="ctr"/>
+            <a:lstStyle/>
+            <a:p>
+              <a:pPr algn="ctr"/>
+              <a:endParaRPr kumimoji="1" lang="zh-CN" altLang="en-US"/>
+            </a:p>
+          </p:txBody>
+        </p:sp>
+        <p:sp>
+          <p:nvSpPr>
+            <p:cNvPr id="14" name="矩形 13"/>
+            <p:cNvSpPr/>
+            <p:nvPr/>
+          </p:nvSpPr>
+          <p:spPr>
+            <a:xfrm>
+              <a:off x="3283007" y="4824462"/>
+              <a:ext cx="360000" cy="360000"/>
+            </a:xfrm>
+            <a:prstGeom prst="rect">
+              <a:avLst/>
+            </a:prstGeom>
+            <a:solidFill>
+              <a:schemeClr val="tx1"/>
+            </a:solidFill>
+            <a:ln>
+              <a:noFill/>
+            </a:ln>
+          </p:spPr>
+          <p:style>
+            <a:lnRef idx="2">
+              <a:schemeClr val="accent1">
+                <a:shade val="50000"/>
+              </a:schemeClr>
+            </a:lnRef>
+            <a:fillRef idx="1">
+              <a:schemeClr val="accent1"/>
+            </a:fillRef>
+            <a:effectRef idx="0">
+              <a:schemeClr val="accent1"/>
+            </a:effectRef>
+            <a:fontRef idx="minor">
+              <a:schemeClr val="lt1"/>
+            </a:fontRef>
+          </p:style>
+          <p:txBody>
+            <a:bodyPr rtlCol="0" anchor="ctr"/>
+            <a:lstStyle/>
+            <a:p>
+              <a:pPr algn="ctr"/>
+              <a:endParaRPr kumimoji="1" lang="zh-CN" altLang="en-US"/>
+            </a:p>
+          </p:txBody>
+        </p:sp>
+        <p:sp>
+          <p:nvSpPr>
+            <p:cNvPr id="15" name="矩形 14"/>
+            <p:cNvSpPr/>
+            <p:nvPr/>
+          </p:nvSpPr>
+          <p:spPr>
+            <a:xfrm>
+              <a:off x="3642352" y="5148462"/>
+              <a:ext cx="360000" cy="36000"/>
+            </a:xfrm>
+            <a:prstGeom prst="rect">
+              <a:avLst/>
+            </a:prstGeom>
+            <a:solidFill>
+              <a:schemeClr val="tx1"/>
+            </a:solidFill>
+            <a:ln>
+              <a:noFill/>
+            </a:ln>
+          </p:spPr>
+          <p:style>
+            <a:lnRef idx="2">
+              <a:schemeClr val="accent1">
+                <a:shade val="50000"/>
+              </a:schemeClr>
+            </a:lnRef>
+            <a:fillRef idx="1">
+              <a:schemeClr val="accent1"/>
+            </a:fillRef>
+            <a:effectRef idx="0">
+              <a:schemeClr val="accent1"/>
+            </a:effectRef>
+            <a:fontRef idx="minor">
+              <a:schemeClr val="lt1"/>
+            </a:fontRef>
+          </p:style>
+          <p:txBody>
+            <a:bodyPr rtlCol="0" anchor="ctr"/>
+            <a:lstStyle/>
+            <a:p>
+              <a:pPr algn="ctr"/>
+              <a:endParaRPr kumimoji="1" lang="zh-CN" altLang="en-US"/>
+            </a:p>
+          </p:txBody>
+        </p:sp>
+        <p:sp>
+          <p:nvSpPr>
+            <p:cNvPr id="17" name="矩形 16"/>
+            <p:cNvSpPr/>
+            <p:nvPr/>
+          </p:nvSpPr>
+          <p:spPr>
+            <a:xfrm>
+              <a:off x="4720613" y="4464462"/>
+              <a:ext cx="360000" cy="720000"/>
+            </a:xfrm>
+            <a:prstGeom prst="rect">
+              <a:avLst/>
+            </a:prstGeom>
+            <a:solidFill>
+              <a:schemeClr val="tx1"/>
+            </a:solidFill>
+            <a:ln>
+              <a:noFill/>
+            </a:ln>
+          </p:spPr>
+          <p:style>
+            <a:lnRef idx="2">
+              <a:schemeClr val="accent1">
+                <a:shade val="50000"/>
+              </a:schemeClr>
+            </a:lnRef>
+            <a:fillRef idx="1">
+              <a:schemeClr val="accent1"/>
+            </a:fillRef>
+            <a:effectRef idx="0">
+              <a:schemeClr val="accent1"/>
+            </a:effectRef>
+            <a:fontRef idx="minor">
+              <a:schemeClr val="lt1"/>
+            </a:fontRef>
+          </p:style>
+          <p:txBody>
+            <a:bodyPr rtlCol="0" anchor="ctr"/>
+            <a:lstStyle/>
+            <a:p>
+              <a:pPr algn="ctr"/>
+              <a:endParaRPr kumimoji="1" lang="zh-CN" altLang="en-US"/>
+            </a:p>
+          </p:txBody>
+        </p:sp>
+        <p:sp>
+          <p:nvSpPr>
+            <p:cNvPr id="18" name="矩形 17"/>
+            <p:cNvSpPr/>
+            <p:nvPr/>
+          </p:nvSpPr>
+          <p:spPr>
+            <a:xfrm>
+              <a:off x="5079958" y="4824462"/>
+              <a:ext cx="360000" cy="360000"/>
+            </a:xfrm>
+            <a:prstGeom prst="rect">
+              <a:avLst/>
+            </a:prstGeom>
+            <a:solidFill>
+              <a:schemeClr val="tx1"/>
+            </a:solidFill>
+            <a:ln>
+              <a:noFill/>
+            </a:ln>
+          </p:spPr>
+          <p:style>
+            <a:lnRef idx="2">
+              <a:schemeClr val="accent1">
+                <a:shade val="50000"/>
+              </a:schemeClr>
+            </a:lnRef>
+            <a:fillRef idx="1">
+              <a:schemeClr val="accent1"/>
+            </a:fillRef>
+            <a:effectRef idx="0">
+              <a:schemeClr val="accent1"/>
+            </a:effectRef>
+            <a:fontRef idx="minor">
+              <a:schemeClr val="lt1"/>
+            </a:fontRef>
+          </p:style>
+          <p:txBody>
+            <a:bodyPr rtlCol="0" anchor="ctr"/>
+            <a:lstStyle/>
+            <a:p>
+              <a:pPr algn="ctr"/>
+              <a:endParaRPr kumimoji="1" lang="zh-CN" altLang="en-US"/>
+            </a:p>
+          </p:txBody>
+        </p:sp>
+        <p:sp>
+          <p:nvSpPr>
+            <p:cNvPr id="20" name="矩形 19"/>
+            <p:cNvSpPr/>
+            <p:nvPr/>
+          </p:nvSpPr>
+          <p:spPr>
+            <a:xfrm>
+              <a:off x="5763726" y="4834062"/>
+              <a:ext cx="360000" cy="360000"/>
+            </a:xfrm>
+            <a:prstGeom prst="rect">
+              <a:avLst/>
+            </a:prstGeom>
+            <a:solidFill>
+              <a:schemeClr val="tx1"/>
+            </a:solidFill>
+            <a:ln>
+              <a:noFill/>
+            </a:ln>
+          </p:spPr>
+          <p:style>
+            <a:lnRef idx="2">
+              <a:schemeClr val="accent1">
+                <a:shade val="50000"/>
+              </a:schemeClr>
+            </a:lnRef>
+            <a:fillRef idx="1">
+              <a:schemeClr val="accent1"/>
+            </a:fillRef>
+            <a:effectRef idx="0">
+              <a:schemeClr val="accent1"/>
+            </a:effectRef>
+            <a:fontRef idx="minor">
+              <a:schemeClr val="lt1"/>
+            </a:fontRef>
+          </p:style>
+          <p:txBody>
+            <a:bodyPr rtlCol="0" anchor="ctr"/>
+            <a:lstStyle/>
+            <a:p>
+              <a:pPr algn="ctr"/>
+              <a:endParaRPr kumimoji="1" lang="zh-CN" altLang="en-US"/>
+            </a:p>
+          </p:txBody>
+        </p:sp>
+        <p:cxnSp>
+          <p:nvCxnSpPr>
+            <p:cNvPr id="23" name="直线连接符 22"/>
+            <p:cNvCxnSpPr/>
+            <p:nvPr/>
+          </p:nvCxnSpPr>
+          <p:spPr>
+            <a:xfrm flipV="1">
+              <a:off x="1883146" y="4818187"/>
+              <a:ext cx="2232000" cy="11723"/>
+            </a:xfrm>
+            <a:prstGeom prst="line">
+              <a:avLst/>
+            </a:prstGeom>
+            <a:ln>
+              <a:solidFill>
+                <a:schemeClr val="tx1"/>
+              </a:solidFill>
+              <a:prstDash val="dash"/>
+            </a:ln>
+          </p:spPr>
+          <p:style>
+            <a:lnRef idx="1">
+              <a:schemeClr val="accent1"/>
+            </a:lnRef>
+            <a:fillRef idx="0">
+              <a:schemeClr val="accent1"/>
+            </a:fillRef>
+            <a:effectRef idx="0">
+              <a:schemeClr val="accent1"/>
+            </a:effectRef>
+            <a:fontRef idx="minor">
+              <a:schemeClr val="tx1"/>
+            </a:fontRef>
+          </p:style>
+        </p:cxnSp>
+        <p:cxnSp>
+          <p:nvCxnSpPr>
+            <p:cNvPr id="25" name="直线连接符 24"/>
+            <p:cNvCxnSpPr/>
+            <p:nvPr/>
+          </p:nvCxnSpPr>
+          <p:spPr>
+            <a:xfrm flipV="1">
+              <a:off x="1875071" y="4464049"/>
+              <a:ext cx="3708000" cy="11723"/>
+            </a:xfrm>
+            <a:prstGeom prst="line">
+              <a:avLst/>
+            </a:prstGeom>
+            <a:ln>
+              <a:solidFill>
+                <a:schemeClr val="tx1"/>
+              </a:solidFill>
+              <a:prstDash val="dash"/>
+            </a:ln>
+          </p:spPr>
+          <p:style>
+            <a:lnRef idx="1">
+              <a:schemeClr val="accent1"/>
+            </a:lnRef>
+            <a:fillRef idx="0">
+              <a:schemeClr val="accent1"/>
+            </a:fillRef>
+            <a:effectRef idx="0">
+              <a:schemeClr val="accent1"/>
+            </a:effectRef>
+            <a:fontRef idx="minor">
+              <a:schemeClr val="tx1"/>
+            </a:fontRef>
+          </p:style>
+        </p:cxnSp>
+        <p:cxnSp>
+          <p:nvCxnSpPr>
+            <p:cNvPr id="26" name="直线连接符 25"/>
+            <p:cNvCxnSpPr/>
+            <p:nvPr/>
+          </p:nvCxnSpPr>
+          <p:spPr>
+            <a:xfrm flipV="1">
+              <a:off x="1875071" y="4100400"/>
+              <a:ext cx="3888000" cy="0"/>
+            </a:xfrm>
+            <a:prstGeom prst="line">
+              <a:avLst/>
+            </a:prstGeom>
+            <a:ln>
+              <a:solidFill>
+                <a:schemeClr val="tx1"/>
+              </a:solidFill>
+              <a:prstDash val="dash"/>
+            </a:ln>
+          </p:spPr>
+          <p:style>
+            <a:lnRef idx="1">
+              <a:schemeClr val="accent1"/>
+            </a:lnRef>
+            <a:fillRef idx="0">
+              <a:schemeClr val="accent1"/>
+            </a:fillRef>
+            <a:effectRef idx="0">
+              <a:schemeClr val="accent1"/>
+            </a:effectRef>
+            <a:fontRef idx="minor">
+              <a:schemeClr val="tx1"/>
+            </a:fontRef>
+          </p:style>
+        </p:cxnSp>
+        <p:sp>
+          <p:nvSpPr>
+            <p:cNvPr id="27" name="矩形 26"/>
+            <p:cNvSpPr/>
+            <p:nvPr/>
+          </p:nvSpPr>
+          <p:spPr>
+            <a:xfrm>
+              <a:off x="2601242" y="4820031"/>
+              <a:ext cx="360000" cy="360000"/>
+            </a:xfrm>
+            <a:prstGeom prst="rect">
+              <a:avLst/>
+            </a:prstGeom>
+            <a:ln>
+              <a:noFill/>
+            </a:ln>
+          </p:spPr>
+          <p:style>
+            <a:lnRef idx="2">
+              <a:schemeClr val="accent1">
+                <a:shade val="50000"/>
+              </a:schemeClr>
+            </a:lnRef>
+            <a:fillRef idx="1">
+              <a:schemeClr val="accent1"/>
+            </a:fillRef>
+            <a:effectRef idx="0">
+              <a:schemeClr val="accent1"/>
+            </a:effectRef>
+            <a:fontRef idx="minor">
+              <a:schemeClr val="lt1"/>
+            </a:fontRef>
+          </p:style>
+          <p:txBody>
+            <a:bodyPr rtlCol="0" anchor="ctr"/>
+            <a:lstStyle/>
+            <a:p>
+              <a:pPr algn="ctr"/>
+              <a:endParaRPr kumimoji="1" lang="zh-CN" altLang="en-US"/>
+            </a:p>
+          </p:txBody>
+        </p:sp>
+        <p:sp>
+          <p:nvSpPr>
+            <p:cNvPr id="28" name="矩形 27"/>
+            <p:cNvSpPr/>
+            <p:nvPr/>
+          </p:nvSpPr>
+          <p:spPr>
+            <a:xfrm>
+              <a:off x="3641727" y="4808308"/>
+              <a:ext cx="363600" cy="363600"/>
+            </a:xfrm>
+            <a:prstGeom prst="rect">
+              <a:avLst/>
+            </a:prstGeom>
+            <a:ln>
+              <a:noFill/>
+            </a:ln>
+          </p:spPr>
+          <p:style>
+            <a:lnRef idx="2">
+              <a:schemeClr val="accent1">
+                <a:shade val="50000"/>
+              </a:schemeClr>
+            </a:lnRef>
+            <a:fillRef idx="1">
+              <a:schemeClr val="accent1"/>
+            </a:fillRef>
+            <a:effectRef idx="0">
+              <a:schemeClr val="accent1"/>
+            </a:effectRef>
+            <a:fontRef idx="minor">
+              <a:schemeClr val="lt1"/>
+            </a:fontRef>
+          </p:style>
+          <p:txBody>
+            <a:bodyPr rtlCol="0" anchor="ctr"/>
+            <a:lstStyle/>
+            <a:p>
+              <a:pPr algn="ctr"/>
+              <a:endParaRPr kumimoji="1" lang="zh-CN" altLang="en-US"/>
+            </a:p>
+          </p:txBody>
+        </p:sp>
+        <p:sp>
+          <p:nvSpPr>
+            <p:cNvPr id="29" name="矩形 28"/>
+            <p:cNvSpPr/>
+            <p:nvPr/>
+          </p:nvSpPr>
+          <p:spPr>
+            <a:xfrm>
+              <a:off x="3293476" y="4464048"/>
+              <a:ext cx="1080000" cy="360000"/>
+            </a:xfrm>
+            <a:prstGeom prst="rect">
+              <a:avLst/>
+            </a:prstGeom>
+            <a:ln>
+              <a:noFill/>
+            </a:ln>
+          </p:spPr>
+          <p:style>
+            <a:lnRef idx="2">
+              <a:schemeClr val="accent1">
+                <a:shade val="50000"/>
+              </a:schemeClr>
+            </a:lnRef>
+            <a:fillRef idx="1">
+              <a:schemeClr val="accent1"/>
+            </a:fillRef>
+            <a:effectRef idx="0">
+              <a:schemeClr val="accent1"/>
+            </a:effectRef>
+            <a:fontRef idx="minor">
+              <a:schemeClr val="lt1"/>
+            </a:fontRef>
+          </p:style>
+          <p:txBody>
+            <a:bodyPr rtlCol="0" anchor="ctr"/>
+            <a:lstStyle/>
+            <a:p>
+              <a:pPr algn="ctr"/>
+              <a:endParaRPr kumimoji="1" lang="zh-CN" altLang="en-US"/>
+            </a:p>
+          </p:txBody>
+        </p:sp>
+        <p:sp>
+          <p:nvSpPr>
+            <p:cNvPr id="30" name="矩形 29"/>
+            <p:cNvSpPr/>
+            <p:nvPr/>
+          </p:nvSpPr>
+          <p:spPr>
+            <a:xfrm>
+              <a:off x="5073199" y="4468655"/>
+              <a:ext cx="360000" cy="360000"/>
+            </a:xfrm>
+            <a:prstGeom prst="rect">
+              <a:avLst/>
+            </a:prstGeom>
+            <a:ln>
+              <a:noFill/>
+            </a:ln>
+          </p:spPr>
+          <p:style>
+            <a:lnRef idx="2">
+              <a:schemeClr val="accent1">
+                <a:shade val="50000"/>
+              </a:schemeClr>
+            </a:lnRef>
+            <a:fillRef idx="1">
+              <a:schemeClr val="accent1"/>
+            </a:fillRef>
+            <a:effectRef idx="0">
+              <a:schemeClr val="accent1"/>
+            </a:effectRef>
+            <a:fontRef idx="minor">
+              <a:schemeClr val="lt1"/>
+            </a:fontRef>
+          </p:style>
+          <p:txBody>
+            <a:bodyPr rtlCol="0" anchor="ctr"/>
+            <a:lstStyle/>
+            <a:p>
+              <a:pPr algn="ctr"/>
+              <a:endParaRPr kumimoji="1" lang="zh-CN" altLang="en-US"/>
+            </a:p>
+          </p:txBody>
+        </p:sp>
+        <p:sp>
+          <p:nvSpPr>
+            <p:cNvPr id="31" name="矩形 30"/>
+            <p:cNvSpPr/>
+            <p:nvPr/>
+          </p:nvSpPr>
+          <p:spPr>
+            <a:xfrm>
+              <a:off x="4724334" y="4111837"/>
+              <a:ext cx="720000" cy="360000"/>
+            </a:xfrm>
+            <a:prstGeom prst="rect">
+              <a:avLst/>
+            </a:prstGeom>
+            <a:ln>
+              <a:noFill/>
+            </a:ln>
+          </p:spPr>
+          <p:style>
+            <a:lnRef idx="2">
+              <a:schemeClr val="accent1">
+                <a:shade val="50000"/>
+              </a:schemeClr>
+            </a:lnRef>
+            <a:fillRef idx="1">
+              <a:schemeClr val="accent1"/>
+            </a:fillRef>
+            <a:effectRef idx="0">
+              <a:schemeClr val="accent1"/>
+            </a:effectRef>
+            <a:fontRef idx="minor">
+              <a:schemeClr val="lt1"/>
+            </a:fontRef>
+          </p:style>
+          <p:txBody>
+            <a:bodyPr rtlCol="0" anchor="ctr"/>
+            <a:lstStyle/>
+            <a:p>
+              <a:pPr algn="ctr"/>
+              <a:endParaRPr kumimoji="1" lang="zh-CN" altLang="en-US"/>
+            </a:p>
+          </p:txBody>
+        </p:sp>
+        <p:sp>
+          <p:nvSpPr>
+            <p:cNvPr id="19" name="矩形 18"/>
+            <p:cNvSpPr/>
+            <p:nvPr/>
+          </p:nvSpPr>
+          <p:spPr>
+            <a:xfrm>
+              <a:off x="5409830" y="4111754"/>
+              <a:ext cx="360000" cy="1080000"/>
+            </a:xfrm>
+            <a:prstGeom prst="rect">
+              <a:avLst/>
+            </a:prstGeom>
+            <a:solidFill>
+              <a:schemeClr val="tx1"/>
+            </a:solidFill>
+            <a:ln>
+              <a:noFill/>
+            </a:ln>
+          </p:spPr>
+          <p:style>
+            <a:lnRef idx="2">
+              <a:schemeClr val="accent1">
+                <a:shade val="50000"/>
+              </a:schemeClr>
+            </a:lnRef>
+            <a:fillRef idx="1">
+              <a:schemeClr val="accent1"/>
+            </a:fillRef>
+            <a:effectRef idx="0">
+              <a:schemeClr val="accent1"/>
+            </a:effectRef>
+            <a:fontRef idx="minor">
+              <a:schemeClr val="lt1"/>
+            </a:fontRef>
+          </p:style>
+          <p:txBody>
+            <a:bodyPr rtlCol="0" anchor="ctr"/>
+            <a:lstStyle/>
+            <a:p>
+              <a:pPr algn="ctr"/>
+              <a:endParaRPr kumimoji="1" lang="zh-CN" altLang="en-US"/>
+            </a:p>
+          </p:txBody>
+        </p:sp>
+        <p:sp>
+          <p:nvSpPr>
+            <p:cNvPr id="32" name="文本框 31"/>
+            <p:cNvSpPr txBox="1"/>
+            <p:nvPr/>
+          </p:nvSpPr>
+          <p:spPr>
+            <a:xfrm>
+              <a:off x="1613294" y="4695562"/>
+              <a:ext cx="269626" cy="276999"/>
+            </a:xfrm>
+            <a:prstGeom prst="rect">
+              <a:avLst/>
+            </a:prstGeom>
+            <a:noFill/>
+          </p:spPr>
+          <p:txBody>
+            <a:bodyPr wrap="none" rtlCol="0">
+              <a:spAutoFit/>
+            </a:bodyPr>
+            <a:lstStyle/>
+            <a:p>
+              <a:r>
+                <a:rPr kumimoji="1" lang="en-US" altLang="zh-CN" sz="1200">
+                  <a:latin typeface="Arial" charset="0"/>
+                  <a:ea typeface="Arial" charset="0"/>
+                  <a:cs typeface="Arial" charset="0"/>
+                </a:rPr>
+                <a:t>1</a:t>
+              </a:r>
+              <a:endParaRPr kumimoji="1" lang="zh-CN" altLang="en-US" sz="1200">
+                <a:latin typeface="Arial" charset="0"/>
+                <a:ea typeface="Arial" charset="0"/>
+                <a:cs typeface="Arial" charset="0"/>
+              </a:endParaRPr>
+            </a:p>
+          </p:txBody>
+        </p:sp>
+        <p:sp>
+          <p:nvSpPr>
+            <p:cNvPr id="33" name="文本框 32"/>
+            <p:cNvSpPr txBox="1"/>
+            <p:nvPr/>
+          </p:nvSpPr>
+          <p:spPr>
+            <a:xfrm>
+              <a:off x="1613294" y="3961900"/>
+              <a:ext cx="269626" cy="276999"/>
+            </a:xfrm>
+            <a:prstGeom prst="rect">
+              <a:avLst/>
+            </a:prstGeom>
+            <a:noFill/>
+          </p:spPr>
+          <p:txBody>
+            <a:bodyPr wrap="none" rtlCol="0">
+              <a:spAutoFit/>
+            </a:bodyPr>
+            <a:lstStyle/>
+            <a:p>
+              <a:r>
+                <a:rPr kumimoji="1" lang="en-US" altLang="zh-CN" sz="1200">
+                  <a:latin typeface="Arial" charset="0"/>
+                  <a:ea typeface="Arial" charset="0"/>
+                  <a:cs typeface="Arial" charset="0"/>
+                </a:rPr>
+                <a:t>3</a:t>
+              </a:r>
+              <a:endParaRPr kumimoji="1" lang="zh-CN" altLang="en-US" sz="1200">
+                <a:latin typeface="Arial" charset="0"/>
+                <a:ea typeface="Arial" charset="0"/>
+                <a:cs typeface="Arial" charset="0"/>
+              </a:endParaRPr>
+            </a:p>
+          </p:txBody>
+        </p:sp>
+        <p:sp>
+          <p:nvSpPr>
+            <p:cNvPr id="34" name="文本框 33"/>
+            <p:cNvSpPr txBox="1"/>
+            <p:nvPr/>
+          </p:nvSpPr>
+          <p:spPr>
+            <a:xfrm>
+              <a:off x="1613294" y="4331913"/>
+              <a:ext cx="269626" cy="276999"/>
+            </a:xfrm>
+            <a:prstGeom prst="rect">
+              <a:avLst/>
+            </a:prstGeom>
+            <a:noFill/>
+          </p:spPr>
+          <p:txBody>
+            <a:bodyPr wrap="none" rtlCol="0">
+              <a:spAutoFit/>
+            </a:bodyPr>
+            <a:lstStyle/>
+            <a:p>
+              <a:r>
+                <a:rPr kumimoji="1" lang="en-US" altLang="zh-CN" sz="1200">
+                  <a:latin typeface="Arial" charset="0"/>
+                  <a:ea typeface="Arial" charset="0"/>
+                  <a:cs typeface="Arial" charset="0"/>
+                </a:rPr>
+                <a:t>2</a:t>
+              </a:r>
+              <a:endParaRPr kumimoji="1" lang="zh-CN" altLang="en-US" sz="1200">
+                <a:latin typeface="Arial" charset="0"/>
+                <a:ea typeface="Arial" charset="0"/>
+                <a:cs typeface="Arial" charset="0"/>
+              </a:endParaRPr>
+            </a:p>
+          </p:txBody>
+        </p:sp>
+        <p:sp>
+          <p:nvSpPr>
+            <p:cNvPr id="10" name="矩形 9"/>
+            <p:cNvSpPr/>
+            <p:nvPr/>
+          </p:nvSpPr>
+          <p:spPr>
+            <a:xfrm>
+              <a:off x="4366062" y="4104462"/>
+              <a:ext cx="360000" cy="1080000"/>
+            </a:xfrm>
+            <a:prstGeom prst="rect">
+              <a:avLst/>
+            </a:prstGeom>
+            <a:solidFill>
+              <a:schemeClr val="tx1"/>
+            </a:solidFill>
+            <a:ln>
+              <a:noFill/>
+            </a:ln>
+          </p:spPr>
+          <p:style>
+            <a:lnRef idx="2">
+              <a:schemeClr val="accent1">
+                <a:shade val="50000"/>
+              </a:schemeClr>
+            </a:lnRef>
+            <a:fillRef idx="1">
+              <a:schemeClr val="accent1"/>
+            </a:fillRef>
+            <a:effectRef idx="0">
+              <a:schemeClr val="accent1"/>
+            </a:effectRef>
+            <a:fontRef idx="minor">
+              <a:schemeClr val="lt1"/>
+            </a:fontRef>
+          </p:style>
+          <p:txBody>
+            <a:bodyPr rtlCol="0" anchor="ctr"/>
+            <a:lstStyle/>
+            <a:p>
+              <a:pPr algn="ctr"/>
+              <a:endParaRPr kumimoji="1" lang="zh-CN" altLang="en-US"/>
+            </a:p>
+          </p:txBody>
+        </p:sp>
+        <p:sp>
+          <p:nvSpPr>
+            <p:cNvPr id="16" name="矩形 15"/>
+            <p:cNvSpPr/>
+            <p:nvPr/>
+          </p:nvSpPr>
+          <p:spPr>
+            <a:xfrm>
+              <a:off x="4002025" y="4824462"/>
+              <a:ext cx="360000" cy="360000"/>
+            </a:xfrm>
+            <a:prstGeom prst="rect">
+              <a:avLst/>
+            </a:prstGeom>
+            <a:solidFill>
+              <a:schemeClr val="tx1"/>
+            </a:solidFill>
+            <a:ln>
+              <a:noFill/>
+            </a:ln>
+          </p:spPr>
+          <p:style>
+            <a:lnRef idx="2">
+              <a:schemeClr val="accent1">
+                <a:shade val="50000"/>
+              </a:schemeClr>
+            </a:lnRef>
+            <a:fillRef idx="1">
+              <a:schemeClr val="accent1"/>
+            </a:fillRef>
+            <a:effectRef idx="0">
+              <a:schemeClr val="accent1"/>
+            </a:effectRef>
+            <a:fontRef idx="minor">
+              <a:schemeClr val="lt1"/>
+            </a:fontRef>
+          </p:style>
+          <p:txBody>
+            <a:bodyPr rtlCol="0" anchor="ctr"/>
+            <a:lstStyle/>
+            <a:p>
+              <a:pPr algn="ctr"/>
+              <a:endParaRPr kumimoji="1" lang="zh-CN" altLang="en-US"/>
+            </a:p>
+          </p:txBody>
+        </p:sp>
+      </p:grpSp>
+      <p:grpSp>
+        <p:nvGrpSpPr>
+          <p:cNvPr id="22" name="组 21"/>
+          <p:cNvGrpSpPr/>
+          <p:nvPr/>
+        </p:nvGrpSpPr>
+        <p:grpSpPr>
+          <a:xfrm>
+            <a:off x="1613294" y="2090191"/>
+            <a:ext cx="4981814" cy="3980589"/>
+            <a:chOff x="1613294" y="2090191"/>
+            <a:chExt cx="4981814" cy="3980589"/>
+          </a:xfrm>
+        </p:grpSpPr>
+        <p:cxnSp>
+          <p:nvCxnSpPr>
+            <p:cNvPr id="37" name="直线箭头连接符 36"/>
+            <p:cNvCxnSpPr/>
+            <p:nvPr/>
+          </p:nvCxnSpPr>
+          <p:spPr>
+            <a:xfrm>
+              <a:off x="1879108" y="3463177"/>
+              <a:ext cx="4716000" cy="0"/>
+            </a:xfrm>
+            <a:prstGeom prst="straightConnector1">
+              <a:avLst/>
+            </a:prstGeom>
+            <a:ln w="19050">
+              <a:solidFill>
+                <a:schemeClr val="tx1"/>
+              </a:solidFill>
+              <a:headEnd type="none" w="med" len="med"/>
+              <a:tailEnd type="arrow" w="med" len="med"/>
+            </a:ln>
+          </p:spPr>
+          <p:style>
+            <a:lnRef idx="1">
+              <a:schemeClr val="accent1"/>
+            </a:lnRef>
+            <a:fillRef idx="0">
+              <a:schemeClr val="accent1"/>
+            </a:fillRef>
+            <a:effectRef idx="0">
+              <a:schemeClr val="accent1"/>
+            </a:effectRef>
+            <a:fontRef idx="minor">
+              <a:schemeClr val="tx1"/>
+            </a:fontRef>
+          </p:style>
+        </p:cxnSp>
+        <p:cxnSp>
+          <p:nvCxnSpPr>
+            <p:cNvPr id="38" name="直线箭头连接符 37"/>
+            <p:cNvCxnSpPr/>
+            <p:nvPr/>
+          </p:nvCxnSpPr>
+          <p:spPr>
+            <a:xfrm flipV="1">
+              <a:off x="1879108" y="2090191"/>
+              <a:ext cx="0" cy="1368000"/>
+            </a:xfrm>
+            <a:prstGeom prst="straightConnector1">
+              <a:avLst/>
+            </a:prstGeom>
+            <a:ln w="19050">
+              <a:solidFill>
+                <a:schemeClr val="tx1"/>
+              </a:solidFill>
+              <a:headEnd type="none" w="med" len="med"/>
+              <a:tailEnd type="arrow" w="med" len="med"/>
+            </a:ln>
+          </p:spPr>
+          <p:style>
+            <a:lnRef idx="1">
+              <a:schemeClr val="accent1"/>
+            </a:lnRef>
+            <a:fillRef idx="0">
+              <a:schemeClr val="accent1"/>
+            </a:fillRef>
+            <a:effectRef idx="0">
+              <a:schemeClr val="accent1"/>
+            </a:effectRef>
+            <a:fontRef idx="minor">
+              <a:schemeClr val="tx1"/>
+            </a:fontRef>
+          </p:style>
+        </p:cxnSp>
+        <p:sp>
+          <p:nvSpPr>
+            <p:cNvPr id="39" name="矩形 38"/>
+            <p:cNvSpPr/>
+            <p:nvPr/>
+          </p:nvSpPr>
+          <p:spPr>
+            <a:xfrm>
+              <a:off x="2907020" y="2731005"/>
+              <a:ext cx="360000" cy="720000"/>
+            </a:xfrm>
+            <a:prstGeom prst="rect">
+              <a:avLst/>
+            </a:prstGeom>
+            <a:noFill/>
+            <a:ln w="38100">
+              <a:solidFill>
+                <a:schemeClr val="tx1"/>
+              </a:solidFill>
+            </a:ln>
+          </p:spPr>
+          <p:style>
+            <a:lnRef idx="2">
+              <a:schemeClr val="accent1">
+                <a:shade val="50000"/>
+              </a:schemeClr>
+            </a:lnRef>
+            <a:fillRef idx="1">
+              <a:schemeClr val="accent1"/>
+            </a:fillRef>
+            <a:effectRef idx="0">
+              <a:schemeClr val="accent1"/>
+            </a:effectRef>
+            <a:fontRef idx="minor">
+              <a:schemeClr val="lt1"/>
+            </a:fontRef>
+          </p:style>
+          <p:txBody>
+            <a:bodyPr rtlCol="0" anchor="ctr"/>
+            <a:lstStyle/>
+            <a:p>
+              <a:pPr algn="ctr"/>
+              <a:r>
+                <a:rPr kumimoji="1" lang="en-US" altLang="zh-CN">
+                  <a:solidFill>
+                    <a:schemeClr val="tx1"/>
+                  </a:solidFill>
+                </a:rPr>
+                <a:t>b</a:t>
+              </a:r>
+              <a:endParaRPr kumimoji="1" lang="zh-CN" altLang="en-US">
+                <a:solidFill>
+                  <a:schemeClr val="tx1"/>
+                </a:solidFill>
+              </a:endParaRPr>
+            </a:p>
+          </p:txBody>
+        </p:sp>
+        <p:sp>
+          <p:nvSpPr>
+            <p:cNvPr id="40" name="矩形 39"/>
+            <p:cNvSpPr/>
+            <p:nvPr/>
+          </p:nvSpPr>
+          <p:spPr>
+            <a:xfrm>
+              <a:off x="2184678" y="3091005"/>
+              <a:ext cx="360000" cy="360000"/>
+            </a:xfrm>
+            <a:prstGeom prst="rect">
+              <a:avLst/>
+            </a:prstGeom>
+            <a:noFill/>
+            <a:ln w="38100">
+              <a:solidFill>
+                <a:schemeClr val="tx1"/>
+              </a:solidFill>
+            </a:ln>
+          </p:spPr>
+          <p:style>
+            <a:lnRef idx="2">
+              <a:schemeClr val="accent1">
+                <a:shade val="50000"/>
+              </a:schemeClr>
+            </a:lnRef>
+            <a:fillRef idx="1">
+              <a:schemeClr val="accent1"/>
+            </a:fillRef>
+            <a:effectRef idx="0">
+              <a:schemeClr val="accent1"/>
+            </a:effectRef>
+            <a:fontRef idx="minor">
+              <a:schemeClr val="lt1"/>
+            </a:fontRef>
+          </p:style>
+          <p:txBody>
+            <a:bodyPr rtlCol="0" anchor="ctr"/>
+            <a:lstStyle/>
+            <a:p>
+              <a:pPr algn="ctr"/>
+              <a:r>
+                <a:rPr kumimoji="1" lang="en-US" altLang="zh-CN">
+                  <a:solidFill>
+                    <a:schemeClr val="tx1"/>
+                  </a:solidFill>
+                </a:rPr>
+                <a:t>a</a:t>
+              </a:r>
+              <a:endParaRPr kumimoji="1" lang="zh-CN" altLang="en-US">
+                <a:solidFill>
+                  <a:schemeClr val="tx1"/>
+                </a:solidFill>
+              </a:endParaRPr>
+            </a:p>
+          </p:txBody>
+        </p:sp>
+        <p:sp>
+          <p:nvSpPr>
+            <p:cNvPr id="43" name="矩形 42"/>
+            <p:cNvSpPr/>
+            <p:nvPr/>
+          </p:nvSpPr>
+          <p:spPr>
+            <a:xfrm>
+              <a:off x="3268191" y="3091005"/>
+              <a:ext cx="360000" cy="360000"/>
+            </a:xfrm>
+            <a:prstGeom prst="rect">
+              <a:avLst/>
+            </a:prstGeom>
+            <a:noFill/>
+            <a:ln w="38100">
+              <a:solidFill>
+                <a:schemeClr val="tx1"/>
+              </a:solidFill>
+            </a:ln>
+          </p:spPr>
+          <p:style>
+            <a:lnRef idx="2">
+              <a:schemeClr val="accent1">
+                <a:shade val="50000"/>
+              </a:schemeClr>
+            </a:lnRef>
+            <a:fillRef idx="1">
+              <a:schemeClr val="accent1"/>
+            </a:fillRef>
+            <a:effectRef idx="0">
+              <a:schemeClr val="accent1"/>
+            </a:effectRef>
+            <a:fontRef idx="minor">
+              <a:schemeClr val="lt1"/>
+            </a:fontRef>
+          </p:style>
+          <p:txBody>
+            <a:bodyPr rtlCol="0" anchor="ctr"/>
+            <a:lstStyle/>
+            <a:p>
+              <a:pPr algn="ctr"/>
+              <a:r>
+                <a:rPr kumimoji="1" lang="en-US" altLang="zh-CN">
+                  <a:solidFill>
+                    <a:schemeClr val="tx1"/>
+                  </a:solidFill>
+                </a:rPr>
+                <a:t>c</a:t>
+              </a:r>
+              <a:endParaRPr kumimoji="1" lang="zh-CN" altLang="en-US">
+                <a:solidFill>
+                  <a:schemeClr val="tx1"/>
+                </a:solidFill>
+              </a:endParaRPr>
+            </a:p>
+          </p:txBody>
+        </p:sp>
+        <p:sp>
+          <p:nvSpPr>
+            <p:cNvPr id="45" name="矩形 44"/>
+            <p:cNvSpPr/>
+            <p:nvPr/>
+          </p:nvSpPr>
+          <p:spPr>
+            <a:xfrm>
+              <a:off x="4712875" y="2731005"/>
+              <a:ext cx="360000" cy="720000"/>
+            </a:xfrm>
+            <a:prstGeom prst="rect">
+              <a:avLst/>
+            </a:prstGeom>
+            <a:noFill/>
+            <a:ln w="38100">
+              <a:solidFill>
+                <a:schemeClr val="tx1"/>
+              </a:solidFill>
+            </a:ln>
+          </p:spPr>
+          <p:style>
+            <a:lnRef idx="2">
+              <a:schemeClr val="accent1">
+                <a:shade val="50000"/>
+              </a:schemeClr>
+            </a:lnRef>
+            <a:fillRef idx="1">
+              <a:schemeClr val="accent1"/>
+            </a:fillRef>
+            <a:effectRef idx="0">
+              <a:schemeClr val="accent1"/>
+            </a:effectRef>
+            <a:fontRef idx="minor">
+              <a:schemeClr val="lt1"/>
+            </a:fontRef>
+          </p:style>
+          <p:txBody>
+            <a:bodyPr rtlCol="0" anchor="ctr"/>
+            <a:lstStyle/>
+            <a:p>
+              <a:pPr algn="ctr"/>
+              <a:r>
+                <a:rPr kumimoji="1" lang="en-US" altLang="zh-CN">
+                  <a:solidFill>
+                    <a:schemeClr val="tx1"/>
+                  </a:solidFill>
+                </a:rPr>
+                <a:t>f</a:t>
+              </a:r>
+              <a:endParaRPr kumimoji="1" lang="zh-CN" altLang="en-US">
+                <a:solidFill>
+                  <a:schemeClr val="tx1"/>
+                </a:solidFill>
+              </a:endParaRPr>
+            </a:p>
+          </p:txBody>
+        </p:sp>
+        <p:sp>
+          <p:nvSpPr>
+            <p:cNvPr id="46" name="矩形 45"/>
+            <p:cNvSpPr/>
+            <p:nvPr/>
+          </p:nvSpPr>
+          <p:spPr>
+            <a:xfrm>
+              <a:off x="5074046" y="3091005"/>
+              <a:ext cx="360000" cy="360000"/>
+            </a:xfrm>
+            <a:prstGeom prst="rect">
+              <a:avLst/>
+            </a:prstGeom>
+            <a:noFill/>
+            <a:ln w="38100">
+              <a:solidFill>
+                <a:schemeClr val="tx1"/>
+              </a:solidFill>
+            </a:ln>
+          </p:spPr>
+          <p:style>
+            <a:lnRef idx="2">
+              <a:schemeClr val="accent1">
+                <a:shade val="50000"/>
+              </a:schemeClr>
+            </a:lnRef>
+            <a:fillRef idx="1">
+              <a:schemeClr val="accent1"/>
+            </a:fillRef>
+            <a:effectRef idx="0">
+              <a:schemeClr val="accent1"/>
+            </a:effectRef>
+            <a:fontRef idx="minor">
+              <a:schemeClr val="lt1"/>
+            </a:fontRef>
+          </p:style>
+          <p:txBody>
+            <a:bodyPr rtlCol="0" anchor="ctr"/>
+            <a:lstStyle/>
+            <a:p>
+              <a:pPr algn="ctr"/>
+              <a:r>
+                <a:rPr kumimoji="1" lang="en-US" altLang="zh-CN">
+                  <a:solidFill>
+                    <a:schemeClr val="tx1"/>
+                  </a:solidFill>
+                </a:rPr>
+                <a:t>g</a:t>
+              </a:r>
+              <a:endParaRPr kumimoji="1" lang="zh-CN" altLang="en-US">
+                <a:solidFill>
+                  <a:schemeClr val="tx1"/>
+                </a:solidFill>
+              </a:endParaRPr>
+            </a:p>
+          </p:txBody>
+        </p:sp>
+        <p:sp>
+          <p:nvSpPr>
+            <p:cNvPr id="47" name="矩形 46"/>
+            <p:cNvSpPr/>
+            <p:nvPr/>
+          </p:nvSpPr>
+          <p:spPr>
+            <a:xfrm>
+              <a:off x="5796384" y="3091005"/>
+              <a:ext cx="360000" cy="360000"/>
+            </a:xfrm>
+            <a:prstGeom prst="rect">
+              <a:avLst/>
+            </a:prstGeom>
+            <a:noFill/>
+            <a:ln w="38100">
+              <a:solidFill>
+                <a:schemeClr val="tx1"/>
+              </a:solidFill>
+            </a:ln>
+          </p:spPr>
+          <p:style>
+            <a:lnRef idx="2">
+              <a:schemeClr val="accent1">
+                <a:shade val="50000"/>
+              </a:schemeClr>
+            </a:lnRef>
+            <a:fillRef idx="1">
+              <a:schemeClr val="accent1"/>
+            </a:fillRef>
+            <a:effectRef idx="0">
+              <a:schemeClr val="accent1"/>
+            </a:effectRef>
+            <a:fontRef idx="minor">
+              <a:schemeClr val="lt1"/>
+            </a:fontRef>
+          </p:style>
+          <p:txBody>
+            <a:bodyPr rtlCol="0" anchor="ctr"/>
+            <a:lstStyle/>
+            <a:p>
+              <a:pPr algn="ctr"/>
+              <a:r>
+                <a:rPr kumimoji="1" lang="en-US" altLang="zh-CN">
+                  <a:solidFill>
+                    <a:schemeClr val="tx1"/>
+                  </a:solidFill>
+                </a:rPr>
+                <a:t>i</a:t>
+              </a:r>
+              <a:endParaRPr kumimoji="1" lang="zh-CN" altLang="en-US">
+                <a:solidFill>
+                  <a:schemeClr val="tx1"/>
+                </a:solidFill>
+              </a:endParaRPr>
+            </a:p>
+          </p:txBody>
+        </p:sp>
+        <p:cxnSp>
+          <p:nvCxnSpPr>
+            <p:cNvPr id="48" name="直线连接符 47"/>
+            <p:cNvCxnSpPr/>
+            <p:nvPr/>
+          </p:nvCxnSpPr>
+          <p:spPr>
+            <a:xfrm flipV="1">
+              <a:off x="1873823" y="3086569"/>
+              <a:ext cx="972000" cy="0"/>
+            </a:xfrm>
+            <a:prstGeom prst="line">
+              <a:avLst/>
+            </a:prstGeom>
+            <a:ln>
+              <a:solidFill>
+                <a:schemeClr val="tx1"/>
+              </a:solidFill>
+              <a:prstDash val="dash"/>
+            </a:ln>
+          </p:spPr>
+          <p:style>
+            <a:lnRef idx="1">
+              <a:schemeClr val="accent1"/>
+            </a:lnRef>
+            <a:fillRef idx="0">
+              <a:schemeClr val="accent1"/>
+            </a:fillRef>
+            <a:effectRef idx="0">
+              <a:schemeClr val="accent1"/>
+            </a:effectRef>
+            <a:fontRef idx="minor">
+              <a:schemeClr val="tx1"/>
+            </a:fontRef>
+          </p:style>
+        </p:cxnSp>
+        <p:cxnSp>
+          <p:nvCxnSpPr>
+            <p:cNvPr id="49" name="直线连接符 48"/>
+            <p:cNvCxnSpPr/>
+            <p:nvPr/>
+          </p:nvCxnSpPr>
+          <p:spPr>
+            <a:xfrm flipV="1">
+              <a:off x="1848313" y="2720445"/>
+              <a:ext cx="2268000" cy="0"/>
+            </a:xfrm>
+            <a:prstGeom prst="line">
+              <a:avLst/>
+            </a:prstGeom>
+            <a:ln>
+              <a:solidFill>
+                <a:schemeClr val="tx1"/>
+              </a:solidFill>
+              <a:prstDash val="dash"/>
+            </a:ln>
+          </p:spPr>
+          <p:style>
+            <a:lnRef idx="1">
+              <a:schemeClr val="accent1"/>
+            </a:lnRef>
+            <a:fillRef idx="0">
+              <a:schemeClr val="accent1"/>
+            </a:fillRef>
+            <a:effectRef idx="0">
+              <a:schemeClr val="accent1"/>
+            </a:effectRef>
+            <a:fontRef idx="minor">
+              <a:schemeClr val="tx1"/>
+            </a:fontRef>
+          </p:style>
+        </p:cxnSp>
+        <p:cxnSp>
+          <p:nvCxnSpPr>
+            <p:cNvPr id="50" name="直线连接符 49"/>
+            <p:cNvCxnSpPr/>
+            <p:nvPr/>
+          </p:nvCxnSpPr>
+          <p:spPr>
+            <a:xfrm flipV="1">
+              <a:off x="1864967" y="2379115"/>
+              <a:ext cx="3888000" cy="0"/>
+            </a:xfrm>
+            <a:prstGeom prst="line">
+              <a:avLst/>
+            </a:prstGeom>
+            <a:ln>
+              <a:solidFill>
+                <a:schemeClr val="tx1"/>
+              </a:solidFill>
+              <a:prstDash val="dash"/>
+            </a:ln>
+          </p:spPr>
+          <p:style>
+            <a:lnRef idx="1">
+              <a:schemeClr val="accent1"/>
+            </a:lnRef>
+            <a:fillRef idx="0">
+              <a:schemeClr val="accent1"/>
+            </a:fillRef>
+            <a:effectRef idx="0">
+              <a:schemeClr val="accent1"/>
+            </a:effectRef>
+            <a:fontRef idx="minor">
+              <a:schemeClr val="tx1"/>
+            </a:fontRef>
+          </p:style>
+        </p:cxnSp>
+        <p:sp>
+          <p:nvSpPr>
+            <p:cNvPr id="51" name="矩形 50"/>
+            <p:cNvSpPr/>
+            <p:nvPr/>
+          </p:nvSpPr>
+          <p:spPr>
+            <a:xfrm>
+              <a:off x="2545849" y="3091005"/>
+              <a:ext cx="360000" cy="360000"/>
+            </a:xfrm>
+            <a:prstGeom prst="rect">
+              <a:avLst/>
+            </a:prstGeom>
+            <a:solidFill>
+              <a:schemeClr val="accent1"/>
+            </a:solidFill>
+            <a:ln w="38100">
+              <a:solidFill>
+                <a:schemeClr val="tx1"/>
+              </a:solidFill>
+            </a:ln>
+          </p:spPr>
+          <p:style>
+            <a:lnRef idx="2">
+              <a:schemeClr val="accent1">
+                <a:shade val="50000"/>
+              </a:schemeClr>
+            </a:lnRef>
+            <a:fillRef idx="1">
+              <a:schemeClr val="accent1"/>
+            </a:fillRef>
+            <a:effectRef idx="0">
+              <a:schemeClr val="accent1"/>
+            </a:effectRef>
+            <a:fontRef idx="minor">
+              <a:schemeClr val="lt1"/>
+            </a:fontRef>
+          </p:style>
+          <p:txBody>
+            <a:bodyPr rtlCol="0" anchor="ctr"/>
+            <a:lstStyle/>
+            <a:p>
+              <a:pPr algn="ctr"/>
+              <a:r>
+                <a:rPr kumimoji="1" lang="en-US" altLang="zh-CN">
+                  <a:solidFill>
+                    <a:schemeClr val="tx1"/>
+                  </a:solidFill>
+                  <a:latin typeface="Arial Hebrew Scholar" charset="-79"/>
+                  <a:ea typeface="Arial Hebrew Scholar" charset="-79"/>
+                  <a:cs typeface="Arial Hebrew Scholar" charset="-79"/>
+                </a:rPr>
+                <a:t>A</a:t>
+              </a:r>
+              <a:endParaRPr kumimoji="1" lang="zh-CN" altLang="en-US">
+                <a:solidFill>
+                  <a:schemeClr val="tx1"/>
+                </a:solidFill>
+                <a:latin typeface="Arial Hebrew Scholar" charset="-79"/>
+                <a:ea typeface="Arial Hebrew Scholar" charset="-79"/>
+                <a:cs typeface="Arial Hebrew Scholar" charset="-79"/>
+              </a:endParaRPr>
+            </a:p>
+          </p:txBody>
+        </p:sp>
+        <p:sp>
+          <p:nvSpPr>
+            <p:cNvPr id="52" name="矩形 51"/>
+            <p:cNvSpPr/>
+            <p:nvPr/>
+          </p:nvSpPr>
+          <p:spPr>
+            <a:xfrm>
+              <a:off x="3629362" y="3091005"/>
+              <a:ext cx="360000" cy="360000"/>
+            </a:xfrm>
+            <a:prstGeom prst="rect">
+              <a:avLst/>
+            </a:prstGeom>
+            <a:solidFill>
+              <a:schemeClr val="accent1"/>
+            </a:solidFill>
+            <a:ln w="38100">
+              <a:solidFill>
+                <a:schemeClr val="tx1"/>
+              </a:solidFill>
+            </a:ln>
+          </p:spPr>
+          <p:style>
+            <a:lnRef idx="2">
+              <a:schemeClr val="accent1">
+                <a:shade val="50000"/>
+              </a:schemeClr>
+            </a:lnRef>
+            <a:fillRef idx="1">
+              <a:schemeClr val="accent1"/>
+            </a:fillRef>
+            <a:effectRef idx="0">
+              <a:schemeClr val="accent1"/>
+            </a:effectRef>
+            <a:fontRef idx="minor">
+              <a:schemeClr val="lt1"/>
+            </a:fontRef>
+          </p:style>
+          <p:txBody>
+            <a:bodyPr rtlCol="0" anchor="ctr"/>
+            <a:lstStyle/>
+            <a:p>
+              <a:pPr algn="ctr"/>
+              <a:r>
+                <a:rPr kumimoji="1" lang="en-US" altLang="zh-CN">
+                  <a:solidFill>
+                    <a:schemeClr val="tx1"/>
+                  </a:solidFill>
+                </a:rPr>
+                <a:t>B</a:t>
+              </a:r>
+              <a:endParaRPr kumimoji="1" lang="zh-CN" altLang="en-US">
+                <a:solidFill>
+                  <a:schemeClr val="tx1"/>
+                </a:solidFill>
+              </a:endParaRPr>
+            </a:p>
+          </p:txBody>
+        </p:sp>
+        <p:sp>
+          <p:nvSpPr>
+            <p:cNvPr id="53" name="矩形 52"/>
+            <p:cNvSpPr/>
+            <p:nvPr/>
+          </p:nvSpPr>
+          <p:spPr>
+            <a:xfrm>
+              <a:off x="3260818" y="2731877"/>
+              <a:ext cx="1080000" cy="360000"/>
+            </a:xfrm>
+            <a:prstGeom prst="rect">
+              <a:avLst/>
+            </a:prstGeom>
+            <a:solidFill>
+              <a:schemeClr val="accent1"/>
+            </a:solidFill>
+            <a:ln w="38100">
+              <a:solidFill>
+                <a:schemeClr val="tx1"/>
+              </a:solidFill>
+            </a:ln>
+          </p:spPr>
+          <p:style>
+            <a:lnRef idx="2">
+              <a:schemeClr val="accent1">
+                <a:shade val="50000"/>
+              </a:schemeClr>
+            </a:lnRef>
+            <a:fillRef idx="1">
+              <a:schemeClr val="accent1"/>
+            </a:fillRef>
+            <a:effectRef idx="0">
+              <a:schemeClr val="accent1"/>
+            </a:effectRef>
+            <a:fontRef idx="minor">
+              <a:schemeClr val="lt1"/>
+            </a:fontRef>
+          </p:style>
+          <p:txBody>
+            <a:bodyPr rtlCol="0" anchor="ctr"/>
+            <a:lstStyle/>
+            <a:p>
+              <a:pPr algn="ctr"/>
+              <a:r>
+                <a:rPr kumimoji="1" lang="en-US" altLang="zh-CN">
+                  <a:solidFill>
+                    <a:schemeClr val="tx1"/>
+                  </a:solidFill>
+                </a:rPr>
+                <a:t>C</a:t>
+              </a:r>
+              <a:endParaRPr kumimoji="1" lang="zh-CN" altLang="en-US">
+                <a:solidFill>
+                  <a:schemeClr val="tx1"/>
+                </a:solidFill>
+              </a:endParaRPr>
+            </a:p>
+          </p:txBody>
+        </p:sp>
+        <p:sp>
+          <p:nvSpPr>
+            <p:cNvPr id="54" name="矩形 53"/>
+            <p:cNvSpPr/>
+            <p:nvPr/>
+          </p:nvSpPr>
+          <p:spPr>
+            <a:xfrm>
+              <a:off x="5073199" y="2736484"/>
+              <a:ext cx="360000" cy="360000"/>
+            </a:xfrm>
+            <a:prstGeom prst="rect">
+              <a:avLst/>
+            </a:prstGeom>
+            <a:solidFill>
+              <a:schemeClr val="accent1"/>
+            </a:solidFill>
+            <a:ln w="38100">
+              <a:solidFill>
+                <a:schemeClr val="tx1"/>
+              </a:solidFill>
+            </a:ln>
+          </p:spPr>
+          <p:style>
+            <a:lnRef idx="2">
+              <a:schemeClr val="accent1">
+                <a:shade val="50000"/>
+              </a:schemeClr>
+            </a:lnRef>
+            <a:fillRef idx="1">
+              <a:schemeClr val="accent1"/>
+            </a:fillRef>
+            <a:effectRef idx="0">
+              <a:schemeClr val="accent1"/>
+            </a:effectRef>
+            <a:fontRef idx="minor">
+              <a:schemeClr val="lt1"/>
+            </a:fontRef>
+          </p:style>
+          <p:txBody>
+            <a:bodyPr rtlCol="0" anchor="ctr"/>
+            <a:lstStyle/>
+            <a:p>
+              <a:pPr algn="ctr"/>
+              <a:r>
+                <a:rPr kumimoji="1" lang="en-US" altLang="zh-CN">
+                  <a:solidFill>
+                    <a:schemeClr val="tx1"/>
+                  </a:solidFill>
+                </a:rPr>
+                <a:t>D</a:t>
+              </a:r>
+              <a:endParaRPr kumimoji="1" lang="zh-CN" altLang="en-US">
+                <a:solidFill>
+                  <a:schemeClr val="tx1"/>
+                </a:solidFill>
+              </a:endParaRPr>
+            </a:p>
+          </p:txBody>
+        </p:sp>
+        <p:sp>
+          <p:nvSpPr>
+            <p:cNvPr id="55" name="矩形 54"/>
+            <p:cNvSpPr/>
+            <p:nvPr/>
+          </p:nvSpPr>
+          <p:spPr>
+            <a:xfrm>
+              <a:off x="4713448" y="2371199"/>
+              <a:ext cx="720000" cy="396000"/>
+            </a:xfrm>
+            <a:prstGeom prst="rect">
+              <a:avLst/>
+            </a:prstGeom>
+            <a:solidFill>
+              <a:schemeClr val="accent1"/>
+            </a:solidFill>
+            <a:ln w="38100">
+              <a:solidFill>
+                <a:schemeClr val="tx1"/>
+              </a:solidFill>
+            </a:ln>
+          </p:spPr>
+          <p:style>
+            <a:lnRef idx="2">
+              <a:schemeClr val="accent1">
+                <a:shade val="50000"/>
+              </a:schemeClr>
+            </a:lnRef>
+            <a:fillRef idx="1">
+              <a:schemeClr val="accent1"/>
+            </a:fillRef>
+            <a:effectRef idx="0">
+              <a:schemeClr val="accent1"/>
+            </a:effectRef>
+            <a:fontRef idx="minor">
+              <a:schemeClr val="lt1"/>
+            </a:fontRef>
+          </p:style>
+          <p:txBody>
+            <a:bodyPr rtlCol="0" anchor="ctr"/>
+            <a:lstStyle/>
+            <a:p>
+              <a:pPr algn="ctr"/>
+              <a:r>
+                <a:rPr kumimoji="1" lang="en-US" altLang="zh-CN">
+                  <a:solidFill>
+                    <a:schemeClr val="tx1"/>
+                  </a:solidFill>
+                </a:rPr>
+                <a:t>E</a:t>
+              </a:r>
+              <a:endParaRPr kumimoji="1" lang="zh-CN" altLang="en-US">
+                <a:solidFill>
+                  <a:schemeClr val="tx1"/>
+                </a:solidFill>
+              </a:endParaRPr>
+            </a:p>
+          </p:txBody>
+        </p:sp>
+        <p:sp>
+          <p:nvSpPr>
+            <p:cNvPr id="56" name="矩形 55"/>
+            <p:cNvSpPr/>
+            <p:nvPr/>
+          </p:nvSpPr>
+          <p:spPr>
+            <a:xfrm>
+              <a:off x="5435217" y="2371005"/>
+              <a:ext cx="360000" cy="1080000"/>
+            </a:xfrm>
+            <a:prstGeom prst="rect">
+              <a:avLst/>
+            </a:prstGeom>
+            <a:noFill/>
+            <a:ln w="38100">
+              <a:solidFill>
+                <a:schemeClr val="tx1"/>
+              </a:solidFill>
+            </a:ln>
+          </p:spPr>
+          <p:style>
+            <a:lnRef idx="2">
+              <a:schemeClr val="accent1">
+                <a:shade val="50000"/>
+              </a:schemeClr>
+            </a:lnRef>
+            <a:fillRef idx="1">
+              <a:schemeClr val="accent1"/>
+            </a:fillRef>
+            <a:effectRef idx="0">
+              <a:schemeClr val="accent1"/>
+            </a:effectRef>
+            <a:fontRef idx="minor">
+              <a:schemeClr val="lt1"/>
+            </a:fontRef>
+          </p:style>
+          <p:txBody>
+            <a:bodyPr rtlCol="0" anchor="ctr"/>
+            <a:lstStyle/>
+            <a:p>
+              <a:pPr algn="ctr"/>
+              <a:r>
+                <a:rPr kumimoji="1" lang="en-US" altLang="zh-CN">
+                  <a:solidFill>
+                    <a:schemeClr val="tx1"/>
+                  </a:solidFill>
+                </a:rPr>
+                <a:t>h</a:t>
+              </a:r>
+              <a:endParaRPr kumimoji="1" lang="zh-CN" altLang="en-US">
+                <a:solidFill>
+                  <a:schemeClr val="tx1"/>
+                </a:solidFill>
+              </a:endParaRPr>
+            </a:p>
+          </p:txBody>
+        </p:sp>
+        <p:sp>
+          <p:nvSpPr>
+            <p:cNvPr id="57" name="文本框 56"/>
+            <p:cNvSpPr txBox="1"/>
+            <p:nvPr/>
+          </p:nvSpPr>
+          <p:spPr>
+            <a:xfrm>
+              <a:off x="1613294" y="2952505"/>
+              <a:ext cx="269626" cy="276999"/>
+            </a:xfrm>
+            <a:prstGeom prst="rect">
+              <a:avLst/>
+            </a:prstGeom>
+            <a:noFill/>
+          </p:spPr>
+          <p:txBody>
+            <a:bodyPr wrap="none" rtlCol="0">
+              <a:spAutoFit/>
+            </a:bodyPr>
+            <a:lstStyle/>
+            <a:p>
+              <a:r>
+                <a:rPr kumimoji="1" lang="en-US" altLang="zh-CN" sz="1200">
+                  <a:latin typeface="Arial" charset="0"/>
+                  <a:ea typeface="Arial" charset="0"/>
+                  <a:cs typeface="Arial" charset="0"/>
+                </a:rPr>
+                <a:t>1</a:t>
+              </a:r>
+              <a:endParaRPr kumimoji="1" lang="zh-CN" altLang="en-US" sz="1200">
+                <a:latin typeface="Arial" charset="0"/>
+                <a:ea typeface="Arial" charset="0"/>
+                <a:cs typeface="Arial" charset="0"/>
+              </a:endParaRPr>
+            </a:p>
+          </p:txBody>
+        </p:sp>
+        <p:sp>
+          <p:nvSpPr>
+            <p:cNvPr id="58" name="文本框 57"/>
+            <p:cNvSpPr txBox="1"/>
+            <p:nvPr/>
+          </p:nvSpPr>
+          <p:spPr>
+            <a:xfrm>
+              <a:off x="1613294" y="2218843"/>
+              <a:ext cx="269626" cy="276999"/>
+            </a:xfrm>
+            <a:prstGeom prst="rect">
+              <a:avLst/>
+            </a:prstGeom>
+            <a:noFill/>
+          </p:spPr>
+          <p:txBody>
+            <a:bodyPr wrap="none" rtlCol="0">
+              <a:spAutoFit/>
+            </a:bodyPr>
+            <a:lstStyle/>
+            <a:p>
+              <a:r>
+                <a:rPr kumimoji="1" lang="en-US" altLang="zh-CN" sz="1200">
+                  <a:latin typeface="Arial" charset="0"/>
+                  <a:ea typeface="Arial" charset="0"/>
+                  <a:cs typeface="Arial" charset="0"/>
+                </a:rPr>
+                <a:t>3</a:t>
+              </a:r>
+              <a:endParaRPr kumimoji="1" lang="zh-CN" altLang="en-US" sz="1200">
+                <a:latin typeface="Arial" charset="0"/>
+                <a:ea typeface="Arial" charset="0"/>
+                <a:cs typeface="Arial" charset="0"/>
+              </a:endParaRPr>
+            </a:p>
+          </p:txBody>
+        </p:sp>
+        <p:sp>
+          <p:nvSpPr>
+            <p:cNvPr id="59" name="文本框 58"/>
+            <p:cNvSpPr txBox="1"/>
+            <p:nvPr/>
+          </p:nvSpPr>
+          <p:spPr>
+            <a:xfrm>
+              <a:off x="1613294" y="2588856"/>
+              <a:ext cx="269626" cy="276999"/>
+            </a:xfrm>
+            <a:prstGeom prst="rect">
+              <a:avLst/>
+            </a:prstGeom>
+            <a:noFill/>
+          </p:spPr>
+          <p:txBody>
+            <a:bodyPr wrap="none" rtlCol="0">
+              <a:spAutoFit/>
+            </a:bodyPr>
+            <a:lstStyle/>
+            <a:p>
+              <a:r>
+                <a:rPr kumimoji="1" lang="en-US" altLang="zh-CN" sz="1200">
+                  <a:latin typeface="Arial" charset="0"/>
+                  <a:ea typeface="Arial" charset="0"/>
+                  <a:cs typeface="Arial" charset="0"/>
+                </a:rPr>
+                <a:t>2</a:t>
+              </a:r>
+              <a:endParaRPr kumimoji="1" lang="zh-CN" altLang="en-US" sz="1200">
+                <a:latin typeface="Arial" charset="0"/>
+                <a:ea typeface="Arial" charset="0"/>
+                <a:cs typeface="Arial" charset="0"/>
+              </a:endParaRPr>
+            </a:p>
+          </p:txBody>
+        </p:sp>
+        <p:sp>
+          <p:nvSpPr>
+            <p:cNvPr id="60" name="矩形 59"/>
+            <p:cNvSpPr/>
+            <p:nvPr/>
+          </p:nvSpPr>
+          <p:spPr>
+            <a:xfrm>
+              <a:off x="4351704" y="2371005"/>
+              <a:ext cx="360000" cy="1080000"/>
+            </a:xfrm>
+            <a:prstGeom prst="rect">
+              <a:avLst/>
+            </a:prstGeom>
+            <a:noFill/>
+            <a:ln w="38100">
+              <a:solidFill>
+                <a:schemeClr val="tx1"/>
+              </a:solidFill>
+            </a:ln>
+          </p:spPr>
+          <p:style>
+            <a:lnRef idx="2">
+              <a:schemeClr val="accent1">
+                <a:shade val="50000"/>
+              </a:schemeClr>
+            </a:lnRef>
+            <a:fillRef idx="1">
+              <a:schemeClr val="accent1"/>
+            </a:fillRef>
+            <a:effectRef idx="0">
+              <a:schemeClr val="accent1"/>
+            </a:effectRef>
+            <a:fontRef idx="minor">
+              <a:schemeClr val="lt1"/>
+            </a:fontRef>
+          </p:style>
+          <p:txBody>
+            <a:bodyPr rtlCol="0" anchor="ctr"/>
+            <a:lstStyle/>
+            <a:p>
+              <a:pPr algn="ctr"/>
+              <a:r>
+                <a:rPr kumimoji="1" lang="en-US" altLang="zh-CN">
+                  <a:solidFill>
+                    <a:schemeClr val="tx1"/>
+                  </a:solidFill>
+                </a:rPr>
+                <a:t>e</a:t>
+              </a:r>
+              <a:endParaRPr kumimoji="1" lang="zh-CN" altLang="en-US">
+                <a:solidFill>
+                  <a:schemeClr val="tx1"/>
+                </a:solidFill>
+              </a:endParaRPr>
+            </a:p>
+          </p:txBody>
+        </p:sp>
+        <p:sp>
+          <p:nvSpPr>
+            <p:cNvPr id="61" name="矩形 60"/>
+            <p:cNvSpPr/>
+            <p:nvPr/>
+          </p:nvSpPr>
+          <p:spPr>
+            <a:xfrm>
+              <a:off x="3990533" y="3091005"/>
+              <a:ext cx="360000" cy="360000"/>
+            </a:xfrm>
+            <a:prstGeom prst="rect">
+              <a:avLst/>
+            </a:prstGeom>
+            <a:noFill/>
+            <a:ln w="38100">
+              <a:solidFill>
+                <a:schemeClr val="tx1"/>
+              </a:solidFill>
+            </a:ln>
+          </p:spPr>
+          <p:style>
+            <a:lnRef idx="2">
+              <a:schemeClr val="accent1">
+                <a:shade val="50000"/>
+              </a:schemeClr>
+            </a:lnRef>
+            <a:fillRef idx="1">
+              <a:schemeClr val="accent1"/>
+            </a:fillRef>
+            <a:effectRef idx="0">
+              <a:schemeClr val="accent1"/>
+            </a:effectRef>
+            <a:fontRef idx="minor">
+              <a:schemeClr val="lt1"/>
+            </a:fontRef>
+          </p:style>
+          <p:txBody>
+            <a:bodyPr rtlCol="0" anchor="ctr"/>
+            <a:lstStyle/>
+            <a:p>
+              <a:pPr algn="ctr"/>
+              <a:r>
+                <a:rPr kumimoji="1" lang="en-US" altLang="zh-CN">
+                  <a:solidFill>
+                    <a:schemeClr val="tx1"/>
+                  </a:solidFill>
+                </a:rPr>
+                <a:t>d</a:t>
+              </a:r>
+              <a:endParaRPr kumimoji="1" lang="zh-CN" altLang="en-US">
+                <a:solidFill>
+                  <a:schemeClr val="tx1"/>
+                </a:solidFill>
+              </a:endParaRPr>
+            </a:p>
+          </p:txBody>
+        </p:sp>
+        <p:sp>
+          <p:nvSpPr>
+            <p:cNvPr id="4" name="文本框 3"/>
+            <p:cNvSpPr txBox="1"/>
+            <p:nvPr/>
+          </p:nvSpPr>
+          <p:spPr>
+            <a:xfrm>
+              <a:off x="1891971" y="3430628"/>
+              <a:ext cx="364202" cy="307777"/>
+            </a:xfrm>
+            <a:prstGeom prst="rect">
+              <a:avLst/>
+            </a:prstGeom>
+            <a:noFill/>
+          </p:spPr>
+          <p:txBody>
+            <a:bodyPr wrap="none" rtlCol="0">
+              <a:spAutoFit/>
+            </a:bodyPr>
+            <a:lstStyle/>
+            <a:p>
+              <a:r>
+                <a:rPr kumimoji="1" lang="zh-CN" altLang="en-US" sz="1400"/>
+                <a:t>压</a:t>
+              </a:r>
+            </a:p>
+          </p:txBody>
+        </p:sp>
+        <p:sp>
+          <p:nvSpPr>
+            <p:cNvPr id="62" name="文本框 61"/>
+            <p:cNvSpPr txBox="1"/>
+            <p:nvPr/>
+          </p:nvSpPr>
+          <p:spPr>
+            <a:xfrm>
+              <a:off x="2945560" y="3430628"/>
+              <a:ext cx="364202" cy="307777"/>
+            </a:xfrm>
+            <a:prstGeom prst="rect">
+              <a:avLst/>
+            </a:prstGeom>
+            <a:noFill/>
+          </p:spPr>
+          <p:txBody>
+            <a:bodyPr wrap="none" rtlCol="0">
+              <a:spAutoFit/>
+            </a:bodyPr>
+            <a:lstStyle/>
+            <a:p>
+              <a:r>
+                <a:rPr kumimoji="1" lang="zh-CN" altLang="en-US" sz="1400"/>
+                <a:t>弹</a:t>
+              </a:r>
+            </a:p>
+          </p:txBody>
+        </p:sp>
+        <p:sp>
+          <p:nvSpPr>
+            <p:cNvPr id="63" name="文本框 62"/>
+            <p:cNvSpPr txBox="1"/>
+            <p:nvPr/>
+          </p:nvSpPr>
+          <p:spPr>
+            <a:xfrm>
+              <a:off x="2226006" y="3708513"/>
+              <a:ext cx="373820" cy="307777"/>
+            </a:xfrm>
+            <a:prstGeom prst="rect">
+              <a:avLst/>
+            </a:prstGeom>
+            <a:noFill/>
+          </p:spPr>
+          <p:txBody>
+            <a:bodyPr wrap="none" rtlCol="0">
+              <a:spAutoFit/>
+            </a:bodyPr>
+            <a:lstStyle/>
+            <a:p>
+              <a:r>
+                <a:rPr kumimoji="1" lang="zh-CN" altLang="en-US" sz="1400"/>
+                <a:t>取</a:t>
+              </a:r>
+            </a:p>
+          </p:txBody>
+        </p:sp>
+        <p:sp>
+          <p:nvSpPr>
+            <p:cNvPr id="64" name="文本框 63"/>
+            <p:cNvSpPr txBox="1"/>
+            <p:nvPr/>
+          </p:nvSpPr>
+          <p:spPr>
+            <a:xfrm>
+              <a:off x="2588851" y="3430628"/>
+              <a:ext cx="364202" cy="307777"/>
+            </a:xfrm>
+            <a:prstGeom prst="rect">
+              <a:avLst/>
+            </a:prstGeom>
+            <a:noFill/>
+          </p:spPr>
+          <p:txBody>
+            <a:bodyPr wrap="none" rtlCol="0">
+              <a:spAutoFit/>
+            </a:bodyPr>
+            <a:lstStyle/>
+            <a:p>
+              <a:r>
+                <a:rPr kumimoji="1" lang="zh-CN" altLang="en-US" sz="1400"/>
+                <a:t>压</a:t>
+              </a:r>
+            </a:p>
+          </p:txBody>
+        </p:sp>
+        <p:sp>
+          <p:nvSpPr>
+            <p:cNvPr id="65" name="文本框 64"/>
+            <p:cNvSpPr txBox="1"/>
+            <p:nvPr/>
+          </p:nvSpPr>
+          <p:spPr>
+            <a:xfrm>
+              <a:off x="2230815" y="3430628"/>
+              <a:ext cx="364202" cy="307777"/>
+            </a:xfrm>
+            <a:prstGeom prst="rect">
+              <a:avLst/>
+            </a:prstGeom>
+            <a:noFill/>
+          </p:spPr>
+          <p:txBody>
+            <a:bodyPr wrap="none" rtlCol="0">
+              <a:spAutoFit/>
+            </a:bodyPr>
+            <a:lstStyle/>
+            <a:p>
+              <a:r>
+                <a:rPr kumimoji="1" lang="zh-CN" altLang="en-US" sz="1400"/>
+                <a:t>弹</a:t>
+              </a:r>
+            </a:p>
+          </p:txBody>
+        </p:sp>
+        <p:sp>
+          <p:nvSpPr>
+            <p:cNvPr id="66" name="文本框 65"/>
+            <p:cNvSpPr txBox="1"/>
+            <p:nvPr/>
+          </p:nvSpPr>
+          <p:spPr>
+            <a:xfrm>
+              <a:off x="2230815" y="4001837"/>
+              <a:ext cx="364202" cy="307777"/>
+            </a:xfrm>
+            <a:prstGeom prst="rect">
+              <a:avLst/>
+            </a:prstGeom>
+            <a:noFill/>
+          </p:spPr>
+          <p:txBody>
+            <a:bodyPr wrap="none" rtlCol="0">
+              <a:spAutoFit/>
+            </a:bodyPr>
+            <a:lstStyle/>
+            <a:p>
+              <a:r>
+                <a:rPr kumimoji="1" lang="zh-CN" altLang="en-US" sz="1400"/>
+                <a:t>压</a:t>
+              </a:r>
+            </a:p>
+          </p:txBody>
+        </p:sp>
+        <p:sp>
+          <p:nvSpPr>
+            <p:cNvPr id="68" name="文本框 67"/>
+            <p:cNvSpPr txBox="1"/>
+            <p:nvPr/>
+          </p:nvSpPr>
+          <p:spPr>
+            <a:xfrm>
+              <a:off x="2940751" y="3708513"/>
+              <a:ext cx="373820" cy="307777"/>
+            </a:xfrm>
+            <a:prstGeom prst="rect">
+              <a:avLst/>
+            </a:prstGeom>
+            <a:noFill/>
+          </p:spPr>
+          <p:txBody>
+            <a:bodyPr wrap="none" rtlCol="0">
+              <a:spAutoFit/>
+            </a:bodyPr>
+            <a:lstStyle/>
+            <a:p>
+              <a:r>
+                <a:rPr kumimoji="1" lang="zh-CN" altLang="en-US" sz="1400"/>
+                <a:t>取</a:t>
+              </a:r>
+            </a:p>
+          </p:txBody>
+        </p:sp>
+        <p:sp>
+          <p:nvSpPr>
+            <p:cNvPr id="69" name="文本框 68"/>
+            <p:cNvSpPr txBox="1"/>
+            <p:nvPr/>
+          </p:nvSpPr>
+          <p:spPr>
+            <a:xfrm>
+              <a:off x="2945560" y="4001837"/>
+              <a:ext cx="364202" cy="307777"/>
+            </a:xfrm>
+            <a:prstGeom prst="rect">
+              <a:avLst/>
+            </a:prstGeom>
+            <a:noFill/>
+          </p:spPr>
+          <p:txBody>
+            <a:bodyPr wrap="none" rtlCol="0">
+              <a:spAutoFit/>
+            </a:bodyPr>
+            <a:lstStyle/>
+            <a:p>
+              <a:r>
+                <a:rPr kumimoji="1" lang="zh-CN" altLang="en-US" sz="1400"/>
+                <a:t>算</a:t>
+              </a:r>
+            </a:p>
+          </p:txBody>
+        </p:sp>
+        <p:sp>
+          <p:nvSpPr>
+            <p:cNvPr id="70" name="文本框 69"/>
+            <p:cNvSpPr txBox="1"/>
+            <p:nvPr/>
+          </p:nvSpPr>
+          <p:spPr>
+            <a:xfrm>
+              <a:off x="2945560" y="4311367"/>
+              <a:ext cx="364202" cy="307777"/>
+            </a:xfrm>
+            <a:prstGeom prst="rect">
+              <a:avLst/>
+            </a:prstGeom>
+            <a:noFill/>
+          </p:spPr>
+          <p:txBody>
+            <a:bodyPr wrap="none" rtlCol="0">
+              <a:spAutoFit/>
+            </a:bodyPr>
+            <a:lstStyle/>
+            <a:p>
+              <a:r>
+                <a:rPr kumimoji="1" lang="zh-CN" altLang="en-US" sz="1400"/>
+                <a:t>压</a:t>
+              </a:r>
+            </a:p>
+          </p:txBody>
+        </p:sp>
+        <p:sp>
+          <p:nvSpPr>
+            <p:cNvPr id="71" name="文本框 70"/>
+            <p:cNvSpPr txBox="1"/>
+            <p:nvPr/>
+          </p:nvSpPr>
+          <p:spPr>
+            <a:xfrm>
+              <a:off x="3318683" y="3430628"/>
+              <a:ext cx="364202" cy="307777"/>
+            </a:xfrm>
+            <a:prstGeom prst="rect">
+              <a:avLst/>
+            </a:prstGeom>
+            <a:noFill/>
+          </p:spPr>
+          <p:txBody>
+            <a:bodyPr wrap="none" rtlCol="0">
+              <a:spAutoFit/>
+            </a:bodyPr>
+            <a:lstStyle/>
+            <a:p>
+              <a:r>
+                <a:rPr kumimoji="1" lang="zh-CN" altLang="en-US" sz="1400"/>
+                <a:t>压</a:t>
+              </a:r>
+            </a:p>
+          </p:txBody>
+        </p:sp>
+        <p:sp>
+          <p:nvSpPr>
+            <p:cNvPr id="72" name="文本框 71"/>
+            <p:cNvSpPr txBox="1"/>
+            <p:nvPr/>
+          </p:nvSpPr>
+          <p:spPr>
+            <a:xfrm>
+              <a:off x="3675361" y="3430628"/>
+              <a:ext cx="364202" cy="307777"/>
+            </a:xfrm>
+            <a:prstGeom prst="rect">
+              <a:avLst/>
+            </a:prstGeom>
+            <a:noFill/>
+          </p:spPr>
+          <p:txBody>
+            <a:bodyPr wrap="none" rtlCol="0">
+              <a:spAutoFit/>
+            </a:bodyPr>
+            <a:lstStyle/>
+            <a:p>
+              <a:r>
+                <a:rPr kumimoji="1" lang="zh-CN" altLang="en-US" sz="1400"/>
+                <a:t>压</a:t>
+              </a:r>
+            </a:p>
+          </p:txBody>
+        </p:sp>
+        <p:sp>
+          <p:nvSpPr>
+            <p:cNvPr id="73" name="文本框 72"/>
+            <p:cNvSpPr txBox="1"/>
+            <p:nvPr/>
+          </p:nvSpPr>
+          <p:spPr>
+            <a:xfrm>
+              <a:off x="4034014" y="4311367"/>
+              <a:ext cx="364202" cy="307777"/>
+            </a:xfrm>
+            <a:prstGeom prst="rect">
+              <a:avLst/>
+            </a:prstGeom>
+            <a:noFill/>
+          </p:spPr>
+          <p:txBody>
+            <a:bodyPr wrap="none" rtlCol="0">
+              <a:spAutoFit/>
+            </a:bodyPr>
+            <a:lstStyle/>
+            <a:p>
+              <a:r>
+                <a:rPr kumimoji="1" lang="zh-CN" altLang="en-US" sz="1400"/>
+                <a:t>压</a:t>
+              </a:r>
+            </a:p>
+          </p:txBody>
+        </p:sp>
+        <p:sp>
+          <p:nvSpPr>
+            <p:cNvPr id="74" name="文本框 73"/>
+            <p:cNvSpPr txBox="1"/>
+            <p:nvPr/>
+          </p:nvSpPr>
+          <p:spPr>
+            <a:xfrm>
+              <a:off x="4034014" y="3430628"/>
+              <a:ext cx="364202" cy="307777"/>
+            </a:xfrm>
+            <a:prstGeom prst="rect">
+              <a:avLst/>
+            </a:prstGeom>
+            <a:noFill/>
+          </p:spPr>
+          <p:txBody>
+            <a:bodyPr wrap="none" rtlCol="0">
+              <a:spAutoFit/>
+            </a:bodyPr>
+            <a:lstStyle/>
+            <a:p>
+              <a:r>
+                <a:rPr kumimoji="1" lang="zh-CN" altLang="en-US" sz="1400"/>
+                <a:t>弹</a:t>
+              </a:r>
+            </a:p>
+          </p:txBody>
+        </p:sp>
+        <p:sp>
+          <p:nvSpPr>
+            <p:cNvPr id="75" name="文本框 74"/>
+            <p:cNvSpPr txBox="1"/>
+            <p:nvPr/>
+          </p:nvSpPr>
+          <p:spPr>
+            <a:xfrm>
+              <a:off x="4029205" y="3708513"/>
+              <a:ext cx="373820" cy="307777"/>
+            </a:xfrm>
+            <a:prstGeom prst="rect">
+              <a:avLst/>
+            </a:prstGeom>
+            <a:noFill/>
+          </p:spPr>
+          <p:txBody>
+            <a:bodyPr wrap="none" rtlCol="0">
+              <a:spAutoFit/>
+            </a:bodyPr>
+            <a:lstStyle/>
+            <a:p>
+              <a:r>
+                <a:rPr kumimoji="1" lang="zh-CN" altLang="en-US" sz="1400"/>
+                <a:t>取</a:t>
+              </a:r>
+            </a:p>
+          </p:txBody>
+        </p:sp>
+        <p:sp>
+          <p:nvSpPr>
+            <p:cNvPr id="76" name="文本框 75"/>
+            <p:cNvSpPr txBox="1"/>
+            <p:nvPr/>
+          </p:nvSpPr>
+          <p:spPr>
+            <a:xfrm>
+              <a:off x="4034014" y="4001837"/>
+              <a:ext cx="364202" cy="307777"/>
+            </a:xfrm>
+            <a:prstGeom prst="rect">
+              <a:avLst/>
+            </a:prstGeom>
+            <a:noFill/>
+          </p:spPr>
+          <p:txBody>
+            <a:bodyPr wrap="none" rtlCol="0">
+              <a:spAutoFit/>
+            </a:bodyPr>
+            <a:lstStyle/>
+            <a:p>
+              <a:r>
+                <a:rPr kumimoji="1" lang="zh-CN" altLang="en-US" sz="1400"/>
+                <a:t>算</a:t>
+              </a:r>
+            </a:p>
+          </p:txBody>
+        </p:sp>
+        <p:sp>
+          <p:nvSpPr>
+            <p:cNvPr id="78" name="文本框 77"/>
+            <p:cNvSpPr txBox="1"/>
+            <p:nvPr/>
+          </p:nvSpPr>
+          <p:spPr>
+            <a:xfrm>
+              <a:off x="4388717" y="3430628"/>
+              <a:ext cx="364202" cy="307777"/>
+            </a:xfrm>
+            <a:prstGeom prst="rect">
+              <a:avLst/>
+            </a:prstGeom>
+            <a:noFill/>
+          </p:spPr>
+          <p:txBody>
+            <a:bodyPr wrap="none" rtlCol="0">
+              <a:spAutoFit/>
+            </a:bodyPr>
+            <a:lstStyle/>
+            <a:p>
+              <a:r>
+                <a:rPr kumimoji="1" lang="zh-CN" altLang="en-US" sz="1400"/>
+                <a:t>弹</a:t>
+              </a:r>
+            </a:p>
+          </p:txBody>
+        </p:sp>
+        <p:sp>
+          <p:nvSpPr>
+            <p:cNvPr id="79" name="文本框 78"/>
+            <p:cNvSpPr txBox="1"/>
+            <p:nvPr/>
+          </p:nvSpPr>
+          <p:spPr>
+            <a:xfrm>
+              <a:off x="4388717" y="3708513"/>
+              <a:ext cx="373820" cy="307777"/>
+            </a:xfrm>
+            <a:prstGeom prst="rect">
+              <a:avLst/>
+            </a:prstGeom>
+            <a:noFill/>
+          </p:spPr>
+          <p:txBody>
+            <a:bodyPr wrap="none" rtlCol="0">
+              <a:spAutoFit/>
+            </a:bodyPr>
+            <a:lstStyle/>
+            <a:p>
+              <a:r>
+                <a:rPr kumimoji="1" lang="zh-CN" altLang="en-US" sz="1400"/>
+                <a:t>取</a:t>
+              </a:r>
+            </a:p>
+          </p:txBody>
+        </p:sp>
+        <p:sp>
+          <p:nvSpPr>
+            <p:cNvPr id="80" name="文本框 79"/>
+            <p:cNvSpPr txBox="1"/>
+            <p:nvPr/>
+          </p:nvSpPr>
+          <p:spPr>
+            <a:xfrm>
+              <a:off x="4388717" y="4001837"/>
+              <a:ext cx="364202" cy="307777"/>
+            </a:xfrm>
+            <a:prstGeom prst="rect">
+              <a:avLst/>
+            </a:prstGeom>
+            <a:noFill/>
+          </p:spPr>
+          <p:txBody>
+            <a:bodyPr wrap="none" rtlCol="0">
+              <a:spAutoFit/>
+            </a:bodyPr>
+            <a:lstStyle/>
+            <a:p>
+              <a:r>
+                <a:rPr kumimoji="1" lang="zh-CN" altLang="en-US" sz="1400"/>
+                <a:t>算</a:t>
+              </a:r>
+            </a:p>
+          </p:txBody>
+        </p:sp>
+        <p:sp>
+          <p:nvSpPr>
+            <p:cNvPr id="82" name="文本框 81"/>
+            <p:cNvSpPr txBox="1"/>
+            <p:nvPr/>
+          </p:nvSpPr>
+          <p:spPr>
+            <a:xfrm>
+              <a:off x="4388717" y="4311367"/>
+              <a:ext cx="364202" cy="307777"/>
+            </a:xfrm>
+            <a:prstGeom prst="rect">
+              <a:avLst/>
+            </a:prstGeom>
+            <a:noFill/>
+          </p:spPr>
+          <p:txBody>
+            <a:bodyPr wrap="none" rtlCol="0">
+              <a:spAutoFit/>
+            </a:bodyPr>
+            <a:lstStyle/>
+            <a:p>
+              <a:r>
+                <a:rPr kumimoji="1" lang="zh-CN" altLang="en-US" sz="1400"/>
+                <a:t>弹</a:t>
+              </a:r>
+            </a:p>
+          </p:txBody>
+        </p:sp>
+        <p:sp>
+          <p:nvSpPr>
+            <p:cNvPr id="83" name="文本框 82"/>
+            <p:cNvSpPr txBox="1"/>
+            <p:nvPr/>
+          </p:nvSpPr>
+          <p:spPr>
+            <a:xfrm>
+              <a:off x="4388717" y="4602977"/>
+              <a:ext cx="373820" cy="307777"/>
+            </a:xfrm>
+            <a:prstGeom prst="rect">
+              <a:avLst/>
+            </a:prstGeom>
+            <a:noFill/>
+          </p:spPr>
+          <p:txBody>
+            <a:bodyPr wrap="none" rtlCol="0">
+              <a:spAutoFit/>
+            </a:bodyPr>
+            <a:lstStyle/>
+            <a:p>
+              <a:r>
+                <a:rPr kumimoji="1" lang="zh-CN" altLang="en-US" sz="1400"/>
+                <a:t>取</a:t>
+              </a:r>
+            </a:p>
+          </p:txBody>
+        </p:sp>
+        <p:sp>
+          <p:nvSpPr>
+            <p:cNvPr id="84" name="文本框 83"/>
+            <p:cNvSpPr txBox="1"/>
+            <p:nvPr/>
+          </p:nvSpPr>
+          <p:spPr>
+            <a:xfrm>
+              <a:off x="4388717" y="4903648"/>
+              <a:ext cx="364202" cy="307777"/>
+            </a:xfrm>
+            <a:prstGeom prst="rect">
+              <a:avLst/>
+            </a:prstGeom>
+            <a:noFill/>
+          </p:spPr>
+          <p:txBody>
+            <a:bodyPr wrap="none" rtlCol="0">
+              <a:spAutoFit/>
+            </a:bodyPr>
+            <a:lstStyle/>
+            <a:p>
+              <a:r>
+                <a:rPr kumimoji="1" lang="zh-CN" altLang="en-US" sz="1400"/>
+                <a:t>算</a:t>
+              </a:r>
+            </a:p>
+          </p:txBody>
+        </p:sp>
+        <p:sp>
+          <p:nvSpPr>
+            <p:cNvPr id="85" name="文本框 84"/>
+            <p:cNvSpPr txBox="1"/>
+            <p:nvPr/>
+          </p:nvSpPr>
+          <p:spPr>
+            <a:xfrm>
+              <a:off x="4388717" y="5763003"/>
+              <a:ext cx="364202" cy="307777"/>
+            </a:xfrm>
+            <a:prstGeom prst="rect">
+              <a:avLst/>
+            </a:prstGeom>
+            <a:noFill/>
+          </p:spPr>
+          <p:txBody>
+            <a:bodyPr wrap="none" rtlCol="0">
+              <a:spAutoFit/>
+            </a:bodyPr>
+            <a:lstStyle/>
+            <a:p>
+              <a:r>
+                <a:rPr kumimoji="1" lang="zh-CN" altLang="en-US" sz="1400"/>
+                <a:t>压</a:t>
+              </a:r>
+            </a:p>
+          </p:txBody>
+        </p:sp>
+        <p:sp>
+          <p:nvSpPr>
+            <p:cNvPr id="86" name="文本框 85"/>
+            <p:cNvSpPr txBox="1"/>
+            <p:nvPr/>
+          </p:nvSpPr>
+          <p:spPr>
+            <a:xfrm>
+              <a:off x="4388717" y="5193676"/>
+              <a:ext cx="364202" cy="307777"/>
+            </a:xfrm>
+            <a:prstGeom prst="rect">
+              <a:avLst/>
+            </a:prstGeom>
+            <a:noFill/>
+          </p:spPr>
+          <p:txBody>
+            <a:bodyPr wrap="none" rtlCol="0">
+              <a:spAutoFit/>
+            </a:bodyPr>
+            <a:lstStyle/>
+            <a:p>
+              <a:r>
+                <a:rPr kumimoji="1" lang="zh-CN" altLang="en-US" sz="1400"/>
+                <a:t>弹</a:t>
+              </a:r>
+            </a:p>
+          </p:txBody>
+        </p:sp>
+        <p:sp>
+          <p:nvSpPr>
+            <p:cNvPr id="87" name="文本框 86"/>
+            <p:cNvSpPr txBox="1"/>
+            <p:nvPr/>
+          </p:nvSpPr>
+          <p:spPr>
+            <a:xfrm>
+              <a:off x="4388717" y="5496287"/>
+              <a:ext cx="373820" cy="307777"/>
+            </a:xfrm>
+            <a:prstGeom prst="rect">
+              <a:avLst/>
+            </a:prstGeom>
+            <a:noFill/>
+          </p:spPr>
+          <p:txBody>
+            <a:bodyPr wrap="none" rtlCol="0">
+              <a:spAutoFit/>
+            </a:bodyPr>
+            <a:lstStyle/>
+            <a:p>
+              <a:r>
+                <a:rPr kumimoji="1" lang="zh-CN" altLang="en-US" sz="1400"/>
+                <a:t>取</a:t>
+              </a:r>
+            </a:p>
+          </p:txBody>
+        </p:sp>
+        <p:sp>
+          <p:nvSpPr>
+            <p:cNvPr id="89" name="文本框 88"/>
+            <p:cNvSpPr txBox="1"/>
+            <p:nvPr/>
+          </p:nvSpPr>
+          <p:spPr>
+            <a:xfrm>
+              <a:off x="4745395" y="3430628"/>
+              <a:ext cx="364202" cy="307777"/>
+            </a:xfrm>
+            <a:prstGeom prst="rect">
+              <a:avLst/>
+            </a:prstGeom>
+            <a:noFill/>
+          </p:spPr>
+          <p:txBody>
+            <a:bodyPr wrap="none" rtlCol="0">
+              <a:spAutoFit/>
+            </a:bodyPr>
+            <a:lstStyle/>
+            <a:p>
+              <a:r>
+                <a:rPr kumimoji="1" lang="zh-CN" altLang="en-US" sz="1400"/>
+                <a:t>压</a:t>
+              </a:r>
+            </a:p>
+          </p:txBody>
+        </p:sp>
+        <p:sp>
+          <p:nvSpPr>
+            <p:cNvPr id="90" name="文本框 89"/>
+            <p:cNvSpPr txBox="1"/>
+            <p:nvPr/>
+          </p:nvSpPr>
+          <p:spPr>
+            <a:xfrm>
+              <a:off x="5102073" y="3430628"/>
+              <a:ext cx="364202" cy="307777"/>
+            </a:xfrm>
+            <a:prstGeom prst="rect">
+              <a:avLst/>
+            </a:prstGeom>
+            <a:noFill/>
+          </p:spPr>
+          <p:txBody>
+            <a:bodyPr wrap="none" rtlCol="0">
+              <a:spAutoFit/>
+            </a:bodyPr>
+            <a:lstStyle/>
+            <a:p>
+              <a:r>
+                <a:rPr kumimoji="1" lang="zh-CN" altLang="en-US" sz="1400"/>
+                <a:t>压</a:t>
+              </a:r>
+            </a:p>
+          </p:txBody>
+        </p:sp>
+        <p:sp>
+          <p:nvSpPr>
+            <p:cNvPr id="91" name="文本框 90"/>
+            <p:cNvSpPr txBox="1"/>
+            <p:nvPr/>
+          </p:nvSpPr>
+          <p:spPr>
+            <a:xfrm>
+              <a:off x="5457396" y="3430628"/>
+              <a:ext cx="364202" cy="307777"/>
+            </a:xfrm>
+            <a:prstGeom prst="rect">
+              <a:avLst/>
+            </a:prstGeom>
+            <a:noFill/>
+          </p:spPr>
+          <p:txBody>
+            <a:bodyPr wrap="none" rtlCol="0">
+              <a:spAutoFit/>
+            </a:bodyPr>
+            <a:lstStyle/>
+            <a:p>
+              <a:r>
+                <a:rPr kumimoji="1" lang="zh-CN" altLang="en-US" sz="1400"/>
+                <a:t>弹</a:t>
+              </a:r>
+            </a:p>
+          </p:txBody>
+        </p:sp>
+        <p:sp>
+          <p:nvSpPr>
+            <p:cNvPr id="92" name="文本框 91"/>
+            <p:cNvSpPr txBox="1"/>
+            <p:nvPr/>
+          </p:nvSpPr>
+          <p:spPr>
+            <a:xfrm>
+              <a:off x="5452587" y="3708513"/>
+              <a:ext cx="373820" cy="307777"/>
+            </a:xfrm>
+            <a:prstGeom prst="rect">
+              <a:avLst/>
+            </a:prstGeom>
+            <a:noFill/>
+          </p:spPr>
+          <p:txBody>
+            <a:bodyPr wrap="none" rtlCol="0">
+              <a:spAutoFit/>
+            </a:bodyPr>
+            <a:lstStyle/>
+            <a:p>
+              <a:r>
+                <a:rPr kumimoji="1" lang="zh-CN" altLang="en-US" sz="1400"/>
+                <a:t>取</a:t>
+              </a:r>
+            </a:p>
+          </p:txBody>
+        </p:sp>
+        <p:sp>
+          <p:nvSpPr>
+            <p:cNvPr id="93" name="文本框 92"/>
+            <p:cNvSpPr txBox="1"/>
+            <p:nvPr/>
+          </p:nvSpPr>
+          <p:spPr>
+            <a:xfrm>
+              <a:off x="5457396" y="4001837"/>
+              <a:ext cx="364202" cy="307777"/>
+            </a:xfrm>
+            <a:prstGeom prst="rect">
+              <a:avLst/>
+            </a:prstGeom>
+            <a:noFill/>
+          </p:spPr>
+          <p:txBody>
+            <a:bodyPr wrap="none" rtlCol="0">
+              <a:spAutoFit/>
+            </a:bodyPr>
+            <a:lstStyle/>
+            <a:p>
+              <a:r>
+                <a:rPr kumimoji="1" lang="zh-CN" altLang="en-US" sz="1400"/>
+                <a:t>算</a:t>
+              </a:r>
+            </a:p>
+          </p:txBody>
+        </p:sp>
+        <p:sp>
+          <p:nvSpPr>
+            <p:cNvPr id="94" name="文本框 93"/>
+            <p:cNvSpPr txBox="1"/>
+            <p:nvPr/>
+          </p:nvSpPr>
+          <p:spPr>
+            <a:xfrm>
+              <a:off x="5457396" y="5193676"/>
+              <a:ext cx="364202" cy="307777"/>
+            </a:xfrm>
+            <a:prstGeom prst="rect">
+              <a:avLst/>
+            </a:prstGeom>
+            <a:noFill/>
+          </p:spPr>
+          <p:txBody>
+            <a:bodyPr wrap="none" rtlCol="0">
+              <a:spAutoFit/>
+            </a:bodyPr>
+            <a:lstStyle/>
+            <a:p>
+              <a:r>
+                <a:rPr kumimoji="1" lang="zh-CN" altLang="en-US" sz="1400"/>
+                <a:t>压</a:t>
+              </a:r>
+            </a:p>
+          </p:txBody>
+        </p:sp>
+        <p:sp>
+          <p:nvSpPr>
+            <p:cNvPr id="95" name="文本框 94"/>
+            <p:cNvSpPr txBox="1"/>
+            <p:nvPr/>
+          </p:nvSpPr>
+          <p:spPr>
+            <a:xfrm>
+              <a:off x="5457396" y="4311367"/>
+              <a:ext cx="364202" cy="307777"/>
+            </a:xfrm>
+            <a:prstGeom prst="rect">
+              <a:avLst/>
+            </a:prstGeom>
+            <a:noFill/>
+          </p:spPr>
+          <p:txBody>
+            <a:bodyPr wrap="none" rtlCol="0">
+              <a:spAutoFit/>
+            </a:bodyPr>
+            <a:lstStyle/>
+            <a:p>
+              <a:r>
+                <a:rPr kumimoji="1" lang="zh-CN" altLang="en-US" sz="1400"/>
+                <a:t>弹</a:t>
+              </a:r>
+            </a:p>
+          </p:txBody>
+        </p:sp>
+        <p:sp>
+          <p:nvSpPr>
+            <p:cNvPr id="96" name="文本框 95"/>
+            <p:cNvSpPr txBox="1"/>
+            <p:nvPr/>
+          </p:nvSpPr>
+          <p:spPr>
+            <a:xfrm>
+              <a:off x="5452587" y="4602977"/>
+              <a:ext cx="373820" cy="307777"/>
+            </a:xfrm>
+            <a:prstGeom prst="rect">
+              <a:avLst/>
+            </a:prstGeom>
+            <a:noFill/>
+          </p:spPr>
+          <p:txBody>
+            <a:bodyPr wrap="none" rtlCol="0">
+              <a:spAutoFit/>
+            </a:bodyPr>
+            <a:lstStyle/>
+            <a:p>
+              <a:r>
+                <a:rPr kumimoji="1" lang="zh-CN" altLang="en-US" sz="1400"/>
+                <a:t>取</a:t>
+              </a:r>
+            </a:p>
+          </p:txBody>
+        </p:sp>
+        <p:sp>
+          <p:nvSpPr>
+            <p:cNvPr id="97" name="文本框 96"/>
+            <p:cNvSpPr txBox="1"/>
+            <p:nvPr/>
+          </p:nvSpPr>
+          <p:spPr>
+            <a:xfrm>
+              <a:off x="5457396" y="4903648"/>
+              <a:ext cx="364202" cy="307777"/>
+            </a:xfrm>
+            <a:prstGeom prst="rect">
+              <a:avLst/>
+            </a:prstGeom>
+            <a:noFill/>
+          </p:spPr>
+          <p:txBody>
+            <a:bodyPr wrap="none" rtlCol="0">
+              <a:spAutoFit/>
+            </a:bodyPr>
+            <a:lstStyle/>
+            <a:p>
+              <a:r>
+                <a:rPr kumimoji="1" lang="zh-CN" altLang="en-US" sz="1400"/>
+                <a:t>算</a:t>
+              </a:r>
+            </a:p>
+          </p:txBody>
+        </p:sp>
+        <p:sp>
+          <p:nvSpPr>
+            <p:cNvPr id="98" name="文本框 97"/>
+            <p:cNvSpPr txBox="1"/>
+            <p:nvPr/>
+          </p:nvSpPr>
+          <p:spPr>
+            <a:xfrm>
+              <a:off x="5815425" y="3430628"/>
+              <a:ext cx="364202" cy="307777"/>
+            </a:xfrm>
+            <a:prstGeom prst="rect">
+              <a:avLst/>
+            </a:prstGeom>
+            <a:noFill/>
+          </p:spPr>
+          <p:txBody>
+            <a:bodyPr wrap="none" rtlCol="0">
+              <a:spAutoFit/>
+            </a:bodyPr>
+            <a:lstStyle/>
+            <a:p>
+              <a:r>
+                <a:rPr kumimoji="1" lang="zh-CN" altLang="en-US" sz="1400"/>
+                <a:t>压</a:t>
+              </a:r>
+            </a:p>
+          </p:txBody>
+        </p:sp>
+      </p:grpSp>
+    </p:spTree>
+    <p:extLst>
+      <p:ext uri="{BB962C8B-B14F-4D97-AF65-F5344CB8AC3E}">
+        <p14:creationId xmlns:p14="http://schemas.microsoft.com/office/powerpoint/2010/main" val="2036769668"/>
+      </p:ext>
+    </p:extLst>
+  </p:cSld>
+  <p:clrMapOvr>
+    <a:masterClrMapping/>
+  </p:clrMapOvr>
+</p:sld>
+</file>
+
 <file path=ppt/theme/theme1.xml><?xml version="1.0" encoding="utf-8"?>
 <a:theme xmlns:a="http://schemas.openxmlformats.org/drawingml/2006/main" name="Office 主题">
   <a:themeElements>

</xml_diff>